<commit_message>
Additions to FinalProject presentation
</commit_message>
<xml_diff>
--- a/FinalProject/Docs/Townes_POLS6310_2019_Spring_FinalProject_Presentation_v00.pptx
+++ b/FinalProject/Docs/Townes_POLS6310_2019_Spring_FinalProject_Presentation_v00.pptx
@@ -5,15 +5,18 @@
     <p:sldMasterId id="2147483648" r:id="rId1"/>
   </p:sldMasterIdLst>
   <p:notesMasterIdLst>
-    <p:notesMasterId r:id="rId8"/>
+    <p:notesMasterId r:id="rId11"/>
   </p:notesMasterIdLst>
   <p:sldIdLst>
     <p:sldId id="256" r:id="rId2"/>
     <p:sldId id="257" r:id="rId3"/>
     <p:sldId id="259" r:id="rId4"/>
-    <p:sldId id="260" r:id="rId5"/>
-    <p:sldId id="261" r:id="rId6"/>
-    <p:sldId id="258" r:id="rId7"/>
+    <p:sldId id="265" r:id="rId5"/>
+    <p:sldId id="262" r:id="rId6"/>
+    <p:sldId id="264" r:id="rId7"/>
+    <p:sldId id="261" r:id="rId8"/>
+    <p:sldId id="258" r:id="rId9"/>
+    <p:sldId id="263" r:id="rId10"/>
   </p:sldIdLst>
   <p:sldSz cx="9144000" cy="5715000" type="screen16x10"/>
   <p:notesSz cx="6858000" cy="9144000"/>
@@ -115,6 +118,1234 @@
 </p:presentation>
 </file>
 
+<file path=ppt/charts/chart1.xml><?xml version="1.0" encoding="utf-8"?>
+<c:chartSpace xmlns:c="http://schemas.openxmlformats.org/drawingml/2006/chart" xmlns:a="http://schemas.openxmlformats.org/drawingml/2006/main" xmlns:r="http://schemas.openxmlformats.org/officeDocument/2006/relationships">
+  <c:date1904 val="0"/>
+  <c:lang val="en-US"/>
+  <c:roundedCorners val="0"/>
+  <mc:AlternateContent xmlns:mc="http://schemas.openxmlformats.org/markup-compatibility/2006">
+    <mc:Choice xmlns:c14="http://schemas.microsoft.com/office/drawing/2007/8/2/chart" Requires="c14">
+      <c14:style val="102"/>
+    </mc:Choice>
+    <mc:Fallback>
+      <c:style val="2"/>
+    </mc:Fallback>
+  </mc:AlternateContent>
+  <c:chart>
+    <c:title>
+      <c:tx>
+        <c:rich>
+          <a:bodyPr/>
+          <a:lstStyle/>
+          <a:p>
+            <a:pPr>
+              <a:defRPr/>
+            </a:pPr>
+            <a:r>
+              <a:rPr lang="en-US"/>
+              <a:t>Small Business Percentage of Federal R&amp;D Obligations to Industry</a:t>
+            </a:r>
+          </a:p>
+        </c:rich>
+      </c:tx>
+      <c:layout/>
+      <c:overlay val="0"/>
+    </c:title>
+    <c:autoTitleDeleted val="0"/>
+    <c:plotArea>
+      <c:layout/>
+      <c:scatterChart>
+        <c:scatterStyle val="lineMarker"/>
+        <c:varyColors val="0"/>
+        <c:ser>
+          <c:idx val="0"/>
+          <c:order val="0"/>
+          <c:tx>
+            <c:strRef>
+              <c:f>Chart!$B$1</c:f>
+              <c:strCache>
+                <c:ptCount val="1"/>
+                <c:pt idx="0">
+                  <c:v>Actual SBIR Pct of Industry</c:v>
+                </c:pt>
+              </c:strCache>
+            </c:strRef>
+          </c:tx>
+          <c:dLbls>
+            <c:delete val="1"/>
+          </c:dLbls>
+          <c:xVal>
+            <c:numRef>
+              <c:f>Chart!$A$2:$A$27</c:f>
+              <c:numCache>
+                <c:formatCode>General</c:formatCode>
+                <c:ptCount val="26"/>
+                <c:pt idx="0">
+                  <c:v>1990</c:v>
+                </c:pt>
+                <c:pt idx="1">
+                  <c:v>1991</c:v>
+                </c:pt>
+                <c:pt idx="2">
+                  <c:v>1992</c:v>
+                </c:pt>
+                <c:pt idx="3">
+                  <c:v>1993</c:v>
+                </c:pt>
+                <c:pt idx="4">
+                  <c:v>1994</c:v>
+                </c:pt>
+                <c:pt idx="5">
+                  <c:v>1995</c:v>
+                </c:pt>
+                <c:pt idx="6">
+                  <c:v>1996</c:v>
+                </c:pt>
+                <c:pt idx="7">
+                  <c:v>1997</c:v>
+                </c:pt>
+                <c:pt idx="8">
+                  <c:v>1998</c:v>
+                </c:pt>
+                <c:pt idx="9">
+                  <c:v>1999</c:v>
+                </c:pt>
+                <c:pt idx="10">
+                  <c:v>2000</c:v>
+                </c:pt>
+                <c:pt idx="11">
+                  <c:v>2001</c:v>
+                </c:pt>
+                <c:pt idx="12">
+                  <c:v>2002</c:v>
+                </c:pt>
+                <c:pt idx="13">
+                  <c:v>2003</c:v>
+                </c:pt>
+                <c:pt idx="14">
+                  <c:v>2004</c:v>
+                </c:pt>
+                <c:pt idx="15">
+                  <c:v>2005</c:v>
+                </c:pt>
+                <c:pt idx="16">
+                  <c:v>2006</c:v>
+                </c:pt>
+                <c:pt idx="17">
+                  <c:v>2007</c:v>
+                </c:pt>
+                <c:pt idx="18">
+                  <c:v>2008</c:v>
+                </c:pt>
+                <c:pt idx="19">
+                  <c:v>2009</c:v>
+                </c:pt>
+                <c:pt idx="20">
+                  <c:v>2010</c:v>
+                </c:pt>
+                <c:pt idx="21">
+                  <c:v>2011</c:v>
+                </c:pt>
+                <c:pt idx="22">
+                  <c:v>2012</c:v>
+                </c:pt>
+                <c:pt idx="23">
+                  <c:v>2013</c:v>
+                </c:pt>
+                <c:pt idx="24">
+                  <c:v>2014</c:v>
+                </c:pt>
+                <c:pt idx="25">
+                  <c:v>2015</c:v>
+                </c:pt>
+              </c:numCache>
+            </c:numRef>
+          </c:xVal>
+          <c:yVal>
+            <c:numRef>
+              <c:f>Chart!$B$2:$B$27</c:f>
+              <c:numCache>
+                <c:formatCode>0.00%</c:formatCode>
+                <c:ptCount val="26"/>
+                <c:pt idx="0">
+                  <c:v>1.5687027579162412E-2</c:v>
+                </c:pt>
+                <c:pt idx="1">
+                  <c:v>1.8284217618070749E-2</c:v>
+                </c:pt>
+                <c:pt idx="2">
+                  <c:v>1.7092164008498965E-2</c:v>
+                </c:pt>
+                <c:pt idx="3">
+                  <c:v>2.3096859591647638E-2</c:v>
+                </c:pt>
+                <c:pt idx="4">
+                  <c:v>2.3564254028087435E-2</c:v>
+                </c:pt>
+                <c:pt idx="5">
+                  <c:v>2.8593270957563973E-2</c:v>
+                </c:pt>
+                <c:pt idx="6">
+                  <c:v>3.0167446944406033E-2</c:v>
+                </c:pt>
+                <c:pt idx="7">
+                  <c:v>3.5233025560722234E-2</c:v>
+                </c:pt>
+                <c:pt idx="8">
+                  <c:v>3.5297669273030692E-2</c:v>
+                </c:pt>
+                <c:pt idx="9">
+                  <c:v>3.4372024061413653E-2</c:v>
+                </c:pt>
+                <c:pt idx="10">
+                  <c:v>3.9052028113747105E-2</c:v>
+                </c:pt>
+                <c:pt idx="11">
+                  <c:v>4.8837151650157416E-2</c:v>
+                </c:pt>
+                <c:pt idx="12">
+                  <c:v>4.0877259972808007E-2</c:v>
+                </c:pt>
+                <c:pt idx="13">
+                  <c:v>4.4030667534924864E-2</c:v>
+                </c:pt>
+                <c:pt idx="14">
+                  <c:v>4.4765475208358566E-2</c:v>
+                </c:pt>
+                <c:pt idx="15">
+                  <c:v>4.1536939381475367E-2</c:v>
+                </c:pt>
+                <c:pt idx="16">
+                  <c:v>4.0072430526595142E-2</c:v>
+                </c:pt>
+                <c:pt idx="17">
+                  <c:v>3.7588499213079329E-2</c:v>
+                </c:pt>
+                <c:pt idx="18">
+                  <c:v>3.7889508960268097E-2</c:v>
+                </c:pt>
+                <c:pt idx="19">
+                  <c:v>5.1054109277875501E-2</c:v>
+                </c:pt>
+                <c:pt idx="20">
+                  <c:v>5.5241337110587443E-2</c:v>
+                </c:pt>
+                <c:pt idx="21">
+                  <c:v>4.4343699260644381E-2</c:v>
+                </c:pt>
+                <c:pt idx="22">
+                  <c:v>3.7907077296420941E-2</c:v>
+                </c:pt>
+                <c:pt idx="23">
+                  <c:v>4.2656195131108195E-2</c:v>
+                </c:pt>
+                <c:pt idx="24">
+                  <c:v>4.5385307495546069E-2</c:v>
+                </c:pt>
+                <c:pt idx="25">
+                  <c:v>4.4417976133047585E-2</c:v>
+                </c:pt>
+              </c:numCache>
+            </c:numRef>
+          </c:yVal>
+          <c:smooth val="0"/>
+        </c:ser>
+        <c:ser>
+          <c:idx val="1"/>
+          <c:order val="1"/>
+          <c:tx>
+            <c:strRef>
+              <c:f>Chart!$C$1</c:f>
+              <c:strCache>
+                <c:ptCount val="1"/>
+                <c:pt idx="0">
+                  <c:v>Set-aside</c:v>
+                </c:pt>
+              </c:strCache>
+            </c:strRef>
+          </c:tx>
+          <c:dLbls>
+            <c:delete val="1"/>
+          </c:dLbls>
+          <c:xVal>
+            <c:numRef>
+              <c:f>Chart!$A$2:$A$27</c:f>
+              <c:numCache>
+                <c:formatCode>General</c:formatCode>
+                <c:ptCount val="26"/>
+                <c:pt idx="0">
+                  <c:v>1990</c:v>
+                </c:pt>
+                <c:pt idx="1">
+                  <c:v>1991</c:v>
+                </c:pt>
+                <c:pt idx="2">
+                  <c:v>1992</c:v>
+                </c:pt>
+                <c:pt idx="3">
+                  <c:v>1993</c:v>
+                </c:pt>
+                <c:pt idx="4">
+                  <c:v>1994</c:v>
+                </c:pt>
+                <c:pt idx="5">
+                  <c:v>1995</c:v>
+                </c:pt>
+                <c:pt idx="6">
+                  <c:v>1996</c:v>
+                </c:pt>
+                <c:pt idx="7">
+                  <c:v>1997</c:v>
+                </c:pt>
+                <c:pt idx="8">
+                  <c:v>1998</c:v>
+                </c:pt>
+                <c:pt idx="9">
+                  <c:v>1999</c:v>
+                </c:pt>
+                <c:pt idx="10">
+                  <c:v>2000</c:v>
+                </c:pt>
+                <c:pt idx="11">
+                  <c:v>2001</c:v>
+                </c:pt>
+                <c:pt idx="12">
+                  <c:v>2002</c:v>
+                </c:pt>
+                <c:pt idx="13">
+                  <c:v>2003</c:v>
+                </c:pt>
+                <c:pt idx="14">
+                  <c:v>2004</c:v>
+                </c:pt>
+                <c:pt idx="15">
+                  <c:v>2005</c:v>
+                </c:pt>
+                <c:pt idx="16">
+                  <c:v>2006</c:v>
+                </c:pt>
+                <c:pt idx="17">
+                  <c:v>2007</c:v>
+                </c:pt>
+                <c:pt idx="18">
+                  <c:v>2008</c:v>
+                </c:pt>
+                <c:pt idx="19">
+                  <c:v>2009</c:v>
+                </c:pt>
+                <c:pt idx="20">
+                  <c:v>2010</c:v>
+                </c:pt>
+                <c:pt idx="21">
+                  <c:v>2011</c:v>
+                </c:pt>
+                <c:pt idx="22">
+                  <c:v>2012</c:v>
+                </c:pt>
+                <c:pt idx="23">
+                  <c:v>2013</c:v>
+                </c:pt>
+                <c:pt idx="24">
+                  <c:v>2014</c:v>
+                </c:pt>
+                <c:pt idx="25">
+                  <c:v>2015</c:v>
+                </c:pt>
+              </c:numCache>
+            </c:numRef>
+          </c:xVal>
+          <c:yVal>
+            <c:numRef>
+              <c:f>Chart!$C$2:$C$27</c:f>
+              <c:numCache>
+                <c:formatCode>0.00%</c:formatCode>
+                <c:ptCount val="26"/>
+                <c:pt idx="0">
+                  <c:v>1.2500000000000001E-2</c:v>
+                </c:pt>
+                <c:pt idx="1">
+                  <c:v>1.2500000000000001E-2</c:v>
+                </c:pt>
+                <c:pt idx="2">
+                  <c:v>1.2500000000000001E-2</c:v>
+                </c:pt>
+                <c:pt idx="3">
+                  <c:v>2.5000000000000001E-2</c:v>
+                </c:pt>
+                <c:pt idx="4">
+                  <c:v>2.5000000000000001E-2</c:v>
+                </c:pt>
+                <c:pt idx="5">
+                  <c:v>2.5000000000000001E-2</c:v>
+                </c:pt>
+                <c:pt idx="6">
+                  <c:v>2.5000000000000001E-2</c:v>
+                </c:pt>
+                <c:pt idx="7">
+                  <c:v>2.5000000000000001E-2</c:v>
+                </c:pt>
+                <c:pt idx="8">
+                  <c:v>2.5000000000000001E-2</c:v>
+                </c:pt>
+                <c:pt idx="9">
+                  <c:v>2.5000000000000001E-2</c:v>
+                </c:pt>
+                <c:pt idx="10">
+                  <c:v>2.5000000000000001E-2</c:v>
+                </c:pt>
+                <c:pt idx="11">
+                  <c:v>2.5000000000000001E-2</c:v>
+                </c:pt>
+                <c:pt idx="12">
+                  <c:v>2.5000000000000001E-2</c:v>
+                </c:pt>
+                <c:pt idx="13">
+                  <c:v>2.5000000000000001E-2</c:v>
+                </c:pt>
+                <c:pt idx="14">
+                  <c:v>2.5000000000000001E-2</c:v>
+                </c:pt>
+                <c:pt idx="15">
+                  <c:v>2.5000000000000001E-2</c:v>
+                </c:pt>
+                <c:pt idx="16">
+                  <c:v>2.5000000000000001E-2</c:v>
+                </c:pt>
+                <c:pt idx="17">
+                  <c:v>2.5000000000000001E-2</c:v>
+                </c:pt>
+                <c:pt idx="18">
+                  <c:v>2.5000000000000001E-2</c:v>
+                </c:pt>
+                <c:pt idx="19">
+                  <c:v>2.5000000000000001E-2</c:v>
+                </c:pt>
+                <c:pt idx="20">
+                  <c:v>2.5000000000000001E-2</c:v>
+                </c:pt>
+                <c:pt idx="21">
+                  <c:v>2.5000000000000001E-2</c:v>
+                </c:pt>
+                <c:pt idx="22">
+                  <c:v>2.5999999999999999E-2</c:v>
+                </c:pt>
+                <c:pt idx="23">
+                  <c:v>2.7E-2</c:v>
+                </c:pt>
+                <c:pt idx="24">
+                  <c:v>2.8000000000000001E-2</c:v>
+                </c:pt>
+                <c:pt idx="25">
+                  <c:v>2.9000000000000001E-2</c:v>
+                </c:pt>
+              </c:numCache>
+            </c:numRef>
+          </c:yVal>
+          <c:smooth val="0"/>
+        </c:ser>
+        <c:dLbls>
+          <c:showLegendKey val="0"/>
+          <c:showVal val="1"/>
+          <c:showCatName val="0"/>
+          <c:showSerName val="0"/>
+          <c:showPercent val="0"/>
+          <c:showBubbleSize val="0"/>
+        </c:dLbls>
+        <c:axId val="198540288"/>
+        <c:axId val="198542080"/>
+      </c:scatterChart>
+      <c:valAx>
+        <c:axId val="198540288"/>
+        <c:scaling>
+          <c:orientation val="minMax"/>
+          <c:max val="2015"/>
+          <c:min val="1990"/>
+        </c:scaling>
+        <c:delete val="0"/>
+        <c:axPos val="b"/>
+        <c:numFmt formatCode="General" sourceLinked="1"/>
+        <c:majorTickMark val="cross"/>
+        <c:minorTickMark val="out"/>
+        <c:tickLblPos val="nextTo"/>
+        <c:crossAx val="198542080"/>
+        <c:crosses val="autoZero"/>
+        <c:crossBetween val="midCat"/>
+        <c:minorUnit val="1"/>
+      </c:valAx>
+      <c:valAx>
+        <c:axId val="198542080"/>
+        <c:scaling>
+          <c:orientation val="minMax"/>
+        </c:scaling>
+        <c:delete val="0"/>
+        <c:axPos val="l"/>
+        <c:majorGridlines/>
+        <c:numFmt formatCode="0.00%" sourceLinked="1"/>
+        <c:majorTickMark val="out"/>
+        <c:minorTickMark val="none"/>
+        <c:tickLblPos val="nextTo"/>
+        <c:crossAx val="198540288"/>
+        <c:crosses val="autoZero"/>
+        <c:crossBetween val="midCat"/>
+      </c:valAx>
+    </c:plotArea>
+    <c:plotVisOnly val="1"/>
+    <c:dispBlanksAs val="gap"/>
+    <c:showDLblsOverMax val="0"/>
+  </c:chart>
+  <c:spPr>
+    <a:ln>
+      <a:noFill/>
+    </a:ln>
+  </c:spPr>
+  <c:externalData r:id="rId1">
+    <c:autoUpdate val="0"/>
+  </c:externalData>
+</c:chartSpace>
+</file>
+
+<file path=ppt/charts/chart2.xml><?xml version="1.0" encoding="utf-8"?>
+<c:chartSpace xmlns:c="http://schemas.openxmlformats.org/drawingml/2006/chart" xmlns:a="http://schemas.openxmlformats.org/drawingml/2006/main" xmlns:r="http://schemas.openxmlformats.org/officeDocument/2006/relationships">
+  <c:date1904 val="0"/>
+  <c:lang val="en-US"/>
+  <c:roundedCorners val="0"/>
+  <mc:AlternateContent xmlns:mc="http://schemas.openxmlformats.org/markup-compatibility/2006">
+    <mc:Choice xmlns:c14="http://schemas.microsoft.com/office/drawing/2007/8/2/chart" Requires="c14">
+      <c14:style val="102"/>
+    </mc:Choice>
+    <mc:Fallback>
+      <c:style val="2"/>
+    </mc:Fallback>
+  </mc:AlternateContent>
+  <c:chart>
+    <c:title>
+      <c:tx>
+        <c:rich>
+          <a:bodyPr/>
+          <a:lstStyle/>
+          <a:p>
+            <a:pPr>
+              <a:defRPr/>
+            </a:pPr>
+            <a:r>
+              <a:rPr lang="en-US"/>
+              <a:t>Targets for Small</a:t>
+            </a:r>
+            <a:r>
+              <a:rPr lang="en-US" baseline="0"/>
+              <a:t> Business R&amp;D Funding</a:t>
+            </a:r>
+            <a:endParaRPr lang="en-US"/>
+          </a:p>
+        </c:rich>
+      </c:tx>
+      <c:layout/>
+      <c:overlay val="0"/>
+    </c:title>
+    <c:autoTitleDeleted val="0"/>
+    <c:plotArea>
+      <c:layout/>
+      <c:scatterChart>
+        <c:scatterStyle val="lineMarker"/>
+        <c:varyColors val="0"/>
+        <c:ser>
+          <c:idx val="0"/>
+          <c:order val="0"/>
+          <c:tx>
+            <c:strRef>
+              <c:f>Chart!$AM$1</c:f>
+              <c:strCache>
+                <c:ptCount val="1"/>
+                <c:pt idx="0">
+                  <c:v>Actual SBIR Pct of Industry</c:v>
+                </c:pt>
+              </c:strCache>
+            </c:strRef>
+          </c:tx>
+          <c:spPr>
+            <a:ln>
+              <a:solidFill>
+                <a:schemeClr val="accent1"/>
+              </a:solidFill>
+            </a:ln>
+          </c:spPr>
+          <c:marker>
+            <c:spPr>
+              <a:solidFill>
+                <a:schemeClr val="accent1"/>
+              </a:solidFill>
+              <a:ln>
+                <a:solidFill>
+                  <a:schemeClr val="accent1"/>
+                </a:solidFill>
+              </a:ln>
+            </c:spPr>
+          </c:marker>
+          <c:xVal>
+            <c:numRef>
+              <c:f>Chart!$AL$2:$AL$27</c:f>
+              <c:numCache>
+                <c:formatCode>General</c:formatCode>
+                <c:ptCount val="26"/>
+                <c:pt idx="0">
+                  <c:v>1990</c:v>
+                </c:pt>
+                <c:pt idx="1">
+                  <c:v>1991</c:v>
+                </c:pt>
+                <c:pt idx="2">
+                  <c:v>1992</c:v>
+                </c:pt>
+                <c:pt idx="3">
+                  <c:v>1993</c:v>
+                </c:pt>
+                <c:pt idx="4">
+                  <c:v>1994</c:v>
+                </c:pt>
+                <c:pt idx="5">
+                  <c:v>1995</c:v>
+                </c:pt>
+                <c:pt idx="6">
+                  <c:v>1996</c:v>
+                </c:pt>
+                <c:pt idx="7">
+                  <c:v>1997</c:v>
+                </c:pt>
+                <c:pt idx="8">
+                  <c:v>1998</c:v>
+                </c:pt>
+                <c:pt idx="9">
+                  <c:v>1999</c:v>
+                </c:pt>
+                <c:pt idx="10">
+                  <c:v>2000</c:v>
+                </c:pt>
+                <c:pt idx="11">
+                  <c:v>2001</c:v>
+                </c:pt>
+                <c:pt idx="12">
+                  <c:v>2002</c:v>
+                </c:pt>
+                <c:pt idx="13">
+                  <c:v>2003</c:v>
+                </c:pt>
+                <c:pt idx="14">
+                  <c:v>2004</c:v>
+                </c:pt>
+                <c:pt idx="15">
+                  <c:v>2005</c:v>
+                </c:pt>
+                <c:pt idx="16">
+                  <c:v>2006</c:v>
+                </c:pt>
+                <c:pt idx="17">
+                  <c:v>2007</c:v>
+                </c:pt>
+                <c:pt idx="18">
+                  <c:v>2008</c:v>
+                </c:pt>
+                <c:pt idx="19">
+                  <c:v>2009</c:v>
+                </c:pt>
+                <c:pt idx="20">
+                  <c:v>2010</c:v>
+                </c:pt>
+                <c:pt idx="21">
+                  <c:v>2011</c:v>
+                </c:pt>
+                <c:pt idx="22">
+                  <c:v>2012</c:v>
+                </c:pt>
+                <c:pt idx="23">
+                  <c:v>2013</c:v>
+                </c:pt>
+                <c:pt idx="24">
+                  <c:v>2014</c:v>
+                </c:pt>
+                <c:pt idx="25">
+                  <c:v>2015</c:v>
+                </c:pt>
+              </c:numCache>
+            </c:numRef>
+          </c:xVal>
+          <c:yVal>
+            <c:numRef>
+              <c:f>Chart!$AM$2:$AM$27</c:f>
+              <c:numCache>
+                <c:formatCode>0.00%</c:formatCode>
+                <c:ptCount val="26"/>
+                <c:pt idx="0">
+                  <c:v>1.5687027579162412E-2</c:v>
+                </c:pt>
+                <c:pt idx="1">
+                  <c:v>1.8284217618070749E-2</c:v>
+                </c:pt>
+                <c:pt idx="2">
+                  <c:v>1.7092164008498965E-2</c:v>
+                </c:pt>
+                <c:pt idx="3">
+                  <c:v>2.3096859591647638E-2</c:v>
+                </c:pt>
+                <c:pt idx="4">
+                  <c:v>2.3564254028087435E-2</c:v>
+                </c:pt>
+                <c:pt idx="5">
+                  <c:v>2.8593270957563973E-2</c:v>
+                </c:pt>
+                <c:pt idx="6">
+                  <c:v>3.0167446944406033E-2</c:v>
+                </c:pt>
+                <c:pt idx="7">
+                  <c:v>3.5233025560722234E-2</c:v>
+                </c:pt>
+                <c:pt idx="8">
+                  <c:v>3.5297669273030692E-2</c:v>
+                </c:pt>
+                <c:pt idx="9">
+                  <c:v>3.4372024061413653E-2</c:v>
+                </c:pt>
+                <c:pt idx="10">
+                  <c:v>3.9052028113747105E-2</c:v>
+                </c:pt>
+                <c:pt idx="11">
+                  <c:v>4.8837151650157416E-2</c:v>
+                </c:pt>
+                <c:pt idx="12">
+                  <c:v>4.0877259972808007E-2</c:v>
+                </c:pt>
+                <c:pt idx="13">
+                  <c:v>4.4030667534924864E-2</c:v>
+                </c:pt>
+                <c:pt idx="14">
+                  <c:v>4.4765475208358566E-2</c:v>
+                </c:pt>
+                <c:pt idx="15">
+                  <c:v>4.1536939381475367E-2</c:v>
+                </c:pt>
+                <c:pt idx="16">
+                  <c:v>4.0072430526595142E-2</c:v>
+                </c:pt>
+                <c:pt idx="17">
+                  <c:v>3.7588499213079329E-2</c:v>
+                </c:pt>
+                <c:pt idx="18">
+                  <c:v>3.7889508960268097E-2</c:v>
+                </c:pt>
+                <c:pt idx="19">
+                  <c:v>5.1054109277875501E-2</c:v>
+                </c:pt>
+                <c:pt idx="20">
+                  <c:v>5.5241337110587443E-2</c:v>
+                </c:pt>
+                <c:pt idx="21">
+                  <c:v>4.4343699260644381E-2</c:v>
+                </c:pt>
+                <c:pt idx="22">
+                  <c:v>3.7907077296420941E-2</c:v>
+                </c:pt>
+                <c:pt idx="23">
+                  <c:v>4.2656195131108195E-2</c:v>
+                </c:pt>
+                <c:pt idx="24">
+                  <c:v>4.5385307495546069E-2</c:v>
+                </c:pt>
+                <c:pt idx="25">
+                  <c:v>4.4417976133047585E-2</c:v>
+                </c:pt>
+              </c:numCache>
+            </c:numRef>
+          </c:yVal>
+          <c:smooth val="0"/>
+        </c:ser>
+        <c:ser>
+          <c:idx val="1"/>
+          <c:order val="1"/>
+          <c:tx>
+            <c:strRef>
+              <c:f>Chart!$AN$1</c:f>
+              <c:strCache>
+                <c:ptCount val="1"/>
+                <c:pt idx="0">
+                  <c:v>SBIR Potential as Pct of Industry Ideal</c:v>
+                </c:pt>
+              </c:strCache>
+            </c:strRef>
+          </c:tx>
+          <c:spPr>
+            <a:ln>
+              <a:solidFill>
+                <a:schemeClr val="accent3">
+                  <a:lumMod val="75000"/>
+                </a:schemeClr>
+              </a:solidFill>
+            </a:ln>
+          </c:spPr>
+          <c:marker>
+            <c:spPr>
+              <a:solidFill>
+                <a:schemeClr val="accent3">
+                  <a:lumMod val="75000"/>
+                </a:schemeClr>
+              </a:solidFill>
+              <a:ln>
+                <a:solidFill>
+                  <a:schemeClr val="accent3">
+                    <a:lumMod val="75000"/>
+                  </a:schemeClr>
+                </a:solidFill>
+              </a:ln>
+            </c:spPr>
+          </c:marker>
+          <c:xVal>
+            <c:numRef>
+              <c:f>Chart!$AL$2:$AL$27</c:f>
+              <c:numCache>
+                <c:formatCode>General</c:formatCode>
+                <c:ptCount val="26"/>
+                <c:pt idx="0">
+                  <c:v>1990</c:v>
+                </c:pt>
+                <c:pt idx="1">
+                  <c:v>1991</c:v>
+                </c:pt>
+                <c:pt idx="2">
+                  <c:v>1992</c:v>
+                </c:pt>
+                <c:pt idx="3">
+                  <c:v>1993</c:v>
+                </c:pt>
+                <c:pt idx="4">
+                  <c:v>1994</c:v>
+                </c:pt>
+                <c:pt idx="5">
+                  <c:v>1995</c:v>
+                </c:pt>
+                <c:pt idx="6">
+                  <c:v>1996</c:v>
+                </c:pt>
+                <c:pt idx="7">
+                  <c:v>1997</c:v>
+                </c:pt>
+                <c:pt idx="8">
+                  <c:v>1998</c:v>
+                </c:pt>
+                <c:pt idx="9">
+                  <c:v>1999</c:v>
+                </c:pt>
+                <c:pt idx="10">
+                  <c:v>2000</c:v>
+                </c:pt>
+                <c:pt idx="11">
+                  <c:v>2001</c:v>
+                </c:pt>
+                <c:pt idx="12">
+                  <c:v>2002</c:v>
+                </c:pt>
+                <c:pt idx="13">
+                  <c:v>2003</c:v>
+                </c:pt>
+                <c:pt idx="14">
+                  <c:v>2004</c:v>
+                </c:pt>
+                <c:pt idx="15">
+                  <c:v>2005</c:v>
+                </c:pt>
+                <c:pt idx="16">
+                  <c:v>2006</c:v>
+                </c:pt>
+                <c:pt idx="17">
+                  <c:v>2007</c:v>
+                </c:pt>
+                <c:pt idx="18">
+                  <c:v>2008</c:v>
+                </c:pt>
+                <c:pt idx="19">
+                  <c:v>2009</c:v>
+                </c:pt>
+                <c:pt idx="20">
+                  <c:v>2010</c:v>
+                </c:pt>
+                <c:pt idx="21">
+                  <c:v>2011</c:v>
+                </c:pt>
+                <c:pt idx="22">
+                  <c:v>2012</c:v>
+                </c:pt>
+                <c:pt idx="23">
+                  <c:v>2013</c:v>
+                </c:pt>
+                <c:pt idx="24">
+                  <c:v>2014</c:v>
+                </c:pt>
+                <c:pt idx="25">
+                  <c:v>2015</c:v>
+                </c:pt>
+              </c:numCache>
+            </c:numRef>
+          </c:xVal>
+          <c:yVal>
+            <c:numRef>
+              <c:f>Chart!$AN$2:$AN$27</c:f>
+              <c:numCache>
+                <c:formatCode>0.00%</c:formatCode>
+                <c:ptCount val="26"/>
+                <c:pt idx="0">
+                  <c:v>4.5346288932896141E-2</c:v>
+                </c:pt>
+                <c:pt idx="1">
+                  <c:v>5.221862614201879E-2</c:v>
+                </c:pt>
+                <c:pt idx="2">
+                  <c:v>4.8527854451927276E-2</c:v>
+                </c:pt>
+                <c:pt idx="3">
+                  <c:v>6.5700764877829623E-2</c:v>
+                </c:pt>
+                <c:pt idx="4">
+                  <c:v>7.1988122820615633E-2</c:v>
+                </c:pt>
+                <c:pt idx="5">
+                  <c:v>8.2662367756665481E-2</c:v>
+                </c:pt>
+                <c:pt idx="6">
+                  <c:v>8.4276464979243265E-2</c:v>
+                </c:pt>
+                <c:pt idx="7">
+                  <c:v>9.9313486905973788E-2</c:v>
+                </c:pt>
+                <c:pt idx="8">
+                  <c:v>9.5433980174787908E-2</c:v>
+                </c:pt>
+                <c:pt idx="9">
+                  <c:v>9.2905487302346657E-2</c:v>
+                </c:pt>
+                <c:pt idx="10">
+                  <c:v>0.1174960330668553</c:v>
+                </c:pt>
+                <c:pt idx="11">
+                  <c:v>0.13157754429262633</c:v>
+                </c:pt>
+                <c:pt idx="12">
+                  <c:v>0.12645530295920784</c:v>
+                </c:pt>
+                <c:pt idx="13">
+                  <c:v>0.1225168202707379</c:v>
+                </c:pt>
+                <c:pt idx="14">
+                  <c:v>0.12643900059712318</c:v>
+                </c:pt>
+                <c:pt idx="15">
+                  <c:v>0.10968641899381416</c:v>
+                </c:pt>
+                <c:pt idx="16">
+                  <c:v>9.8048230088917832E-2</c:v>
+                </c:pt>
+                <c:pt idx="17">
+                  <c:v>8.8303613220131097E-2</c:v>
+                </c:pt>
+                <c:pt idx="18">
+                  <c:v>9.0560523572040891E-2</c:v>
+                </c:pt>
+                <c:pt idx="19">
+                  <c:v>0.12329445793584255</c:v>
+                </c:pt>
+                <c:pt idx="20">
+                  <c:v>0.13953621098603594</c:v>
+                </c:pt>
+                <c:pt idx="21">
+                  <c:v>9.2789552446865001E-2</c:v>
+                </c:pt>
+                <c:pt idx="22">
+                  <c:v>8.5652985219278763E-2</c:v>
+                </c:pt>
+                <c:pt idx="23">
+                  <c:v>9.0822554345615064E-2</c:v>
+                </c:pt>
+                <c:pt idx="24">
+                  <c:v>9.9265533835264139E-2</c:v>
+                </c:pt>
+                <c:pt idx="25">
+                  <c:v>8.8456951293445982E-2</c:v>
+                </c:pt>
+              </c:numCache>
+            </c:numRef>
+          </c:yVal>
+          <c:smooth val="0"/>
+        </c:ser>
+        <c:ser>
+          <c:idx val="2"/>
+          <c:order val="2"/>
+          <c:tx>
+            <c:strRef>
+              <c:f>Chart!$AO$1</c:f>
+              <c:strCache>
+                <c:ptCount val="1"/>
+                <c:pt idx="0">
+                  <c:v>Set-aside</c:v>
+                </c:pt>
+              </c:strCache>
+            </c:strRef>
+          </c:tx>
+          <c:spPr>
+            <a:ln>
+              <a:solidFill>
+                <a:schemeClr val="accent2"/>
+              </a:solidFill>
+            </a:ln>
+          </c:spPr>
+          <c:marker>
+            <c:spPr>
+              <a:solidFill>
+                <a:schemeClr val="accent2"/>
+              </a:solidFill>
+              <a:ln>
+                <a:solidFill>
+                  <a:schemeClr val="accent2"/>
+                </a:solidFill>
+              </a:ln>
+            </c:spPr>
+          </c:marker>
+          <c:xVal>
+            <c:numRef>
+              <c:f>Chart!$AL$2:$AL$27</c:f>
+              <c:numCache>
+                <c:formatCode>General</c:formatCode>
+                <c:ptCount val="26"/>
+                <c:pt idx="0">
+                  <c:v>1990</c:v>
+                </c:pt>
+                <c:pt idx="1">
+                  <c:v>1991</c:v>
+                </c:pt>
+                <c:pt idx="2">
+                  <c:v>1992</c:v>
+                </c:pt>
+                <c:pt idx="3">
+                  <c:v>1993</c:v>
+                </c:pt>
+                <c:pt idx="4">
+                  <c:v>1994</c:v>
+                </c:pt>
+                <c:pt idx="5">
+                  <c:v>1995</c:v>
+                </c:pt>
+                <c:pt idx="6">
+                  <c:v>1996</c:v>
+                </c:pt>
+                <c:pt idx="7">
+                  <c:v>1997</c:v>
+                </c:pt>
+                <c:pt idx="8">
+                  <c:v>1998</c:v>
+                </c:pt>
+                <c:pt idx="9">
+                  <c:v>1999</c:v>
+                </c:pt>
+                <c:pt idx="10">
+                  <c:v>2000</c:v>
+                </c:pt>
+                <c:pt idx="11">
+                  <c:v>2001</c:v>
+                </c:pt>
+                <c:pt idx="12">
+                  <c:v>2002</c:v>
+                </c:pt>
+                <c:pt idx="13">
+                  <c:v>2003</c:v>
+                </c:pt>
+                <c:pt idx="14">
+                  <c:v>2004</c:v>
+                </c:pt>
+                <c:pt idx="15">
+                  <c:v>2005</c:v>
+                </c:pt>
+                <c:pt idx="16">
+                  <c:v>2006</c:v>
+                </c:pt>
+                <c:pt idx="17">
+                  <c:v>2007</c:v>
+                </c:pt>
+                <c:pt idx="18">
+                  <c:v>2008</c:v>
+                </c:pt>
+                <c:pt idx="19">
+                  <c:v>2009</c:v>
+                </c:pt>
+                <c:pt idx="20">
+                  <c:v>2010</c:v>
+                </c:pt>
+                <c:pt idx="21">
+                  <c:v>2011</c:v>
+                </c:pt>
+                <c:pt idx="22">
+                  <c:v>2012</c:v>
+                </c:pt>
+                <c:pt idx="23">
+                  <c:v>2013</c:v>
+                </c:pt>
+                <c:pt idx="24">
+                  <c:v>2014</c:v>
+                </c:pt>
+                <c:pt idx="25">
+                  <c:v>2015</c:v>
+                </c:pt>
+              </c:numCache>
+            </c:numRef>
+          </c:xVal>
+          <c:yVal>
+            <c:numRef>
+              <c:f>Chart!$AO$2:$AO$27</c:f>
+              <c:numCache>
+                <c:formatCode>0.00%</c:formatCode>
+                <c:ptCount val="26"/>
+                <c:pt idx="0">
+                  <c:v>1.2500000000000001E-2</c:v>
+                </c:pt>
+                <c:pt idx="1">
+                  <c:v>1.2500000000000001E-2</c:v>
+                </c:pt>
+                <c:pt idx="2">
+                  <c:v>1.2500000000000001E-2</c:v>
+                </c:pt>
+                <c:pt idx="3">
+                  <c:v>2.5000000000000001E-2</c:v>
+                </c:pt>
+                <c:pt idx="4">
+                  <c:v>2.5000000000000001E-2</c:v>
+                </c:pt>
+                <c:pt idx="5">
+                  <c:v>2.5000000000000001E-2</c:v>
+                </c:pt>
+                <c:pt idx="6">
+                  <c:v>2.5000000000000001E-2</c:v>
+                </c:pt>
+                <c:pt idx="7">
+                  <c:v>2.5000000000000001E-2</c:v>
+                </c:pt>
+                <c:pt idx="8">
+                  <c:v>2.5000000000000001E-2</c:v>
+                </c:pt>
+                <c:pt idx="9">
+                  <c:v>2.5000000000000001E-2</c:v>
+                </c:pt>
+                <c:pt idx="10">
+                  <c:v>2.5000000000000001E-2</c:v>
+                </c:pt>
+                <c:pt idx="11">
+                  <c:v>2.5000000000000001E-2</c:v>
+                </c:pt>
+                <c:pt idx="12">
+                  <c:v>2.5000000000000001E-2</c:v>
+                </c:pt>
+                <c:pt idx="13">
+                  <c:v>2.5000000000000001E-2</c:v>
+                </c:pt>
+                <c:pt idx="14">
+                  <c:v>2.5000000000000001E-2</c:v>
+                </c:pt>
+                <c:pt idx="15">
+                  <c:v>2.5000000000000001E-2</c:v>
+                </c:pt>
+                <c:pt idx="16">
+                  <c:v>2.5000000000000001E-2</c:v>
+                </c:pt>
+                <c:pt idx="17">
+                  <c:v>2.5000000000000001E-2</c:v>
+                </c:pt>
+                <c:pt idx="18">
+                  <c:v>2.5000000000000001E-2</c:v>
+                </c:pt>
+                <c:pt idx="19">
+                  <c:v>2.5000000000000001E-2</c:v>
+                </c:pt>
+                <c:pt idx="20">
+                  <c:v>2.5000000000000001E-2</c:v>
+                </c:pt>
+                <c:pt idx="21">
+                  <c:v>2.5000000000000001E-2</c:v>
+                </c:pt>
+                <c:pt idx="22">
+                  <c:v>2.5999999999999999E-2</c:v>
+                </c:pt>
+                <c:pt idx="23">
+                  <c:v>2.7E-2</c:v>
+                </c:pt>
+                <c:pt idx="24">
+                  <c:v>2.8000000000000001E-2</c:v>
+                </c:pt>
+                <c:pt idx="25">
+                  <c:v>2.9000000000000001E-2</c:v>
+                </c:pt>
+              </c:numCache>
+            </c:numRef>
+          </c:yVal>
+          <c:smooth val="0"/>
+        </c:ser>
+        <c:dLbls>
+          <c:showLegendKey val="0"/>
+          <c:showVal val="0"/>
+          <c:showCatName val="0"/>
+          <c:showSerName val="0"/>
+          <c:showPercent val="0"/>
+          <c:showBubbleSize val="0"/>
+        </c:dLbls>
+        <c:axId val="698886784"/>
+        <c:axId val="698901248"/>
+      </c:scatterChart>
+      <c:valAx>
+        <c:axId val="698886784"/>
+        <c:scaling>
+          <c:orientation val="minMax"/>
+          <c:max val="2015"/>
+          <c:min val="1990"/>
+        </c:scaling>
+        <c:delete val="0"/>
+        <c:axPos val="b"/>
+        <c:numFmt formatCode="General" sourceLinked="1"/>
+        <c:majorTickMark val="cross"/>
+        <c:minorTickMark val="out"/>
+        <c:tickLblPos val="nextTo"/>
+        <c:crossAx val="698901248"/>
+        <c:crosses val="autoZero"/>
+        <c:crossBetween val="midCat"/>
+      </c:valAx>
+      <c:valAx>
+        <c:axId val="698901248"/>
+        <c:scaling>
+          <c:orientation val="minMax"/>
+        </c:scaling>
+        <c:delete val="0"/>
+        <c:axPos val="l"/>
+        <c:majorGridlines/>
+        <c:numFmt formatCode="0.00%" sourceLinked="1"/>
+        <c:majorTickMark val="out"/>
+        <c:minorTickMark val="none"/>
+        <c:tickLblPos val="nextTo"/>
+        <c:crossAx val="698886784"/>
+        <c:crosses val="autoZero"/>
+        <c:crossBetween val="midCat"/>
+      </c:valAx>
+    </c:plotArea>
+    <c:legend>
+      <c:legendPos val="b"/>
+      <c:layout/>
+      <c:overlay val="0"/>
+    </c:legend>
+    <c:plotVisOnly val="1"/>
+    <c:dispBlanksAs val="gap"/>
+    <c:showDLblsOverMax val="0"/>
+  </c:chart>
+  <c:spPr>
+    <a:ln>
+      <a:noFill/>
+    </a:ln>
+  </c:spPr>
+  <c:externalData r:id="rId1">
+    <c:autoUpdate val="0"/>
+  </c:externalData>
+</c:chartSpace>
+</file>
+
 <file path=ppt/notesMasters/notesMaster1.xml><?xml version="1.0" encoding="utf-8"?>
 <p:notesMaster xmlns:a="http://schemas.openxmlformats.org/drawingml/2006/main" xmlns:r="http://schemas.openxmlformats.org/officeDocument/2006/relationships" xmlns:p="http://schemas.openxmlformats.org/presentationml/2006/main">
   <p:cSld>
@@ -157,7 +1388,7 @@
           </a:prstGeom>
         </p:spPr>
         <p:txBody>
-          <a:bodyPr vert="horz" lIns="91440" tIns="45720" rIns="91440" bIns="45720" rtlCol="0"/>
+          <a:bodyPr vert="horz" lIns="91434" tIns="45717" rIns="91434" bIns="45717" rtlCol="0"/>
           <a:lstStyle>
             <a:lvl1pPr algn="l">
               <a:defRPr sz="1200"/>
@@ -188,7 +1419,7 @@
           </a:prstGeom>
         </p:spPr>
         <p:txBody>
-          <a:bodyPr vert="horz" lIns="91440" tIns="45720" rIns="91440" bIns="45720" rtlCol="0"/>
+          <a:bodyPr vert="horz" lIns="91434" tIns="45717" rIns="91434" bIns="45717" rtlCol="0"/>
           <a:lstStyle>
             <a:lvl1pPr algn="r">
               <a:defRPr sz="1200"/>
@@ -197,7 +1428,7 @@
           <a:p>
             <a:fld id="{1DDE1E71-8F58-4980-B6E2-DAE065DEDC1F}" type="datetimeFigureOut">
               <a:rPr lang="en-US" smtClean="0"/>
-              <a:t>04/18/2019</a:t>
+              <a:t>04/19/2019</a:t>
             </a:fld>
             <a:endParaRPr lang="en-US"/>
           </a:p>
@@ -229,7 +1460,7 @@
           </a:ln>
         </p:spPr>
         <p:txBody>
-          <a:bodyPr vert="horz" lIns="91440" tIns="45720" rIns="91440" bIns="45720" rtlCol="0" anchor="ctr"/>
+          <a:bodyPr vert="horz" lIns="91434" tIns="45717" rIns="91434" bIns="45717" rtlCol="0" anchor="ctr"/>
           <a:lstStyle/>
           <a:p>
             <a:endParaRPr lang="en-US"/>
@@ -256,7 +1487,7 @@
           </a:prstGeom>
         </p:spPr>
         <p:txBody>
-          <a:bodyPr vert="horz" lIns="91440" tIns="45720" rIns="91440" bIns="45720" rtlCol="0"/>
+          <a:bodyPr vert="horz" lIns="91434" tIns="45717" rIns="91434" bIns="45717" rtlCol="0"/>
           <a:lstStyle/>
           <a:p>
             <a:pPr lvl="0"/>
@@ -316,7 +1547,7 @@
           </a:prstGeom>
         </p:spPr>
         <p:txBody>
-          <a:bodyPr vert="horz" lIns="91440" tIns="45720" rIns="91440" bIns="45720" rtlCol="0" anchor="b"/>
+          <a:bodyPr vert="horz" lIns="91434" tIns="45717" rIns="91434" bIns="45717" rtlCol="0" anchor="b"/>
           <a:lstStyle>
             <a:lvl1pPr algn="l">
               <a:defRPr sz="1200"/>
@@ -347,7 +1578,7 @@
           </a:prstGeom>
         </p:spPr>
         <p:txBody>
-          <a:bodyPr vert="horz" lIns="91440" tIns="45720" rIns="91440" bIns="45720" rtlCol="0" anchor="b"/>
+          <a:bodyPr vert="horz" lIns="91434" tIns="45717" rIns="91434" bIns="45717" rtlCol="0" anchor="b"/>
           <a:lstStyle>
             <a:lvl1pPr algn="r">
               <a:defRPr sz="1200"/>
@@ -511,20 +1742,10 @@
           <a:p>
             <a:r>
               <a:rPr lang="en-US" dirty="0" smtClean="0"/>
-              <a:t>We’re in a speedboat race</a:t>
-            </a:r>
-            <a:r>
-              <a:rPr lang="en-US" baseline="0" dirty="0" smtClean="0"/>
-              <a:t> but </a:t>
-            </a:r>
-            <a:r>
-              <a:rPr lang="en-US" baseline="0" smtClean="0"/>
-              <a:t>we’re running </a:t>
-            </a:r>
-            <a:r>
-              <a:rPr lang="en-US" baseline="0" dirty="0" smtClean="0"/>
-              <a:t>one of our engines at less than 50 percent and we’ve inadvertently attached an anchor to the boat.</a:t>
-            </a:r>
+              <a:t>We’re in a speedboat race but we’re running one of our engines at less than 50 percent and we’ve inadvertently attached an anchor to the boat.</a:t>
+            </a:r>
+          </a:p>
+          <a:p>
             <a:endParaRPr lang="en-US" dirty="0"/>
           </a:p>
         </p:txBody>
@@ -546,7 +1767,7 @@
           <a:p>
             <a:fld id="{859DE06D-F133-4988-97F6-9372E6CBBFD7}" type="slidenum">
               <a:rPr lang="en-US" smtClean="0"/>
-              <a:t>4</a:t>
+              <a:t>6</a:t>
             </a:fld>
             <a:endParaRPr lang="en-US"/>
           </a:p>
@@ -555,7 +1776,7 @@
     </p:spTree>
     <p:extLst>
       <p:ext uri="{BB962C8B-B14F-4D97-AF65-F5344CB8AC3E}">
-        <p14:creationId xmlns:p14="http://schemas.microsoft.com/office/powerpoint/2010/main" val="3763798351"/>
+        <p14:creationId xmlns:p14="http://schemas.microsoft.com/office/powerpoint/2010/main" val="127021458"/>
       </p:ext>
     </p:extLst>
   </p:cSld>
@@ -746,7 +1967,7 @@
           <a:p>
             <a:fld id="{7A82E564-8FF3-43DC-B0C7-D811F2D95778}" type="datetimeFigureOut">
               <a:rPr lang="en-US" smtClean="0"/>
-              <a:t>04/18/2019</a:t>
+              <a:t>04/19/2019</a:t>
             </a:fld>
             <a:endParaRPr lang="en-US"/>
           </a:p>
@@ -916,7 +2137,7 @@
           <a:p>
             <a:fld id="{7A82E564-8FF3-43DC-B0C7-D811F2D95778}" type="datetimeFigureOut">
               <a:rPr lang="en-US" smtClean="0"/>
-              <a:t>04/18/2019</a:t>
+              <a:t>04/19/2019</a:t>
             </a:fld>
             <a:endParaRPr lang="en-US"/>
           </a:p>
@@ -1096,7 +2317,7 @@
           <a:p>
             <a:fld id="{7A82E564-8FF3-43DC-B0C7-D811F2D95778}" type="datetimeFigureOut">
               <a:rPr lang="en-US" smtClean="0"/>
-              <a:t>04/18/2019</a:t>
+              <a:t>04/19/2019</a:t>
             </a:fld>
             <a:endParaRPr lang="en-US"/>
           </a:p>
@@ -1266,7 +2487,7 @@
           <a:p>
             <a:fld id="{7A82E564-8FF3-43DC-B0C7-D811F2D95778}" type="datetimeFigureOut">
               <a:rPr lang="en-US" smtClean="0"/>
-              <a:t>04/18/2019</a:t>
+              <a:t>04/19/2019</a:t>
             </a:fld>
             <a:endParaRPr lang="en-US"/>
           </a:p>
@@ -1512,7 +2733,7 @@
           <a:p>
             <a:fld id="{7A82E564-8FF3-43DC-B0C7-D811F2D95778}" type="datetimeFigureOut">
               <a:rPr lang="en-US" smtClean="0"/>
-              <a:t>04/18/2019</a:t>
+              <a:t>04/19/2019</a:t>
             </a:fld>
             <a:endParaRPr lang="en-US"/>
           </a:p>
@@ -1800,7 +3021,7 @@
           <a:p>
             <a:fld id="{7A82E564-8FF3-43DC-B0C7-D811F2D95778}" type="datetimeFigureOut">
               <a:rPr lang="en-US" smtClean="0"/>
-              <a:t>04/18/2019</a:t>
+              <a:t>04/19/2019</a:t>
             </a:fld>
             <a:endParaRPr lang="en-US"/>
           </a:p>
@@ -2227,7 +3448,7 @@
           <a:p>
             <a:fld id="{7A82E564-8FF3-43DC-B0C7-D811F2D95778}" type="datetimeFigureOut">
               <a:rPr lang="en-US" smtClean="0"/>
-              <a:t>04/18/2019</a:t>
+              <a:t>04/19/2019</a:t>
             </a:fld>
             <a:endParaRPr lang="en-US"/>
           </a:p>
@@ -2345,7 +3566,7 @@
           <a:p>
             <a:fld id="{7A82E564-8FF3-43DC-B0C7-D811F2D95778}" type="datetimeFigureOut">
               <a:rPr lang="en-US" smtClean="0"/>
-              <a:t>04/18/2019</a:t>
+              <a:t>04/19/2019</a:t>
             </a:fld>
             <a:endParaRPr lang="en-US"/>
           </a:p>
@@ -2440,7 +3661,7 @@
           <a:p>
             <a:fld id="{7A82E564-8FF3-43DC-B0C7-D811F2D95778}" type="datetimeFigureOut">
               <a:rPr lang="en-US" smtClean="0"/>
-              <a:t>04/18/2019</a:t>
+              <a:t>04/19/2019</a:t>
             </a:fld>
             <a:endParaRPr lang="en-US"/>
           </a:p>
@@ -2717,7 +3938,7 @@
           <a:p>
             <a:fld id="{7A82E564-8FF3-43DC-B0C7-D811F2D95778}" type="datetimeFigureOut">
               <a:rPr lang="en-US" smtClean="0"/>
-              <a:t>04/18/2019</a:t>
+              <a:t>04/19/2019</a:t>
             </a:fld>
             <a:endParaRPr lang="en-US"/>
           </a:p>
@@ -2970,7 +4191,7 @@
           <a:p>
             <a:fld id="{7A82E564-8FF3-43DC-B0C7-D811F2D95778}" type="datetimeFigureOut">
               <a:rPr lang="en-US" smtClean="0"/>
-              <a:t>04/18/2019</a:t>
+              <a:t>04/19/2019</a:t>
             </a:fld>
             <a:endParaRPr lang="en-US"/>
           </a:p>
@@ -3183,7 +4404,7 @@
           <a:p>
             <a:fld id="{7A82E564-8FF3-43DC-B0C7-D811F2D95778}" type="datetimeFigureOut">
               <a:rPr lang="en-US" smtClean="0"/>
-              <a:t>04/18/2019</a:t>
+              <a:t>04/19/2019</a:t>
             </a:fld>
             <a:endParaRPr lang="en-US"/>
           </a:p>
@@ -3583,7 +4804,15 @@
             <a:pPr algn="ctr"/>
             <a:r>
               <a:rPr lang="en-US" sz="3200" b="1" dirty="0" smtClean="0"/>
-              <a:t>Rethinking the Set-Aside Requirement of the </a:t>
+              <a:t>Rethinking </a:t>
+            </a:r>
+            <a:r>
+              <a:rPr lang="en-US" sz="3200" b="1" dirty="0" smtClean="0"/>
+              <a:t>the Set-Aside Requirement of the </a:t>
+            </a:r>
+            <a:r>
+              <a:rPr lang="en-US" sz="3200" b="1" dirty="0" smtClean="0"/>
+              <a:t/>
             </a:r>
             <a:br>
               <a:rPr lang="en-US" sz="3200" b="1" dirty="0" smtClean="0"/>
@@ -3652,6 +4881,13 @@
   <p:clrMapOvr>
     <a:masterClrMapping/>
   </p:clrMapOvr>
+  <p:timing>
+    <p:tnLst>
+      <p:par>
+        <p:cTn id="1" dur="indefinite" restart="never" nodeType="tmRoot"/>
+      </p:par>
+    </p:tnLst>
+  </p:timing>
 </p:sld>
 </file>
 
@@ -3672,100 +4908,30 @@
           <a:chExt cx="0" cy="0"/>
         </a:xfrm>
       </p:grpSpPr>
-      <p:sp>
-        <p:nvSpPr>
-          <p:cNvPr id="2" name="TextBox 1"/>
-          <p:cNvSpPr txBox="1"/>
-          <p:nvPr/>
-        </p:nvSpPr>
-        <p:spPr>
-          <a:xfrm>
-            <a:off x="457200" y="5219700"/>
-            <a:ext cx="8229600" cy="338554"/>
-          </a:xfrm>
-          <a:prstGeom prst="rect">
-            <a:avLst/>
-          </a:prstGeom>
-          <a:noFill/>
-        </p:spPr>
-        <p:txBody>
-          <a:bodyPr wrap="square" rtlCol="0">
-            <a:spAutoFit/>
-          </a:bodyPr>
-          <a:lstStyle/>
-          <a:p>
-            <a:r>
-              <a:rPr lang="en-US" sz="1600" dirty="0" smtClean="0"/>
-              <a:t>Source:  www.sbir.gov</a:t>
-            </a:r>
-            <a:endParaRPr lang="en-US" sz="1600" dirty="0"/>
-          </a:p>
-        </p:txBody>
-      </p:sp>
-      <p:pic>
-        <p:nvPicPr>
-          <p:cNvPr id="1029" name="Picture 5"/>
-          <p:cNvPicPr>
-            <a:picLocks noChangeAspect="1" noChangeArrowheads="1"/>
-          </p:cNvPicPr>
-          <p:nvPr/>
-        </p:nvPicPr>
-        <p:blipFill>
-          <a:blip r:embed="rId2">
-            <a:extLst>
-              <a:ext uri="{28A0092B-C50C-407E-A947-70E740481C1C}">
-                <a14:useLocalDpi xmlns:a14="http://schemas.microsoft.com/office/drawing/2010/main" val="0"/>
-              </a:ext>
-            </a:extLst>
-          </a:blip>
-          <a:srcRect/>
-          <a:stretch>
-            <a:fillRect/>
-          </a:stretch>
-        </p:blipFill>
-        <p:spPr bwMode="auto">
-          <a:xfrm>
-            <a:off x="524456" y="365760"/>
-            <a:ext cx="8095088" cy="4846320"/>
-          </a:xfrm>
-          <a:prstGeom prst="rect">
-            <a:avLst/>
-          </a:prstGeom>
-          <a:noFill/>
-          <a:ln>
-            <a:noFill/>
-          </a:ln>
-          <a:effectLst/>
-          <a:extLst>
-            <a:ext uri="{909E8E84-426E-40DD-AFC4-6F175D3DCCD1}">
-              <a14:hiddenFill xmlns:a14="http://schemas.microsoft.com/office/drawing/2010/main">
-                <a:solidFill>
-                  <a:schemeClr val="accent1"/>
-                </a:solidFill>
-              </a14:hiddenFill>
-            </a:ext>
-            <a:ext uri="{91240B29-F687-4F45-9708-019B960494DF}">
-              <a14:hiddenLine xmlns:a14="http://schemas.microsoft.com/office/drawing/2010/main" w="9525">
-                <a:solidFill>
-                  <a:schemeClr val="tx1"/>
-                </a:solidFill>
-                <a:miter lim="800000"/>
-                <a:headEnd/>
-                <a:tailEnd/>
-              </a14:hiddenLine>
-            </a:ext>
-            <a:ext uri="{AF507438-7753-43E0-B8FC-AC1667EBCBE1}">
-              <a14:hiddenEffects xmlns:a14="http://schemas.microsoft.com/office/drawing/2010/main">
-                <a:effectLst>
-                  <a:outerShdw dist="35921" dir="2700000" algn="ctr" rotWithShape="0">
-                    <a:schemeClr val="bg2"/>
-                  </a:outerShdw>
-                </a:effectLst>
-              </a14:hiddenEffects>
-            </a:ext>
-          </a:extLst>
-        </p:spPr>
-      </p:pic>
+      <p:graphicFrame>
+        <p:nvGraphicFramePr>
+          <p:cNvPr id="4" name="Chart 3"/>
+          <p:cNvGraphicFramePr>
+            <a:graphicFrameLocks/>
+          </p:cNvGraphicFramePr>
+          <p:nvPr>
+            <p:extLst>
+              <p:ext uri="{D42A27DB-BD31-4B8C-83A1-F6EECF244321}">
+                <p14:modId xmlns:p14="http://schemas.microsoft.com/office/powerpoint/2010/main" val="141705039"/>
+              </p:ext>
+            </p:extLst>
+          </p:nvPr>
+        </p:nvGraphicFramePr>
+        <p:xfrm>
+          <a:off x="548640" y="365760"/>
+          <a:ext cx="8046720" cy="4846320"/>
+        </p:xfrm>
+        <a:graphic>
+          <a:graphicData uri="http://schemas.openxmlformats.org/drawingml/2006/chart">
+            <c:chart xmlns:c="http://schemas.openxmlformats.org/drawingml/2006/chart" xmlns:r="http://schemas.openxmlformats.org/officeDocument/2006/relationships" r:id="rId2"/>
+          </a:graphicData>
+        </a:graphic>
+      </p:graphicFrame>
     </p:spTree>
     <p:extLst>
       <p:ext uri="{BB962C8B-B14F-4D97-AF65-F5344CB8AC3E}">
@@ -3776,6 +4942,13 @@
   <p:clrMapOvr>
     <a:masterClrMapping/>
   </p:clrMapOvr>
+  <p:timing>
+    <p:tnLst>
+      <p:par>
+        <p:cTn id="1" dur="indefinite" restart="never" nodeType="tmRoot"/>
+      </p:par>
+    </p:tnLst>
+  </p:timing>
 </p:sld>
 </file>
 
@@ -3870,6 +5043,13 @@
   <p:clrMapOvr>
     <a:masterClrMapping/>
   </p:clrMapOvr>
+  <p:timing>
+    <p:tnLst>
+      <p:par>
+        <p:cTn id="1" dur="indefinite" restart="never" nodeType="tmRoot"/>
+      </p:par>
+    </p:tnLst>
+  </p:timing>
 </p:sld>
 </file>
 
@@ -3890,17 +5070,90 @@
           <a:chExt cx="0" cy="0"/>
         </a:xfrm>
       </p:grpSpPr>
+      <p:graphicFrame>
+        <p:nvGraphicFramePr>
+          <p:cNvPr id="2" name="Chart 1"/>
+          <p:cNvGraphicFramePr>
+            <a:graphicFrameLocks/>
+          </p:cNvGraphicFramePr>
+          <p:nvPr>
+            <p:extLst>
+              <p:ext uri="{D42A27DB-BD31-4B8C-83A1-F6EECF244321}">
+                <p14:modId xmlns:p14="http://schemas.microsoft.com/office/powerpoint/2010/main" val="461872040"/>
+              </p:ext>
+            </p:extLst>
+          </p:nvPr>
+        </p:nvGraphicFramePr>
+        <p:xfrm>
+          <a:off x="766762" y="365760"/>
+          <a:ext cx="7610476" cy="4846320"/>
+        </p:xfrm>
+        <a:graphic>
+          <a:graphicData uri="http://schemas.openxmlformats.org/drawingml/2006/chart">
+            <c:chart xmlns:c="http://schemas.openxmlformats.org/drawingml/2006/chart" xmlns:r="http://schemas.openxmlformats.org/officeDocument/2006/relationships" r:id="rId2"/>
+          </a:graphicData>
+        </a:graphic>
+      </p:graphicFrame>
+    </p:spTree>
+    <p:extLst>
+      <p:ext uri="{BB962C8B-B14F-4D97-AF65-F5344CB8AC3E}">
+        <p14:creationId xmlns:p14="http://schemas.microsoft.com/office/powerpoint/2010/main" val="4043928245"/>
+      </p:ext>
+    </p:extLst>
+  </p:cSld>
+  <p:clrMapOvr>
+    <a:masterClrMapping/>
+  </p:clrMapOvr>
+  <p:timing>
+    <p:tnLst>
+      <p:par>
+        <p:cTn id="1" dur="indefinite" restart="never" nodeType="tmRoot"/>
+      </p:par>
+    </p:tnLst>
+  </p:timing>
+</p:sld>
+</file>
+
+<file path=ppt/slides/slide5.xml><?xml version="1.0" encoding="utf-8"?>
+<p:sld xmlns:a="http://schemas.openxmlformats.org/drawingml/2006/main" xmlns:r="http://schemas.openxmlformats.org/officeDocument/2006/relationships" xmlns:p="http://schemas.openxmlformats.org/presentationml/2006/main">
+  <p:cSld>
+    <p:spTree>
+      <p:nvGrpSpPr>
+        <p:cNvPr id="1" name=""/>
+        <p:cNvGrpSpPr/>
+        <p:nvPr/>
+      </p:nvGrpSpPr>
+      <p:grpSpPr>
+        <a:xfrm>
+          <a:off x="0" y="0"/>
+          <a:ext cx="0" cy="0"/>
+          <a:chOff x="0" y="0"/>
+          <a:chExt cx="0" cy="0"/>
+        </a:xfrm>
+      </p:grpSpPr>
       <p:pic>
         <p:nvPicPr>
-          <p:cNvPr id="3074" name="Picture 2"/>
+          <p:cNvPr id="1026" name="Picture 2"/>
           <p:cNvPicPr>
             <a:picLocks noChangeAspect="1" noChangeArrowheads="1"/>
           </p:cNvPicPr>
           <p:nvPr/>
         </p:nvPicPr>
         <p:blipFill>
-          <a:blip r:embed="rId3">
+          <a:blip r:embed="rId2" cstate="print">
             <a:extLst>
+              <a:ext uri="{BEBA8EAE-BF5A-486C-A8C5-ECC9F3942E4B}">
+                <a14:imgProps xmlns:a14="http://schemas.microsoft.com/office/drawing/2010/main">
+                  <a14:imgLayer r:embed="rId3">
+                    <a14:imgEffect>
+                      <a14:artisticPhotocopy/>
+                    </a14:imgEffect>
+                    <a14:imgEffect>
+                      <a14:colorTemperature colorTemp="6875"/>
+                    </a14:imgEffect>
+                  </a14:imgLayer>
+                </a14:imgProps>
+              </a:ext>
               <a:ext uri="{28A0092B-C50C-407E-A947-70E740481C1C}">
                 <a14:useLocalDpi xmlns:a14="http://schemas.microsoft.com/office/drawing/2010/main" val="0"/>
               </a:ext>
@@ -3912,9 +5165,9 @@
           </a:stretch>
         </p:blipFill>
         <p:spPr bwMode="auto">
-          <a:xfrm flipH="1">
-            <a:off x="228600" y="476258"/>
-            <a:ext cx="8686800" cy="3122508"/>
+          <a:xfrm>
+            <a:off x="3200400" y="2009363"/>
+            <a:ext cx="2743200" cy="1696275"/>
           </a:xfrm>
           <a:prstGeom prst="rect">
             <a:avLst/>
@@ -3944,166 +5197,916 @@
           </a:extLst>
         </p:spPr>
       </p:pic>
+      <p:sp>
+        <p:nvSpPr>
+          <p:cNvPr id="2" name="Right Arrow 1"/>
+          <p:cNvSpPr/>
+          <p:nvPr/>
+        </p:nvSpPr>
+        <p:spPr>
+          <a:xfrm>
+            <a:off x="1219200" y="2217420"/>
+            <a:ext cx="1828800" cy="1280160"/>
+          </a:xfrm>
+          <a:prstGeom prst="rightArrow">
+            <a:avLst/>
+          </a:prstGeom>
+        </p:spPr>
+        <p:style>
+          <a:lnRef idx="2">
+            <a:schemeClr val="accent1">
+              <a:shade val="50000"/>
+            </a:schemeClr>
+          </a:lnRef>
+          <a:fillRef idx="1">
+            <a:schemeClr val="accent1"/>
+          </a:fillRef>
+          <a:effectRef idx="0">
+            <a:schemeClr val="accent1"/>
+          </a:effectRef>
+          <a:fontRef idx="minor">
+            <a:schemeClr val="lt1"/>
+          </a:fontRef>
+        </p:style>
+        <p:txBody>
+          <a:bodyPr rtlCol="0" anchor="ctr"/>
+          <a:lstStyle/>
+          <a:p>
+            <a:pPr algn="ctr"/>
+            <a:r>
+              <a:rPr lang="en-US" dirty="0" smtClean="0"/>
+              <a:t>Techno-criminals</a:t>
+            </a:r>
+            <a:endParaRPr lang="en-US" dirty="0"/>
+          </a:p>
+        </p:txBody>
+      </p:sp>
+      <p:sp>
+        <p:nvSpPr>
+          <p:cNvPr id="4" name="Right Arrow 3"/>
+          <p:cNvSpPr/>
+          <p:nvPr/>
+        </p:nvSpPr>
+        <p:spPr>
+          <a:xfrm flipH="1">
+            <a:off x="6019800" y="2204831"/>
+            <a:ext cx="1828800" cy="1280160"/>
+          </a:xfrm>
+          <a:prstGeom prst="rightArrow">
+            <a:avLst/>
+          </a:prstGeom>
+        </p:spPr>
+        <p:style>
+          <a:lnRef idx="2">
+            <a:schemeClr val="accent1">
+              <a:shade val="50000"/>
+            </a:schemeClr>
+          </a:lnRef>
+          <a:fillRef idx="1">
+            <a:schemeClr val="accent1"/>
+          </a:fillRef>
+          <a:effectRef idx="0">
+            <a:schemeClr val="accent1"/>
+          </a:effectRef>
+          <a:fontRef idx="minor">
+            <a:schemeClr val="lt1"/>
+          </a:fontRef>
+        </p:style>
+        <p:txBody>
+          <a:bodyPr rtlCol="0" anchor="ctr"/>
+          <a:lstStyle/>
+          <a:p>
+            <a:pPr algn="ctr"/>
+            <a:r>
+              <a:rPr lang="en-US" dirty="0" smtClean="0"/>
+              <a:t>Tyrants</a:t>
+            </a:r>
+            <a:endParaRPr lang="en-US" dirty="0"/>
+          </a:p>
+        </p:txBody>
+      </p:sp>
+      <p:sp>
+        <p:nvSpPr>
+          <p:cNvPr id="3" name="Down Arrow 2"/>
+          <p:cNvSpPr/>
+          <p:nvPr/>
+        </p:nvSpPr>
+        <p:spPr>
+          <a:xfrm>
+            <a:off x="3931920" y="86471"/>
+            <a:ext cx="1280160" cy="1828800"/>
+          </a:xfrm>
+          <a:prstGeom prst="downArrow">
+            <a:avLst/>
+          </a:prstGeom>
+        </p:spPr>
+        <p:style>
+          <a:lnRef idx="2">
+            <a:schemeClr val="accent1">
+              <a:shade val="50000"/>
+            </a:schemeClr>
+          </a:lnRef>
+          <a:fillRef idx="1">
+            <a:schemeClr val="accent1"/>
+          </a:fillRef>
+          <a:effectRef idx="0">
+            <a:schemeClr val="accent1"/>
+          </a:effectRef>
+          <a:fontRef idx="minor">
+            <a:schemeClr val="lt1"/>
+          </a:fontRef>
+        </p:style>
+        <p:txBody>
+          <a:bodyPr vert="vert270" rtlCol="0" anchor="ctr"/>
+          <a:lstStyle/>
+          <a:p>
+            <a:pPr algn="ctr"/>
+            <a:r>
+              <a:rPr lang="en-US" dirty="0" smtClean="0"/>
+              <a:t>Temperature</a:t>
+            </a:r>
+            <a:endParaRPr lang="en-US" dirty="0"/>
+          </a:p>
+        </p:txBody>
+      </p:sp>
+      <p:sp>
+        <p:nvSpPr>
+          <p:cNvPr id="6" name="Down Arrow 5"/>
+          <p:cNvSpPr/>
+          <p:nvPr/>
+        </p:nvSpPr>
+        <p:spPr>
+          <a:xfrm flipV="1">
+            <a:off x="3931920" y="3771900"/>
+            <a:ext cx="1280160" cy="1828800"/>
+          </a:xfrm>
+          <a:prstGeom prst="downArrow">
+            <a:avLst/>
+          </a:prstGeom>
+        </p:spPr>
+        <p:style>
+          <a:lnRef idx="2">
+            <a:schemeClr val="accent1">
+              <a:shade val="50000"/>
+            </a:schemeClr>
+          </a:lnRef>
+          <a:fillRef idx="1">
+            <a:schemeClr val="accent1"/>
+          </a:fillRef>
+          <a:effectRef idx="0">
+            <a:schemeClr val="accent1"/>
+          </a:effectRef>
+          <a:fontRef idx="minor">
+            <a:schemeClr val="lt1"/>
+          </a:fontRef>
+        </p:style>
+        <p:txBody>
+          <a:bodyPr vert="vert" rtlCol="0" anchor="ctr"/>
+          <a:lstStyle/>
+          <a:p>
+            <a:pPr algn="ctr"/>
+            <a:r>
+              <a:rPr lang="en-US" dirty="0" smtClean="0"/>
+              <a:t>Terrorism</a:t>
+            </a:r>
+            <a:endParaRPr lang="en-US" dirty="0"/>
+          </a:p>
+        </p:txBody>
+      </p:sp>
+      <p:pic>
+        <p:nvPicPr>
+          <p:cNvPr id="1027" name="Picture 3" descr="C:\Users\townesm\AppData\Local\Temp\California_Drought_Dry_Riverbed_2009.jpg"/>
+          <p:cNvPicPr>
+            <a:picLocks noChangeAspect="1" noChangeArrowheads="1"/>
+          </p:cNvPicPr>
+          <p:nvPr/>
+        </p:nvPicPr>
+        <p:blipFill>
+          <a:blip r:embed="rId4" cstate="print">
+            <a:extLst>
+              <a:ext uri="{28A0092B-C50C-407E-A947-70E740481C1C}">
+                <a14:useLocalDpi xmlns:a14="http://schemas.microsoft.com/office/drawing/2010/main" val="0"/>
+              </a:ext>
+            </a:extLst>
+          </a:blip>
+          <a:srcRect/>
+          <a:stretch>
+            <a:fillRect/>
+          </a:stretch>
+        </p:blipFill>
+        <p:spPr bwMode="auto">
+          <a:xfrm>
+            <a:off x="2209800" y="-38100"/>
+            <a:ext cx="2011680" cy="1508760"/>
+          </a:xfrm>
+          <a:prstGeom prst="ellipse">
+            <a:avLst/>
+          </a:prstGeom>
+          <a:ln>
+            <a:noFill/>
+          </a:ln>
+          <a:effectLst>
+            <a:softEdge rad="112500"/>
+          </a:effectLst>
+          <a:extLst>
+            <a:ext uri="{909E8E84-426E-40DD-AFC4-6F175D3DCCD1}">
+              <a14:hiddenFill xmlns:a14="http://schemas.microsoft.com/office/drawing/2010/main">
+                <a:solidFill>
+                  <a:srgbClr val="FFFFFF"/>
+                </a:solidFill>
+              </a14:hiddenFill>
+            </a:ext>
+          </a:extLst>
+        </p:spPr>
+      </p:pic>
+      <p:pic>
+        <p:nvPicPr>
+          <p:cNvPr id="1028" name="Picture 4" descr="C:\Users\townesm\AppData\Local\Temp\North_face_south_tower_after_plane_strike_9-11.jpg"/>
+          <p:cNvPicPr>
+            <a:picLocks noChangeAspect="1" noChangeArrowheads="1"/>
+          </p:cNvPicPr>
+          <p:nvPr/>
+        </p:nvPicPr>
+        <p:blipFill>
+          <a:blip r:embed="rId5" cstate="print">
+            <a:extLst>
+              <a:ext uri="{28A0092B-C50C-407E-A947-70E740481C1C}">
+                <a14:useLocalDpi xmlns:a14="http://schemas.microsoft.com/office/drawing/2010/main" val="0"/>
+              </a:ext>
+            </a:extLst>
+          </a:blip>
+          <a:srcRect/>
+          <a:stretch>
+            <a:fillRect/>
+          </a:stretch>
+        </p:blipFill>
+        <p:spPr bwMode="auto">
+          <a:xfrm>
+            <a:off x="5196840" y="3687984"/>
+            <a:ext cx="1737360" cy="1996631"/>
+          </a:xfrm>
+          <a:prstGeom prst="ellipse">
+            <a:avLst/>
+          </a:prstGeom>
+          <a:ln>
+            <a:noFill/>
+          </a:ln>
+          <a:effectLst>
+            <a:softEdge rad="112500"/>
+          </a:effectLst>
+          <a:extLst>
+            <a:ext uri="{909E8E84-426E-40DD-AFC4-6F175D3DCCD1}">
+              <a14:hiddenFill xmlns:a14="http://schemas.microsoft.com/office/drawing/2010/main">
+                <a:solidFill>
+                  <a:srgbClr val="FFFFFF"/>
+                </a:solidFill>
+              </a14:hiddenFill>
+            </a:ext>
+          </a:extLst>
+        </p:spPr>
+      </p:pic>
+      <p:pic>
+        <p:nvPicPr>
+          <p:cNvPr id="1029" name="Picture 5" descr="C:\Users\townesm\AppData\Local\Temp\Vladimir_Putin_-_2006.jpg"/>
+          <p:cNvPicPr>
+            <a:picLocks noChangeAspect="1" noChangeArrowheads="1"/>
+          </p:cNvPicPr>
+          <p:nvPr/>
+        </p:nvPicPr>
+        <p:blipFill>
+          <a:blip r:embed="rId6" cstate="print">
+            <a:extLst>
+              <a:ext uri="{28A0092B-C50C-407E-A947-70E740481C1C}">
+                <a14:useLocalDpi xmlns:a14="http://schemas.microsoft.com/office/drawing/2010/main" val="0"/>
+              </a:ext>
+            </a:extLst>
+          </a:blip>
+          <a:srcRect/>
+          <a:stretch>
+            <a:fillRect/>
+          </a:stretch>
+        </p:blipFill>
+        <p:spPr bwMode="auto">
+          <a:xfrm>
+            <a:off x="6575679" y="571500"/>
+            <a:ext cx="1272921" cy="1828800"/>
+          </a:xfrm>
+          <a:prstGeom prst="ellipse">
+            <a:avLst/>
+          </a:prstGeom>
+          <a:ln>
+            <a:noFill/>
+          </a:ln>
+          <a:effectLst>
+            <a:softEdge rad="50800"/>
+          </a:effectLst>
+          <a:extLst>
+            <a:ext uri="{909E8E84-426E-40DD-AFC4-6F175D3DCCD1}">
+              <a14:hiddenFill xmlns:a14="http://schemas.microsoft.com/office/drawing/2010/main">
+                <a:solidFill>
+                  <a:srgbClr val="FFFFFF"/>
+                </a:solidFill>
+              </a14:hiddenFill>
+            </a:ext>
+          </a:extLst>
+        </p:spPr>
+      </p:pic>
+      <p:pic>
+        <p:nvPicPr>
+          <p:cNvPr id="1031" name="Picture 7" descr="Image result for hacking"/>
+          <p:cNvPicPr>
+            <a:picLocks noChangeAspect="1" noChangeArrowheads="1"/>
+          </p:cNvPicPr>
+          <p:nvPr/>
+        </p:nvPicPr>
+        <p:blipFill>
+          <a:blip r:embed="rId7" cstate="print">
+            <a:extLst>
+              <a:ext uri="{28A0092B-C50C-407E-A947-70E740481C1C}">
+                <a14:useLocalDpi xmlns:a14="http://schemas.microsoft.com/office/drawing/2010/main" val="0"/>
+              </a:ext>
+            </a:extLst>
+          </a:blip>
+          <a:srcRect/>
+          <a:stretch>
+            <a:fillRect/>
+          </a:stretch>
+        </p:blipFill>
+        <p:spPr bwMode="auto">
+          <a:xfrm>
+            <a:off x="457200" y="3467100"/>
+            <a:ext cx="2743200" cy="1541955"/>
+          </a:xfrm>
+          <a:prstGeom prst="ellipse">
+            <a:avLst/>
+          </a:prstGeom>
+          <a:ln>
+            <a:noFill/>
+          </a:ln>
+          <a:effectLst>
+            <a:softEdge rad="112500"/>
+          </a:effectLst>
+          <a:extLst>
+            <a:ext uri="{909E8E84-426E-40DD-AFC4-6F175D3DCCD1}">
+              <a14:hiddenFill xmlns:a14="http://schemas.microsoft.com/office/drawing/2010/main">
+                <a:solidFill>
+                  <a:srgbClr val="FFFFFF"/>
+                </a:solidFill>
+              </a14:hiddenFill>
+            </a:ext>
+          </a:extLst>
+        </p:spPr>
+      </p:pic>
     </p:spTree>
     <p:extLst>
       <p:ext uri="{BB962C8B-B14F-4D97-AF65-F5344CB8AC3E}">
-        <p14:creationId xmlns:p14="http://schemas.microsoft.com/office/powerpoint/2010/main" val="2931676847"/>
+        <p14:creationId xmlns:p14="http://schemas.microsoft.com/office/powerpoint/2010/main" val="323551904"/>
       </p:ext>
     </p:extLst>
   </p:cSld>
   <p:clrMapOvr>
     <a:masterClrMapping/>
   </p:clrMapOvr>
-</p:sld>
-</file>
-
-<file path=ppt/slides/slide5.xml><?xml version="1.0" encoding="utf-8"?>
-<p:sld xmlns:a="http://schemas.openxmlformats.org/drawingml/2006/main" xmlns:r="http://schemas.openxmlformats.org/officeDocument/2006/relationships" xmlns:p="http://schemas.openxmlformats.org/presentationml/2006/main">
-  <p:cSld>
-    <p:spTree>
-      <p:nvGrpSpPr>
-        <p:cNvPr id="1" name=""/>
-        <p:cNvGrpSpPr/>
-        <p:nvPr/>
-      </p:nvGrpSpPr>
-      <p:grpSpPr>
-        <a:xfrm>
-          <a:off x="0" y="0"/>
-          <a:ext cx="0" cy="0"/>
-          <a:chOff x="0" y="0"/>
-          <a:chExt cx="0" cy="0"/>
-        </a:xfrm>
-      </p:grpSpPr>
-      <p:sp>
-        <p:nvSpPr>
-          <p:cNvPr id="2" name="TextBox 1"/>
-          <p:cNvSpPr txBox="1"/>
-          <p:nvPr/>
-        </p:nvSpPr>
-        <p:spPr>
-          <a:xfrm>
-            <a:off x="0" y="266700"/>
-            <a:ext cx="9144000" cy="461665"/>
-          </a:xfrm>
-          <a:prstGeom prst="rect">
-            <a:avLst/>
-          </a:prstGeom>
-          <a:noFill/>
-        </p:spPr>
-        <p:txBody>
-          <a:bodyPr wrap="square" rtlCol="0">
-            <a:spAutoFit/>
-          </a:bodyPr>
-          <a:lstStyle/>
-          <a:p>
-            <a:pPr algn="ctr"/>
-            <a:r>
-              <a:rPr lang="en-US" sz="2400" dirty="0" smtClean="0"/>
-              <a:t>Proposed Policy Change</a:t>
-            </a:r>
-            <a:endParaRPr lang="en-US" sz="2400" dirty="0"/>
-          </a:p>
-        </p:txBody>
-      </p:sp>
-      <p:sp>
-        <p:nvSpPr>
-          <p:cNvPr id="3" name="TextBox 2"/>
-          <p:cNvSpPr txBox="1"/>
-          <p:nvPr/>
-        </p:nvSpPr>
-        <p:spPr>
-          <a:xfrm>
-            <a:off x="0" y="1007715"/>
-            <a:ext cx="9144000" cy="2177519"/>
-          </a:xfrm>
-          <a:prstGeom prst="rect">
-            <a:avLst/>
-          </a:prstGeom>
-          <a:noFill/>
-        </p:spPr>
-        <p:txBody>
-          <a:bodyPr wrap="square" lIns="457200" rIns="457200" rtlCol="0">
-            <a:spAutoFit/>
-          </a:bodyPr>
-          <a:lstStyle/>
-          <a:p>
-            <a:pPr marL="342900" indent="-342900">
-              <a:lnSpc>
-                <a:spcPct val="114000"/>
-              </a:lnSpc>
-              <a:buFont typeface="Arial" panose="020B0604020202020204" pitchFamily="34" charset="0"/>
-              <a:buChar char="•"/>
-            </a:pPr>
-            <a:r>
-              <a:rPr lang="en-US" sz="2000" dirty="0" smtClean="0"/>
-              <a:t>Eliminate the minimum set-aside.</a:t>
-            </a:r>
-          </a:p>
-          <a:p>
-            <a:pPr marL="342900" indent="-342900">
-              <a:lnSpc>
-                <a:spcPct val="114000"/>
-              </a:lnSpc>
-              <a:buFont typeface="Arial" panose="020B0604020202020204" pitchFamily="34" charset="0"/>
-              <a:buChar char="•"/>
-            </a:pPr>
-            <a:r>
-              <a:rPr lang="en-US" sz="2000" dirty="0" smtClean="0"/>
-              <a:t>Establish bi-monthly submission cycles.</a:t>
-            </a:r>
-          </a:p>
-          <a:p>
-            <a:pPr marL="342900" indent="-342900">
-              <a:lnSpc>
-                <a:spcPct val="114000"/>
-              </a:lnSpc>
-              <a:buFont typeface="Arial" panose="020B0604020202020204" pitchFamily="34" charset="0"/>
-              <a:buChar char="•"/>
-            </a:pPr>
-            <a:r>
-              <a:rPr lang="en-US" sz="2000" dirty="0" smtClean="0"/>
-              <a:t>Fund up to the top 50 percent of the proposals that meet minimum criteria during each submission cycle.</a:t>
-            </a:r>
-          </a:p>
-          <a:p>
-            <a:pPr marL="342900" indent="-342900">
-              <a:lnSpc>
-                <a:spcPct val="114000"/>
-              </a:lnSpc>
-              <a:buFont typeface="Arial" panose="020B0604020202020204" pitchFamily="34" charset="0"/>
-              <a:buChar char="•"/>
-            </a:pPr>
-            <a:r>
-              <a:rPr lang="en-US" sz="2000" dirty="0" smtClean="0"/>
-              <a:t>Allow re-submission of proposals not funded.</a:t>
-            </a:r>
-          </a:p>
-          <a:p>
-            <a:pPr marL="342900" indent="-342900">
-              <a:lnSpc>
-                <a:spcPct val="114000"/>
-              </a:lnSpc>
-              <a:buFont typeface="Arial" panose="020B0604020202020204" pitchFamily="34" charset="0"/>
-              <a:buChar char="•"/>
-            </a:pPr>
-            <a:r>
-              <a:rPr lang="en-US" sz="2000" dirty="0" smtClean="0"/>
-              <a:t>Cap annual funding at 30% of extramural R&amp;D funding. </a:t>
-            </a:r>
-            <a:endParaRPr lang="en-US" sz="2400" dirty="0"/>
-          </a:p>
-        </p:txBody>
-      </p:sp>
-    </p:spTree>
-    <p:extLst>
-      <p:ext uri="{BB962C8B-B14F-4D97-AF65-F5344CB8AC3E}">
-        <p14:creationId xmlns:p14="http://schemas.microsoft.com/office/powerpoint/2010/main" val="886274995"/>
-      </p:ext>
-    </p:extLst>
-  </p:cSld>
-  <p:clrMapOvr>
-    <a:masterClrMapping/>
-  </p:clrMapOvr>
+  <p:timing>
+    <p:tnLst>
+      <p:par>
+        <p:cTn id="1" dur="indefinite" restart="never" nodeType="tmRoot">
+          <p:childTnLst>
+            <p:seq concurrent="1" nextAc="seek">
+              <p:cTn id="2" dur="indefinite" nodeType="mainSeq">
+                <p:childTnLst>
+                  <p:par>
+                    <p:cTn id="3" fill="hold">
+                      <p:stCondLst>
+                        <p:cond delay="indefinite"/>
+                      </p:stCondLst>
+                      <p:childTnLst>
+                        <p:par>
+                          <p:cTn id="4" fill="hold">
+                            <p:stCondLst>
+                              <p:cond delay="0"/>
+                            </p:stCondLst>
+                            <p:childTnLst>
+                              <p:par>
+                                <p:cTn id="5" presetID="2" presetClass="entr" presetSubtype="2" fill="hold" grpId="0" nodeType="clickEffect">
+                                  <p:stCondLst>
+                                    <p:cond delay="0"/>
+                                  </p:stCondLst>
+                                  <p:childTnLst>
+                                    <p:set>
+                                      <p:cBhvr>
+                                        <p:cTn id="6" dur="1" fill="hold">
+                                          <p:stCondLst>
+                                            <p:cond delay="0"/>
+                                          </p:stCondLst>
+                                        </p:cTn>
+                                        <p:tgtEl>
+                                          <p:spTgt spid="4"/>
+                                        </p:tgtEl>
+                                        <p:attrNameLst>
+                                          <p:attrName>style.visibility</p:attrName>
+                                        </p:attrNameLst>
+                                      </p:cBhvr>
+                                      <p:to>
+                                        <p:strVal val="visible"/>
+                                      </p:to>
+                                    </p:set>
+                                    <p:anim calcmode="lin" valueType="num">
+                                      <p:cBhvr additive="base">
+                                        <p:cTn id="7" dur="500" fill="hold"/>
+                                        <p:tgtEl>
+                                          <p:spTgt spid="4"/>
+                                        </p:tgtEl>
+                                        <p:attrNameLst>
+                                          <p:attrName>ppt_x</p:attrName>
+                                        </p:attrNameLst>
+                                      </p:cBhvr>
+                                      <p:tavLst>
+                                        <p:tav tm="0">
+                                          <p:val>
+                                            <p:strVal val="1+#ppt_w/2"/>
+                                          </p:val>
+                                        </p:tav>
+                                        <p:tav tm="100000">
+                                          <p:val>
+                                            <p:strVal val="#ppt_x"/>
+                                          </p:val>
+                                        </p:tav>
+                                      </p:tavLst>
+                                    </p:anim>
+                                    <p:anim calcmode="lin" valueType="num">
+                                      <p:cBhvr additive="base">
+                                        <p:cTn id="8" dur="500" fill="hold"/>
+                                        <p:tgtEl>
+                                          <p:spTgt spid="4"/>
+                                        </p:tgtEl>
+                                        <p:attrNameLst>
+                                          <p:attrName>ppt_y</p:attrName>
+                                        </p:attrNameLst>
+                                      </p:cBhvr>
+                                      <p:tavLst>
+                                        <p:tav tm="0">
+                                          <p:val>
+                                            <p:strVal val="#ppt_y"/>
+                                          </p:val>
+                                        </p:tav>
+                                        <p:tav tm="100000">
+                                          <p:val>
+                                            <p:strVal val="#ppt_y"/>
+                                          </p:val>
+                                        </p:tav>
+                                      </p:tavLst>
+                                    </p:anim>
+                                  </p:childTnLst>
+                                </p:cTn>
+                              </p:par>
+                              <p:par>
+                                <p:cTn id="9" presetID="10" presetClass="entr" presetSubtype="0" fill="hold" nodeType="withEffect">
+                                  <p:stCondLst>
+                                    <p:cond delay="0"/>
+                                  </p:stCondLst>
+                                  <p:childTnLst>
+                                    <p:set>
+                                      <p:cBhvr>
+                                        <p:cTn id="10" dur="1" fill="hold">
+                                          <p:stCondLst>
+                                            <p:cond delay="0"/>
+                                          </p:stCondLst>
+                                        </p:cTn>
+                                        <p:tgtEl>
+                                          <p:spTgt spid="1029"/>
+                                        </p:tgtEl>
+                                        <p:attrNameLst>
+                                          <p:attrName>style.visibility</p:attrName>
+                                        </p:attrNameLst>
+                                      </p:cBhvr>
+                                      <p:to>
+                                        <p:strVal val="visible"/>
+                                      </p:to>
+                                    </p:set>
+                                    <p:animEffect transition="in" filter="fade">
+                                      <p:cBhvr>
+                                        <p:cTn id="11" dur="500"/>
+                                        <p:tgtEl>
+                                          <p:spTgt spid="1029"/>
+                                        </p:tgtEl>
+                                      </p:cBhvr>
+                                    </p:animEffect>
+                                  </p:childTnLst>
+                                </p:cTn>
+                              </p:par>
+                            </p:childTnLst>
+                          </p:cTn>
+                        </p:par>
+                      </p:childTnLst>
+                    </p:cTn>
+                  </p:par>
+                  <p:par>
+                    <p:cTn id="12" fill="hold">
+                      <p:stCondLst>
+                        <p:cond delay="indefinite"/>
+                      </p:stCondLst>
+                      <p:childTnLst>
+                        <p:par>
+                          <p:cTn id="13" fill="hold">
+                            <p:stCondLst>
+                              <p:cond delay="0"/>
+                            </p:stCondLst>
+                            <p:childTnLst>
+                              <p:par>
+                                <p:cTn id="14" presetID="2" presetClass="entr" presetSubtype="4" fill="hold" grpId="0" nodeType="clickEffect">
+                                  <p:stCondLst>
+                                    <p:cond delay="0"/>
+                                  </p:stCondLst>
+                                  <p:childTnLst>
+                                    <p:set>
+                                      <p:cBhvr>
+                                        <p:cTn id="15" dur="1" fill="hold">
+                                          <p:stCondLst>
+                                            <p:cond delay="0"/>
+                                          </p:stCondLst>
+                                        </p:cTn>
+                                        <p:tgtEl>
+                                          <p:spTgt spid="6"/>
+                                        </p:tgtEl>
+                                        <p:attrNameLst>
+                                          <p:attrName>style.visibility</p:attrName>
+                                        </p:attrNameLst>
+                                      </p:cBhvr>
+                                      <p:to>
+                                        <p:strVal val="visible"/>
+                                      </p:to>
+                                    </p:set>
+                                    <p:anim calcmode="lin" valueType="num">
+                                      <p:cBhvr additive="base">
+                                        <p:cTn id="16" dur="500" fill="hold"/>
+                                        <p:tgtEl>
+                                          <p:spTgt spid="6"/>
+                                        </p:tgtEl>
+                                        <p:attrNameLst>
+                                          <p:attrName>ppt_x</p:attrName>
+                                        </p:attrNameLst>
+                                      </p:cBhvr>
+                                      <p:tavLst>
+                                        <p:tav tm="0">
+                                          <p:val>
+                                            <p:strVal val="#ppt_x"/>
+                                          </p:val>
+                                        </p:tav>
+                                        <p:tav tm="100000">
+                                          <p:val>
+                                            <p:strVal val="#ppt_x"/>
+                                          </p:val>
+                                        </p:tav>
+                                      </p:tavLst>
+                                    </p:anim>
+                                    <p:anim calcmode="lin" valueType="num">
+                                      <p:cBhvr additive="base">
+                                        <p:cTn id="17" dur="500" fill="hold"/>
+                                        <p:tgtEl>
+                                          <p:spTgt spid="6"/>
+                                        </p:tgtEl>
+                                        <p:attrNameLst>
+                                          <p:attrName>ppt_y</p:attrName>
+                                        </p:attrNameLst>
+                                      </p:cBhvr>
+                                      <p:tavLst>
+                                        <p:tav tm="0">
+                                          <p:val>
+                                            <p:strVal val="1+#ppt_h/2"/>
+                                          </p:val>
+                                        </p:tav>
+                                        <p:tav tm="100000">
+                                          <p:val>
+                                            <p:strVal val="#ppt_y"/>
+                                          </p:val>
+                                        </p:tav>
+                                      </p:tavLst>
+                                    </p:anim>
+                                  </p:childTnLst>
+                                </p:cTn>
+                              </p:par>
+                              <p:par>
+                                <p:cTn id="18" presetID="10" presetClass="entr" presetSubtype="0" fill="hold" nodeType="withEffect">
+                                  <p:stCondLst>
+                                    <p:cond delay="0"/>
+                                  </p:stCondLst>
+                                  <p:childTnLst>
+                                    <p:set>
+                                      <p:cBhvr>
+                                        <p:cTn id="19" dur="1" fill="hold">
+                                          <p:stCondLst>
+                                            <p:cond delay="0"/>
+                                          </p:stCondLst>
+                                        </p:cTn>
+                                        <p:tgtEl>
+                                          <p:spTgt spid="1028"/>
+                                        </p:tgtEl>
+                                        <p:attrNameLst>
+                                          <p:attrName>style.visibility</p:attrName>
+                                        </p:attrNameLst>
+                                      </p:cBhvr>
+                                      <p:to>
+                                        <p:strVal val="visible"/>
+                                      </p:to>
+                                    </p:set>
+                                    <p:animEffect transition="in" filter="fade">
+                                      <p:cBhvr>
+                                        <p:cTn id="20" dur="500"/>
+                                        <p:tgtEl>
+                                          <p:spTgt spid="1028"/>
+                                        </p:tgtEl>
+                                      </p:cBhvr>
+                                    </p:animEffect>
+                                  </p:childTnLst>
+                                </p:cTn>
+                              </p:par>
+                            </p:childTnLst>
+                          </p:cTn>
+                        </p:par>
+                      </p:childTnLst>
+                    </p:cTn>
+                  </p:par>
+                  <p:par>
+                    <p:cTn id="21" fill="hold">
+                      <p:stCondLst>
+                        <p:cond delay="indefinite"/>
+                      </p:stCondLst>
+                      <p:childTnLst>
+                        <p:par>
+                          <p:cTn id="22" fill="hold">
+                            <p:stCondLst>
+                              <p:cond delay="0"/>
+                            </p:stCondLst>
+                            <p:childTnLst>
+                              <p:par>
+                                <p:cTn id="23" presetID="2" presetClass="entr" presetSubtype="8" fill="hold" grpId="0" nodeType="clickEffect">
+                                  <p:stCondLst>
+                                    <p:cond delay="0"/>
+                                  </p:stCondLst>
+                                  <p:childTnLst>
+                                    <p:set>
+                                      <p:cBhvr>
+                                        <p:cTn id="24" dur="1" fill="hold">
+                                          <p:stCondLst>
+                                            <p:cond delay="0"/>
+                                          </p:stCondLst>
+                                        </p:cTn>
+                                        <p:tgtEl>
+                                          <p:spTgt spid="2"/>
+                                        </p:tgtEl>
+                                        <p:attrNameLst>
+                                          <p:attrName>style.visibility</p:attrName>
+                                        </p:attrNameLst>
+                                      </p:cBhvr>
+                                      <p:to>
+                                        <p:strVal val="visible"/>
+                                      </p:to>
+                                    </p:set>
+                                    <p:anim calcmode="lin" valueType="num">
+                                      <p:cBhvr additive="base">
+                                        <p:cTn id="25" dur="500" fill="hold"/>
+                                        <p:tgtEl>
+                                          <p:spTgt spid="2"/>
+                                        </p:tgtEl>
+                                        <p:attrNameLst>
+                                          <p:attrName>ppt_x</p:attrName>
+                                        </p:attrNameLst>
+                                      </p:cBhvr>
+                                      <p:tavLst>
+                                        <p:tav tm="0">
+                                          <p:val>
+                                            <p:strVal val="0-#ppt_w/2"/>
+                                          </p:val>
+                                        </p:tav>
+                                        <p:tav tm="100000">
+                                          <p:val>
+                                            <p:strVal val="#ppt_x"/>
+                                          </p:val>
+                                        </p:tav>
+                                      </p:tavLst>
+                                    </p:anim>
+                                    <p:anim calcmode="lin" valueType="num">
+                                      <p:cBhvr additive="base">
+                                        <p:cTn id="26" dur="500" fill="hold"/>
+                                        <p:tgtEl>
+                                          <p:spTgt spid="2"/>
+                                        </p:tgtEl>
+                                        <p:attrNameLst>
+                                          <p:attrName>ppt_y</p:attrName>
+                                        </p:attrNameLst>
+                                      </p:cBhvr>
+                                      <p:tavLst>
+                                        <p:tav tm="0">
+                                          <p:val>
+                                            <p:strVal val="#ppt_y"/>
+                                          </p:val>
+                                        </p:tav>
+                                        <p:tav tm="100000">
+                                          <p:val>
+                                            <p:strVal val="#ppt_y"/>
+                                          </p:val>
+                                        </p:tav>
+                                      </p:tavLst>
+                                    </p:anim>
+                                  </p:childTnLst>
+                                </p:cTn>
+                              </p:par>
+                              <p:par>
+                                <p:cTn id="27" presetID="10" presetClass="entr" presetSubtype="0" fill="hold" nodeType="withEffect">
+                                  <p:stCondLst>
+                                    <p:cond delay="0"/>
+                                  </p:stCondLst>
+                                  <p:childTnLst>
+                                    <p:set>
+                                      <p:cBhvr>
+                                        <p:cTn id="28" dur="1" fill="hold">
+                                          <p:stCondLst>
+                                            <p:cond delay="0"/>
+                                          </p:stCondLst>
+                                        </p:cTn>
+                                        <p:tgtEl>
+                                          <p:spTgt spid="1031"/>
+                                        </p:tgtEl>
+                                        <p:attrNameLst>
+                                          <p:attrName>style.visibility</p:attrName>
+                                        </p:attrNameLst>
+                                      </p:cBhvr>
+                                      <p:to>
+                                        <p:strVal val="visible"/>
+                                      </p:to>
+                                    </p:set>
+                                    <p:animEffect transition="in" filter="fade">
+                                      <p:cBhvr>
+                                        <p:cTn id="29" dur="500"/>
+                                        <p:tgtEl>
+                                          <p:spTgt spid="1031"/>
+                                        </p:tgtEl>
+                                      </p:cBhvr>
+                                    </p:animEffect>
+                                  </p:childTnLst>
+                                </p:cTn>
+                              </p:par>
+                            </p:childTnLst>
+                          </p:cTn>
+                        </p:par>
+                      </p:childTnLst>
+                    </p:cTn>
+                  </p:par>
+                  <p:par>
+                    <p:cTn id="30" fill="hold">
+                      <p:stCondLst>
+                        <p:cond delay="indefinite"/>
+                      </p:stCondLst>
+                      <p:childTnLst>
+                        <p:par>
+                          <p:cTn id="31" fill="hold">
+                            <p:stCondLst>
+                              <p:cond delay="0"/>
+                            </p:stCondLst>
+                            <p:childTnLst>
+                              <p:par>
+                                <p:cTn id="32" presetID="2" presetClass="entr" presetSubtype="1" fill="hold" grpId="0" nodeType="clickEffect">
+                                  <p:stCondLst>
+                                    <p:cond delay="0"/>
+                                  </p:stCondLst>
+                                  <p:childTnLst>
+                                    <p:set>
+                                      <p:cBhvr>
+                                        <p:cTn id="33" dur="1" fill="hold">
+                                          <p:stCondLst>
+                                            <p:cond delay="0"/>
+                                          </p:stCondLst>
+                                        </p:cTn>
+                                        <p:tgtEl>
+                                          <p:spTgt spid="3"/>
+                                        </p:tgtEl>
+                                        <p:attrNameLst>
+                                          <p:attrName>style.visibility</p:attrName>
+                                        </p:attrNameLst>
+                                      </p:cBhvr>
+                                      <p:to>
+                                        <p:strVal val="visible"/>
+                                      </p:to>
+                                    </p:set>
+                                    <p:anim calcmode="lin" valueType="num">
+                                      <p:cBhvr additive="base">
+                                        <p:cTn id="34" dur="500" fill="hold"/>
+                                        <p:tgtEl>
+                                          <p:spTgt spid="3"/>
+                                        </p:tgtEl>
+                                        <p:attrNameLst>
+                                          <p:attrName>ppt_x</p:attrName>
+                                        </p:attrNameLst>
+                                      </p:cBhvr>
+                                      <p:tavLst>
+                                        <p:tav tm="0">
+                                          <p:val>
+                                            <p:strVal val="#ppt_x"/>
+                                          </p:val>
+                                        </p:tav>
+                                        <p:tav tm="100000">
+                                          <p:val>
+                                            <p:strVal val="#ppt_x"/>
+                                          </p:val>
+                                        </p:tav>
+                                      </p:tavLst>
+                                    </p:anim>
+                                    <p:anim calcmode="lin" valueType="num">
+                                      <p:cBhvr additive="base">
+                                        <p:cTn id="35" dur="500" fill="hold"/>
+                                        <p:tgtEl>
+                                          <p:spTgt spid="3"/>
+                                        </p:tgtEl>
+                                        <p:attrNameLst>
+                                          <p:attrName>ppt_y</p:attrName>
+                                        </p:attrNameLst>
+                                      </p:cBhvr>
+                                      <p:tavLst>
+                                        <p:tav tm="0">
+                                          <p:val>
+                                            <p:strVal val="0-#ppt_h/2"/>
+                                          </p:val>
+                                        </p:tav>
+                                        <p:tav tm="100000">
+                                          <p:val>
+                                            <p:strVal val="#ppt_y"/>
+                                          </p:val>
+                                        </p:tav>
+                                      </p:tavLst>
+                                    </p:anim>
+                                  </p:childTnLst>
+                                </p:cTn>
+                              </p:par>
+                              <p:par>
+                                <p:cTn id="36" presetID="10" presetClass="entr" presetSubtype="0" fill="hold" nodeType="withEffect">
+                                  <p:stCondLst>
+                                    <p:cond delay="0"/>
+                                  </p:stCondLst>
+                                  <p:childTnLst>
+                                    <p:set>
+                                      <p:cBhvr>
+                                        <p:cTn id="37" dur="1" fill="hold">
+                                          <p:stCondLst>
+                                            <p:cond delay="0"/>
+                                          </p:stCondLst>
+                                        </p:cTn>
+                                        <p:tgtEl>
+                                          <p:spTgt spid="1027"/>
+                                        </p:tgtEl>
+                                        <p:attrNameLst>
+                                          <p:attrName>style.visibility</p:attrName>
+                                        </p:attrNameLst>
+                                      </p:cBhvr>
+                                      <p:to>
+                                        <p:strVal val="visible"/>
+                                      </p:to>
+                                    </p:set>
+                                    <p:animEffect transition="in" filter="fade">
+                                      <p:cBhvr>
+                                        <p:cTn id="38" dur="500"/>
+                                        <p:tgtEl>
+                                          <p:spTgt spid="1027"/>
+                                        </p:tgtEl>
+                                      </p:cBhvr>
+                                    </p:animEffect>
+                                  </p:childTnLst>
+                                </p:cTn>
+                              </p:par>
+                            </p:childTnLst>
+                          </p:cTn>
+                        </p:par>
+                      </p:childTnLst>
+                    </p:cTn>
+                  </p:par>
+                </p:childTnLst>
+              </p:cTn>
+              <p:prevCondLst>
+                <p:cond evt="onPrev" delay="0">
+                  <p:tgtEl>
+                    <p:sldTgt/>
+                  </p:tgtEl>
+                </p:cond>
+              </p:prevCondLst>
+              <p:nextCondLst>
+                <p:cond evt="onNext" delay="0">
+                  <p:tgtEl>
+                    <p:sldTgt/>
+                  </p:tgtEl>
+                </p:cond>
+              </p:nextCondLst>
+            </p:seq>
+          </p:childTnLst>
+        </p:cTn>
+      </p:par>
+    </p:tnLst>
+    <p:bldLst>
+      <p:bldP spid="2" grpId="0" animBg="1"/>
+      <p:bldP spid="4" grpId="0" animBg="1"/>
+      <p:bldP spid="3" grpId="0" animBg="1"/>
+      <p:bldP spid="6" grpId="0" animBg="1"/>
+    </p:bldLst>
+  </p:timing>
 </p:sld>
 </file>
 
@@ -4124,16 +6127,112 @@
           <a:chExt cx="0" cy="0"/>
         </a:xfrm>
       </p:grpSpPr>
-      <p:sp>
-        <p:nvSpPr>
-          <p:cNvPr id="2" name="TextBox 1"/>
+      <p:pic>
+        <p:nvPicPr>
+          <p:cNvPr id="3074" name="Picture 2" descr="1 Pcs Cute Cartoon Cat Kitten Fish Sailing Boat Anchor Brooch Pins with Chain DIY Button Pin Denim Jacket Pin Badge Gift Jewelry"/>
+          <p:cNvPicPr>
+            <a:picLocks noChangeAspect="1" noChangeArrowheads="1"/>
+          </p:cNvPicPr>
+          <p:nvPr/>
+        </p:nvPicPr>
+        <p:blipFill rotWithShape="1">
+          <a:blip r:embed="rId3">
+            <a:extLst>
+              <a:ext uri="{BEBA8EAE-BF5A-486C-A8C5-ECC9F3942E4B}">
+                <a14:imgProps xmlns:a14="http://schemas.microsoft.com/office/drawing/2010/main">
+                  <a14:imgLayer r:embed="rId4">
+                    <a14:imgEffect>
+                      <a14:artisticPhotocopy/>
+                    </a14:imgEffect>
+                  </a14:imgLayer>
+                </a14:imgProps>
+              </a:ext>
+              <a:ext uri="{28A0092B-C50C-407E-A947-70E740481C1C}">
+                <a14:useLocalDpi xmlns:a14="http://schemas.microsoft.com/office/drawing/2010/main" val="0"/>
+              </a:ext>
+            </a:extLst>
+          </a:blip>
+          <a:srcRect l="29562" t="33875" r="57500" b="6125"/>
+          <a:stretch/>
+        </p:blipFill>
+        <p:spPr bwMode="auto">
+          <a:xfrm rot="2307582">
+            <a:off x="2834719" y="2686610"/>
+            <a:ext cx="492918" cy="2286000"/>
+          </a:xfrm>
+          <a:prstGeom prst="rect">
+            <a:avLst/>
+          </a:prstGeom>
+          <a:noFill/>
+          <a:extLst>
+            <a:ext uri="{909E8E84-426E-40DD-AFC4-6F175D3DCCD1}">
+              <a14:hiddenFill xmlns:a14="http://schemas.microsoft.com/office/drawing/2010/main">
+                <a:solidFill>
+                  <a:srgbClr val="FFFFFF"/>
+                </a:solidFill>
+              </a14:hiddenFill>
+            </a:ext>
+          </a:extLst>
+        </p:spPr>
+      </p:pic>
+      <p:pic>
+        <p:nvPicPr>
+          <p:cNvPr id="1026" name="Picture 2" descr="D:\POLS6310\FinalProject\Docs\CCI04192019_00000.jpg"/>
+          <p:cNvPicPr>
+            <a:picLocks noChangeAspect="1" noChangeArrowheads="1"/>
+          </p:cNvPicPr>
+          <p:nvPr/>
+        </p:nvPicPr>
+        <p:blipFill rotWithShape="1">
+          <a:blip r:embed="rId5" cstate="print">
+            <a:extLst>
+              <a:ext uri="{BEBA8EAE-BF5A-486C-A8C5-ECC9F3942E4B}">
+                <a14:imgProps xmlns:a14="http://schemas.microsoft.com/office/drawing/2010/main">
+                  <a14:imgLayer r:embed="rId6">
+                    <a14:imgEffect>
+                      <a14:backgroundRemoval t="10000" b="90000" l="10000" r="90000"/>
+                    </a14:imgEffect>
+                  </a14:imgLayer>
+                </a14:imgProps>
+              </a:ext>
+              <a:ext uri="{28A0092B-C50C-407E-A947-70E740481C1C}">
+                <a14:useLocalDpi xmlns:a14="http://schemas.microsoft.com/office/drawing/2010/main" val="0"/>
+              </a:ext>
+            </a:extLst>
+          </a:blip>
+          <a:srcRect l="9137" t="22838" r="11257" b="28346"/>
+          <a:stretch/>
+        </p:blipFill>
+        <p:spPr bwMode="auto">
+          <a:xfrm>
+            <a:off x="2632710" y="1409700"/>
+            <a:ext cx="4149090" cy="1954530"/>
+          </a:xfrm>
+          <a:prstGeom prst="rect">
+            <a:avLst/>
+          </a:prstGeom>
+          <a:noFill/>
+          <a:extLst>
+            <a:ext uri="{909E8E84-426E-40DD-AFC4-6F175D3DCCD1}">
+              <a14:hiddenFill xmlns:a14="http://schemas.microsoft.com/office/drawing/2010/main">
+                <a:solidFill>
+                  <a:srgbClr val="FFFFFF"/>
+                </a:solidFill>
+              </a14:hiddenFill>
+            </a:ext>
+          </a:extLst>
+        </p:spPr>
+      </p:pic>
+      <p:sp>
+        <p:nvSpPr>
+          <p:cNvPr id="3" name="TextBox 2"/>
           <p:cNvSpPr txBox="1"/>
           <p:nvPr/>
         </p:nvSpPr>
         <p:spPr>
           <a:xfrm>
-            <a:off x="0" y="1028700"/>
-            <a:ext cx="9144000" cy="1477328"/>
+            <a:off x="60829" y="1562100"/>
+            <a:ext cx="2225171" cy="369332"/>
           </a:xfrm>
           <a:prstGeom prst="rect">
             <a:avLst/>
@@ -4141,38 +6240,1019 @@
           <a:noFill/>
         </p:spPr>
         <p:txBody>
-          <a:bodyPr wrap="square" lIns="182880" rIns="182880" rtlCol="0">
+          <a:bodyPr wrap="square" rtlCol="0">
             <a:spAutoFit/>
           </a:bodyPr>
           <a:lstStyle/>
           <a:p>
-            <a:r>
-              <a:rPr lang="en-US" dirty="0" smtClean="0"/>
-              <a:t>SBIR/STTR Dashboard [data] (</a:t>
-            </a:r>
-            <a:r>
-              <a:rPr lang="en-US" dirty="0" err="1" smtClean="0"/>
-              <a:t>n.d.</a:t>
-            </a:r>
-            <a:r>
-              <a:rPr lang="en-US" dirty="0" smtClean="0"/>
-              <a:t>). Retrieved April 18, 2019, from https://www.sbir.gov/awards/annual-reports?view_by=Year</a:t>
-            </a:r>
-          </a:p>
-          <a:p>
-            <a:endParaRPr lang="en-US" dirty="0"/>
-          </a:p>
-          <a:p>
-            <a:r>
-              <a:rPr lang="en-US" dirty="0" smtClean="0"/>
-              <a:t>Small Business Innovation Act: 11th Annual Report. (1993). Retrieved from https://www.sbir.gov/sites/default/files/SBIR_1993.pdf</a:t>
-            </a:r>
-          </a:p>
-        </p:txBody>
-      </p:sp>
-      <p:sp>
-        <p:nvSpPr>
-          <p:cNvPr id="3" name="TextBox 2"/>
+            <a:pPr algn="r"/>
+            <a:r>
+              <a:rPr lang="en-US" b="1" dirty="0" smtClean="0">
+                <a:latin typeface="Bradley Hand ITC" panose="03070402050302030203" pitchFamily="66" charset="0"/>
+              </a:rPr>
+              <a:t>Small business R&amp;D</a:t>
+            </a:r>
+            <a:endParaRPr lang="en-US" b="1" dirty="0">
+              <a:latin typeface="Bradley Hand ITC" panose="03070402050302030203" pitchFamily="66" charset="0"/>
+            </a:endParaRPr>
+          </a:p>
+        </p:txBody>
+      </p:sp>
+      <p:sp>
+        <p:nvSpPr>
+          <p:cNvPr id="7" name="TextBox 6"/>
+          <p:cNvSpPr txBox="1"/>
+          <p:nvPr/>
+        </p:nvSpPr>
+        <p:spPr>
+          <a:xfrm>
+            <a:off x="76200" y="1028700"/>
+            <a:ext cx="2057400" cy="369332"/>
+          </a:xfrm>
+          <a:prstGeom prst="rect">
+            <a:avLst/>
+          </a:prstGeom>
+          <a:noFill/>
+        </p:spPr>
+        <p:txBody>
+          <a:bodyPr wrap="square" rtlCol="0">
+            <a:spAutoFit/>
+          </a:bodyPr>
+          <a:lstStyle/>
+          <a:p>
+            <a:pPr algn="r"/>
+            <a:r>
+              <a:rPr lang="en-US" b="1" dirty="0" smtClean="0">
+                <a:latin typeface="Bradley Hand ITC" panose="03070402050302030203" pitchFamily="66" charset="0"/>
+              </a:rPr>
+              <a:t>Big business R&amp;D</a:t>
+            </a:r>
+            <a:endParaRPr lang="en-US" b="1" dirty="0">
+              <a:latin typeface="Bradley Hand ITC" panose="03070402050302030203" pitchFamily="66" charset="0"/>
+            </a:endParaRPr>
+          </a:p>
+        </p:txBody>
+      </p:sp>
+      <p:sp>
+        <p:nvSpPr>
+          <p:cNvPr id="8" name="TextBox 7"/>
+          <p:cNvSpPr txBox="1"/>
+          <p:nvPr/>
+        </p:nvSpPr>
+        <p:spPr>
+          <a:xfrm>
+            <a:off x="76200" y="735568"/>
+            <a:ext cx="2057400" cy="369332"/>
+          </a:xfrm>
+          <a:prstGeom prst="rect">
+            <a:avLst/>
+          </a:prstGeom>
+          <a:noFill/>
+        </p:spPr>
+        <p:txBody>
+          <a:bodyPr wrap="square" rtlCol="0">
+            <a:spAutoFit/>
+          </a:bodyPr>
+          <a:lstStyle/>
+          <a:p>
+            <a:pPr algn="r"/>
+            <a:r>
+              <a:rPr lang="en-US" b="1" dirty="0" smtClean="0">
+                <a:latin typeface="Bradley Hand ITC" panose="03070402050302030203" pitchFamily="66" charset="0"/>
+              </a:rPr>
+              <a:t>Academic R&amp;D</a:t>
+            </a:r>
+            <a:endParaRPr lang="en-US" b="1" dirty="0">
+              <a:latin typeface="Bradley Hand ITC" panose="03070402050302030203" pitchFamily="66" charset="0"/>
+            </a:endParaRPr>
+          </a:p>
+        </p:txBody>
+      </p:sp>
+      <p:cxnSp>
+        <p:nvCxnSpPr>
+          <p:cNvPr id="6" name="Straight Connector 5"/>
+          <p:cNvCxnSpPr>
+            <a:stCxn id="3" idx="3"/>
+          </p:cNvCxnSpPr>
+          <p:nvPr/>
+        </p:nvCxnSpPr>
+        <p:spPr>
+          <a:xfrm>
+            <a:off x="2286000" y="1746766"/>
+            <a:ext cx="457201" cy="668536"/>
+          </a:xfrm>
+          <a:prstGeom prst="line">
+            <a:avLst/>
+          </a:prstGeom>
+          <a:ln w="19050">
+            <a:solidFill>
+              <a:schemeClr val="tx1"/>
+            </a:solidFill>
+          </a:ln>
+        </p:spPr>
+        <p:style>
+          <a:lnRef idx="1">
+            <a:schemeClr val="accent1"/>
+          </a:lnRef>
+          <a:fillRef idx="0">
+            <a:schemeClr val="accent1"/>
+          </a:fillRef>
+          <a:effectRef idx="0">
+            <a:schemeClr val="accent1"/>
+          </a:effectRef>
+          <a:fontRef idx="minor">
+            <a:schemeClr val="tx1"/>
+          </a:fontRef>
+        </p:style>
+      </p:cxnSp>
+      <p:cxnSp>
+        <p:nvCxnSpPr>
+          <p:cNvPr id="12" name="Straight Connector 11"/>
+          <p:cNvCxnSpPr>
+            <a:stCxn id="7" idx="3"/>
+          </p:cNvCxnSpPr>
+          <p:nvPr/>
+        </p:nvCxnSpPr>
+        <p:spPr>
+          <a:xfrm>
+            <a:off x="2133600" y="1213366"/>
+            <a:ext cx="609600" cy="1018937"/>
+          </a:xfrm>
+          <a:prstGeom prst="line">
+            <a:avLst/>
+          </a:prstGeom>
+          <a:ln w="19050">
+            <a:solidFill>
+              <a:schemeClr val="tx1"/>
+            </a:solidFill>
+          </a:ln>
+        </p:spPr>
+        <p:style>
+          <a:lnRef idx="1">
+            <a:schemeClr val="accent1"/>
+          </a:lnRef>
+          <a:fillRef idx="0">
+            <a:schemeClr val="accent1"/>
+          </a:fillRef>
+          <a:effectRef idx="0">
+            <a:schemeClr val="accent1"/>
+          </a:effectRef>
+          <a:fontRef idx="minor">
+            <a:schemeClr val="tx1"/>
+          </a:fontRef>
+        </p:style>
+      </p:cxnSp>
+      <p:cxnSp>
+        <p:nvCxnSpPr>
+          <p:cNvPr id="15" name="Straight Connector 14"/>
+          <p:cNvCxnSpPr>
+            <a:stCxn id="8" idx="3"/>
+          </p:cNvCxnSpPr>
+          <p:nvPr/>
+        </p:nvCxnSpPr>
+        <p:spPr>
+          <a:xfrm>
+            <a:off x="2133600" y="920234"/>
+            <a:ext cx="685800" cy="1188720"/>
+          </a:xfrm>
+          <a:prstGeom prst="line">
+            <a:avLst/>
+          </a:prstGeom>
+          <a:ln w="19050">
+            <a:solidFill>
+              <a:schemeClr val="tx1"/>
+            </a:solidFill>
+          </a:ln>
+        </p:spPr>
+        <p:style>
+          <a:lnRef idx="1">
+            <a:schemeClr val="accent1"/>
+          </a:lnRef>
+          <a:fillRef idx="0">
+            <a:schemeClr val="accent1"/>
+          </a:fillRef>
+          <a:effectRef idx="0">
+            <a:schemeClr val="accent1"/>
+          </a:effectRef>
+          <a:fontRef idx="minor">
+            <a:schemeClr val="tx1"/>
+          </a:fontRef>
+        </p:style>
+      </p:cxnSp>
+      <p:sp>
+        <p:nvSpPr>
+          <p:cNvPr id="21" name="TextBox 20"/>
+          <p:cNvSpPr txBox="1"/>
+          <p:nvPr/>
+        </p:nvSpPr>
+        <p:spPr>
+          <a:xfrm rot="21095396">
+            <a:off x="3688014" y="2345734"/>
+            <a:ext cx="2225171" cy="369332"/>
+          </a:xfrm>
+          <a:prstGeom prst="rect">
+            <a:avLst/>
+          </a:prstGeom>
+          <a:noFill/>
+        </p:spPr>
+        <p:txBody>
+          <a:bodyPr wrap="square" rtlCol="0">
+            <a:spAutoFit/>
+          </a:bodyPr>
+          <a:lstStyle/>
+          <a:p>
+            <a:pPr algn="ctr"/>
+            <a:r>
+              <a:rPr lang="en-US" b="1" dirty="0" smtClean="0">
+                <a:latin typeface="Bradley Hand ITC" panose="03070402050302030203" pitchFamily="66" charset="0"/>
+              </a:rPr>
+              <a:t>United States</a:t>
+            </a:r>
+            <a:endParaRPr lang="en-US" b="1" dirty="0">
+              <a:latin typeface="Bradley Hand ITC" panose="03070402050302030203" pitchFamily="66" charset="0"/>
+            </a:endParaRPr>
+          </a:p>
+        </p:txBody>
+      </p:sp>
+      <p:sp>
+        <p:nvSpPr>
+          <p:cNvPr id="22" name="TextBox 21"/>
+          <p:cNvSpPr txBox="1"/>
+          <p:nvPr/>
+        </p:nvSpPr>
+        <p:spPr>
+          <a:xfrm>
+            <a:off x="3505200" y="4152900"/>
+            <a:ext cx="2225171" cy="369332"/>
+          </a:xfrm>
+          <a:prstGeom prst="rect">
+            <a:avLst/>
+          </a:prstGeom>
+          <a:noFill/>
+        </p:spPr>
+        <p:txBody>
+          <a:bodyPr wrap="square" rtlCol="0">
+            <a:spAutoFit/>
+          </a:bodyPr>
+          <a:lstStyle/>
+          <a:p>
+            <a:r>
+              <a:rPr lang="en-US" b="1" dirty="0" smtClean="0">
+                <a:latin typeface="Bradley Hand ITC" panose="03070402050302030203" pitchFamily="66" charset="0"/>
+              </a:rPr>
+              <a:t>Minimum set-aside</a:t>
+            </a:r>
+            <a:endParaRPr lang="en-US" b="1" dirty="0">
+              <a:latin typeface="Bradley Hand ITC" panose="03070402050302030203" pitchFamily="66" charset="0"/>
+            </a:endParaRPr>
+          </a:p>
+        </p:txBody>
+      </p:sp>
+      <p:cxnSp>
+        <p:nvCxnSpPr>
+          <p:cNvPr id="23" name="Straight Connector 22"/>
+          <p:cNvCxnSpPr>
+            <a:stCxn id="22" idx="1"/>
+          </p:cNvCxnSpPr>
+          <p:nvPr/>
+        </p:nvCxnSpPr>
+        <p:spPr>
+          <a:xfrm flipH="1">
+            <a:off x="2819400" y="4337566"/>
+            <a:ext cx="685800" cy="184666"/>
+          </a:xfrm>
+          <a:prstGeom prst="line">
+            <a:avLst/>
+          </a:prstGeom>
+          <a:ln w="19050">
+            <a:solidFill>
+              <a:schemeClr val="tx1"/>
+            </a:solidFill>
+          </a:ln>
+        </p:spPr>
+        <p:style>
+          <a:lnRef idx="1">
+            <a:schemeClr val="accent1"/>
+          </a:lnRef>
+          <a:fillRef idx="0">
+            <a:schemeClr val="accent1"/>
+          </a:fillRef>
+          <a:effectRef idx="0">
+            <a:schemeClr val="accent1"/>
+          </a:effectRef>
+          <a:fontRef idx="minor">
+            <a:schemeClr val="tx1"/>
+          </a:fontRef>
+        </p:style>
+      </p:cxnSp>
+      <p:sp>
+        <p:nvSpPr>
+          <p:cNvPr id="30" name="Freeform 29"/>
+          <p:cNvSpPr/>
+          <p:nvPr/>
+        </p:nvSpPr>
+        <p:spPr>
+          <a:xfrm>
+            <a:off x="0" y="2552700"/>
+            <a:ext cx="2819400" cy="228600"/>
+          </a:xfrm>
+          <a:custGeom>
+            <a:avLst/>
+            <a:gdLst>
+              <a:gd name="connsiteX0" fmla="*/ 0 w 2869990"/>
+              <a:gd name="connsiteY0" fmla="*/ 228600 h 228600"/>
+              <a:gd name="connsiteX1" fmla="*/ 57150 w 2869990"/>
+              <a:gd name="connsiteY1" fmla="*/ 182880 h 228600"/>
+              <a:gd name="connsiteX2" fmla="*/ 125730 w 2869990"/>
+              <a:gd name="connsiteY2" fmla="*/ 114300 h 228600"/>
+              <a:gd name="connsiteX3" fmla="*/ 205740 w 2869990"/>
+              <a:gd name="connsiteY3" fmla="*/ 57150 h 228600"/>
+              <a:gd name="connsiteX4" fmla="*/ 297180 w 2869990"/>
+              <a:gd name="connsiteY4" fmla="*/ 22860 h 228600"/>
+              <a:gd name="connsiteX5" fmla="*/ 365760 w 2869990"/>
+              <a:gd name="connsiteY5" fmla="*/ 0 h 228600"/>
+              <a:gd name="connsiteX6" fmla="*/ 560070 w 2869990"/>
+              <a:gd name="connsiteY6" fmla="*/ 11430 h 228600"/>
+              <a:gd name="connsiteX7" fmla="*/ 640080 w 2869990"/>
+              <a:gd name="connsiteY7" fmla="*/ 57150 h 228600"/>
+              <a:gd name="connsiteX8" fmla="*/ 765810 w 2869990"/>
+              <a:gd name="connsiteY8" fmla="*/ 114300 h 228600"/>
+              <a:gd name="connsiteX9" fmla="*/ 857250 w 2869990"/>
+              <a:gd name="connsiteY9" fmla="*/ 125730 h 228600"/>
+              <a:gd name="connsiteX10" fmla="*/ 1051560 w 2869990"/>
+              <a:gd name="connsiteY10" fmla="*/ 125730 h 228600"/>
+              <a:gd name="connsiteX11" fmla="*/ 1097280 w 2869990"/>
+              <a:gd name="connsiteY11" fmla="*/ 91440 h 228600"/>
+              <a:gd name="connsiteX12" fmla="*/ 1211580 w 2869990"/>
+              <a:gd name="connsiteY12" fmla="*/ 22860 h 228600"/>
+              <a:gd name="connsiteX13" fmla="*/ 1463040 w 2869990"/>
+              <a:gd name="connsiteY13" fmla="*/ 34290 h 228600"/>
+              <a:gd name="connsiteX14" fmla="*/ 1531620 w 2869990"/>
+              <a:gd name="connsiteY14" fmla="*/ 57150 h 228600"/>
+              <a:gd name="connsiteX15" fmla="*/ 1565910 w 2869990"/>
+              <a:gd name="connsiteY15" fmla="*/ 68580 h 228600"/>
+              <a:gd name="connsiteX16" fmla="*/ 1885950 w 2869990"/>
+              <a:gd name="connsiteY16" fmla="*/ 80010 h 228600"/>
+              <a:gd name="connsiteX17" fmla="*/ 1954530 w 2869990"/>
+              <a:gd name="connsiteY17" fmla="*/ 102870 h 228600"/>
+              <a:gd name="connsiteX18" fmla="*/ 1988820 w 2869990"/>
+              <a:gd name="connsiteY18" fmla="*/ 114300 h 228600"/>
+              <a:gd name="connsiteX19" fmla="*/ 2091690 w 2869990"/>
+              <a:gd name="connsiteY19" fmla="*/ 102870 h 228600"/>
+              <a:gd name="connsiteX20" fmla="*/ 2125980 w 2869990"/>
+              <a:gd name="connsiteY20" fmla="*/ 57150 h 228600"/>
+              <a:gd name="connsiteX21" fmla="*/ 2194560 w 2869990"/>
+              <a:gd name="connsiteY21" fmla="*/ 34290 h 228600"/>
+              <a:gd name="connsiteX22" fmla="*/ 2354580 w 2869990"/>
+              <a:gd name="connsiteY22" fmla="*/ 45720 h 228600"/>
+              <a:gd name="connsiteX23" fmla="*/ 2423160 w 2869990"/>
+              <a:gd name="connsiteY23" fmla="*/ 114300 h 228600"/>
+              <a:gd name="connsiteX24" fmla="*/ 2457450 w 2869990"/>
+              <a:gd name="connsiteY24" fmla="*/ 125730 h 228600"/>
+              <a:gd name="connsiteX25" fmla="*/ 2640330 w 2869990"/>
+              <a:gd name="connsiteY25" fmla="*/ 91440 h 228600"/>
+              <a:gd name="connsiteX26" fmla="*/ 2766060 w 2869990"/>
+              <a:gd name="connsiteY26" fmla="*/ 102870 h 228600"/>
+              <a:gd name="connsiteX27" fmla="*/ 2834640 w 2869990"/>
+              <a:gd name="connsiteY27" fmla="*/ 137160 h 228600"/>
+              <a:gd name="connsiteX28" fmla="*/ 2868930 w 2869990"/>
+              <a:gd name="connsiteY28" fmla="*/ 160020 h 228600"/>
+              <a:gd name="connsiteX29" fmla="*/ 2846070 w 2869990"/>
+              <a:gd name="connsiteY29" fmla="*/ 148590 h 228600"/>
+            </a:gdLst>
+            <a:ahLst/>
+            <a:cxnLst>
+              <a:cxn ang="0">
+                <a:pos x="connsiteX0" y="connsiteY0"/>
+              </a:cxn>
+              <a:cxn ang="0">
+                <a:pos x="connsiteX1" y="connsiteY1"/>
+              </a:cxn>
+              <a:cxn ang="0">
+                <a:pos x="connsiteX2" y="connsiteY2"/>
+              </a:cxn>
+              <a:cxn ang="0">
+                <a:pos x="connsiteX3" y="connsiteY3"/>
+              </a:cxn>
+              <a:cxn ang="0">
+                <a:pos x="connsiteX4" y="connsiteY4"/>
+              </a:cxn>
+              <a:cxn ang="0">
+                <a:pos x="connsiteX5" y="connsiteY5"/>
+              </a:cxn>
+              <a:cxn ang="0">
+                <a:pos x="connsiteX6" y="connsiteY6"/>
+              </a:cxn>
+              <a:cxn ang="0">
+                <a:pos x="connsiteX7" y="connsiteY7"/>
+              </a:cxn>
+              <a:cxn ang="0">
+                <a:pos x="connsiteX8" y="connsiteY8"/>
+              </a:cxn>
+              <a:cxn ang="0">
+                <a:pos x="connsiteX9" y="connsiteY9"/>
+              </a:cxn>
+              <a:cxn ang="0">
+                <a:pos x="connsiteX10" y="connsiteY10"/>
+              </a:cxn>
+              <a:cxn ang="0">
+                <a:pos x="connsiteX11" y="connsiteY11"/>
+              </a:cxn>
+              <a:cxn ang="0">
+                <a:pos x="connsiteX12" y="connsiteY12"/>
+              </a:cxn>
+              <a:cxn ang="0">
+                <a:pos x="connsiteX13" y="connsiteY13"/>
+              </a:cxn>
+              <a:cxn ang="0">
+                <a:pos x="connsiteX14" y="connsiteY14"/>
+              </a:cxn>
+              <a:cxn ang="0">
+                <a:pos x="connsiteX15" y="connsiteY15"/>
+              </a:cxn>
+              <a:cxn ang="0">
+                <a:pos x="connsiteX16" y="connsiteY16"/>
+              </a:cxn>
+              <a:cxn ang="0">
+                <a:pos x="connsiteX17" y="connsiteY17"/>
+              </a:cxn>
+              <a:cxn ang="0">
+                <a:pos x="connsiteX18" y="connsiteY18"/>
+              </a:cxn>
+              <a:cxn ang="0">
+                <a:pos x="connsiteX19" y="connsiteY19"/>
+              </a:cxn>
+              <a:cxn ang="0">
+                <a:pos x="connsiteX20" y="connsiteY20"/>
+              </a:cxn>
+              <a:cxn ang="0">
+                <a:pos x="connsiteX21" y="connsiteY21"/>
+              </a:cxn>
+              <a:cxn ang="0">
+                <a:pos x="connsiteX22" y="connsiteY22"/>
+              </a:cxn>
+              <a:cxn ang="0">
+                <a:pos x="connsiteX23" y="connsiteY23"/>
+              </a:cxn>
+              <a:cxn ang="0">
+                <a:pos x="connsiteX24" y="connsiteY24"/>
+              </a:cxn>
+              <a:cxn ang="0">
+                <a:pos x="connsiteX25" y="connsiteY25"/>
+              </a:cxn>
+              <a:cxn ang="0">
+                <a:pos x="connsiteX26" y="connsiteY26"/>
+              </a:cxn>
+              <a:cxn ang="0">
+                <a:pos x="connsiteX27" y="connsiteY27"/>
+              </a:cxn>
+              <a:cxn ang="0">
+                <a:pos x="connsiteX28" y="connsiteY28"/>
+              </a:cxn>
+              <a:cxn ang="0">
+                <a:pos x="connsiteX29" y="connsiteY29"/>
+              </a:cxn>
+            </a:cxnLst>
+            <a:rect l="l" t="t" r="r" b="b"/>
+            <a:pathLst>
+              <a:path w="2869990" h="228600">
+                <a:moveTo>
+                  <a:pt x="0" y="228600"/>
+                </a:moveTo>
+                <a:cubicBezTo>
+                  <a:pt x="19050" y="213360"/>
+                  <a:pt x="39098" y="199290"/>
+                  <a:pt x="57150" y="182880"/>
+                </a:cubicBezTo>
+                <a:cubicBezTo>
+                  <a:pt x="81071" y="161133"/>
+                  <a:pt x="99867" y="133697"/>
+                  <a:pt x="125730" y="114300"/>
+                </a:cubicBezTo>
+                <a:cubicBezTo>
+                  <a:pt x="145356" y="99581"/>
+                  <a:pt x="182341" y="70521"/>
+                  <a:pt x="205740" y="57150"/>
+                </a:cubicBezTo>
+                <a:cubicBezTo>
+                  <a:pt x="262219" y="24876"/>
+                  <a:pt x="237964" y="40625"/>
+                  <a:pt x="297180" y="22860"/>
+                </a:cubicBezTo>
+                <a:cubicBezTo>
+                  <a:pt x="320260" y="15936"/>
+                  <a:pt x="365760" y="0"/>
+                  <a:pt x="365760" y="0"/>
+                </a:cubicBezTo>
+                <a:cubicBezTo>
+                  <a:pt x="430530" y="3810"/>
+                  <a:pt x="495840" y="2254"/>
+                  <a:pt x="560070" y="11430"/>
+                </a:cubicBezTo>
+                <a:cubicBezTo>
+                  <a:pt x="584719" y="14951"/>
+                  <a:pt x="618507" y="45383"/>
+                  <a:pt x="640080" y="57150"/>
+                </a:cubicBezTo>
+                <a:cubicBezTo>
+                  <a:pt x="651008" y="63111"/>
+                  <a:pt x="731466" y="108056"/>
+                  <a:pt x="765810" y="114300"/>
+                </a:cubicBezTo>
+                <a:cubicBezTo>
+                  <a:pt x="796032" y="119795"/>
+                  <a:pt x="826770" y="121920"/>
+                  <a:pt x="857250" y="125730"/>
+                </a:cubicBezTo>
+                <a:cubicBezTo>
+                  <a:pt x="931751" y="150564"/>
+                  <a:pt x="926218" y="153584"/>
+                  <a:pt x="1051560" y="125730"/>
+                </a:cubicBezTo>
+                <a:cubicBezTo>
+                  <a:pt x="1070156" y="121597"/>
+                  <a:pt x="1081674" y="102364"/>
+                  <a:pt x="1097280" y="91440"/>
+                </a:cubicBezTo>
+                <a:cubicBezTo>
+                  <a:pt x="1166244" y="43165"/>
+                  <a:pt x="1149840" y="53730"/>
+                  <a:pt x="1211580" y="22860"/>
+                </a:cubicBezTo>
+                <a:cubicBezTo>
+                  <a:pt x="1295400" y="26670"/>
+                  <a:pt x="1379611" y="25351"/>
+                  <a:pt x="1463040" y="34290"/>
+                </a:cubicBezTo>
+                <a:cubicBezTo>
+                  <a:pt x="1486999" y="36857"/>
+                  <a:pt x="1508760" y="49530"/>
+                  <a:pt x="1531620" y="57150"/>
+                </a:cubicBezTo>
+                <a:cubicBezTo>
+                  <a:pt x="1543050" y="60960"/>
+                  <a:pt x="1553869" y="68150"/>
+                  <a:pt x="1565910" y="68580"/>
+                </a:cubicBezTo>
+                <a:lnTo>
+                  <a:pt x="1885950" y="80010"/>
+                </a:lnTo>
+                <a:lnTo>
+                  <a:pt x="1954530" y="102870"/>
+                </a:lnTo>
+                <a:lnTo>
+                  <a:pt x="1988820" y="114300"/>
+                </a:lnTo>
+                <a:cubicBezTo>
+                  <a:pt x="2023110" y="110490"/>
+                  <a:pt x="2059843" y="116140"/>
+                  <a:pt x="2091690" y="102870"/>
+                </a:cubicBezTo>
+                <a:cubicBezTo>
+                  <a:pt x="2109275" y="95543"/>
+                  <a:pt x="2110129" y="67717"/>
+                  <a:pt x="2125980" y="57150"/>
+                </a:cubicBezTo>
+                <a:cubicBezTo>
+                  <a:pt x="2146030" y="43784"/>
+                  <a:pt x="2194560" y="34290"/>
+                  <a:pt x="2194560" y="34290"/>
+                </a:cubicBezTo>
+                <a:cubicBezTo>
+                  <a:pt x="2247900" y="38100"/>
+                  <a:pt x="2301918" y="36427"/>
+                  <a:pt x="2354580" y="45720"/>
+                </a:cubicBezTo>
+                <a:cubicBezTo>
+                  <a:pt x="2390648" y="52085"/>
+                  <a:pt x="2400142" y="95119"/>
+                  <a:pt x="2423160" y="114300"/>
+                </a:cubicBezTo>
+                <a:cubicBezTo>
+                  <a:pt x="2432416" y="122013"/>
+                  <a:pt x="2446020" y="121920"/>
+                  <a:pt x="2457450" y="125730"/>
+                </a:cubicBezTo>
+                <a:cubicBezTo>
+                  <a:pt x="2529852" y="105044"/>
+                  <a:pt x="2560618" y="91440"/>
+                  <a:pt x="2640330" y="91440"/>
+                </a:cubicBezTo>
+                <a:cubicBezTo>
+                  <a:pt x="2682413" y="91440"/>
+                  <a:pt x="2724150" y="99060"/>
+                  <a:pt x="2766060" y="102870"/>
+                </a:cubicBezTo>
+                <a:cubicBezTo>
+                  <a:pt x="2864330" y="168384"/>
+                  <a:pt x="2739996" y="89838"/>
+                  <a:pt x="2834640" y="137160"/>
+                </a:cubicBezTo>
+                <a:cubicBezTo>
+                  <a:pt x="2846927" y="143303"/>
+                  <a:pt x="2859216" y="150306"/>
+                  <a:pt x="2868930" y="160020"/>
+                </a:cubicBezTo>
+                <a:cubicBezTo>
+                  <a:pt x="2874954" y="166044"/>
+                  <a:pt x="2853690" y="152400"/>
+                  <a:pt x="2846070" y="148590"/>
+                </a:cubicBezTo>
+              </a:path>
+            </a:pathLst>
+          </a:custGeom>
+          <a:noFill/>
+        </p:spPr>
+        <p:style>
+          <a:lnRef idx="2">
+            <a:schemeClr val="accent1">
+              <a:shade val="50000"/>
+            </a:schemeClr>
+          </a:lnRef>
+          <a:fillRef idx="1">
+            <a:schemeClr val="accent1"/>
+          </a:fillRef>
+          <a:effectRef idx="0">
+            <a:schemeClr val="accent1"/>
+          </a:effectRef>
+          <a:fontRef idx="minor">
+            <a:schemeClr val="lt1"/>
+          </a:fontRef>
+        </p:style>
+        <p:txBody>
+          <a:bodyPr rtlCol="0" anchor="ctr"/>
+          <a:lstStyle/>
+          <a:p>
+            <a:pPr algn="ctr"/>
+            <a:endParaRPr lang="en-US"/>
+          </a:p>
+        </p:txBody>
+      </p:sp>
+      <p:sp>
+        <p:nvSpPr>
+          <p:cNvPr id="31" name="Freeform 30"/>
+          <p:cNvSpPr/>
+          <p:nvPr/>
+        </p:nvSpPr>
+        <p:spPr>
+          <a:xfrm>
+            <a:off x="5802630" y="2324100"/>
+            <a:ext cx="3341370" cy="205740"/>
+          </a:xfrm>
+          <a:custGeom>
+            <a:avLst/>
+            <a:gdLst>
+              <a:gd name="connsiteX0" fmla="*/ 0 w 2960370"/>
+              <a:gd name="connsiteY0" fmla="*/ 148590 h 205740"/>
+              <a:gd name="connsiteX1" fmla="*/ 57150 w 2960370"/>
+              <a:gd name="connsiteY1" fmla="*/ 194310 h 205740"/>
+              <a:gd name="connsiteX2" fmla="*/ 91440 w 2960370"/>
+              <a:gd name="connsiteY2" fmla="*/ 205740 h 205740"/>
+              <a:gd name="connsiteX3" fmla="*/ 388620 w 2960370"/>
+              <a:gd name="connsiteY3" fmla="*/ 194310 h 205740"/>
+              <a:gd name="connsiteX4" fmla="*/ 468630 w 2960370"/>
+              <a:gd name="connsiteY4" fmla="*/ 160020 h 205740"/>
+              <a:gd name="connsiteX5" fmla="*/ 548640 w 2960370"/>
+              <a:gd name="connsiteY5" fmla="*/ 125730 h 205740"/>
+              <a:gd name="connsiteX6" fmla="*/ 582930 w 2960370"/>
+              <a:gd name="connsiteY6" fmla="*/ 102870 h 205740"/>
+              <a:gd name="connsiteX7" fmla="*/ 640080 w 2960370"/>
+              <a:gd name="connsiteY7" fmla="*/ 91440 h 205740"/>
+              <a:gd name="connsiteX8" fmla="*/ 674370 w 2960370"/>
+              <a:gd name="connsiteY8" fmla="*/ 80010 h 205740"/>
+              <a:gd name="connsiteX9" fmla="*/ 891540 w 2960370"/>
+              <a:gd name="connsiteY9" fmla="*/ 91440 h 205740"/>
+              <a:gd name="connsiteX10" fmla="*/ 925830 w 2960370"/>
+              <a:gd name="connsiteY10" fmla="*/ 68580 h 205740"/>
+              <a:gd name="connsiteX11" fmla="*/ 1131570 w 2960370"/>
+              <a:gd name="connsiteY11" fmla="*/ 57150 h 205740"/>
+              <a:gd name="connsiteX12" fmla="*/ 1245870 w 2960370"/>
+              <a:gd name="connsiteY12" fmla="*/ 0 h 205740"/>
+              <a:gd name="connsiteX13" fmla="*/ 1405890 w 2960370"/>
+              <a:gd name="connsiteY13" fmla="*/ 11430 h 205740"/>
+              <a:gd name="connsiteX14" fmla="*/ 1520190 w 2960370"/>
+              <a:gd name="connsiteY14" fmla="*/ 91440 h 205740"/>
+              <a:gd name="connsiteX15" fmla="*/ 1623060 w 2960370"/>
+              <a:gd name="connsiteY15" fmla="*/ 137160 h 205740"/>
+              <a:gd name="connsiteX16" fmla="*/ 1657350 w 2960370"/>
+              <a:gd name="connsiteY16" fmla="*/ 148590 h 205740"/>
+              <a:gd name="connsiteX17" fmla="*/ 1771650 w 2960370"/>
+              <a:gd name="connsiteY17" fmla="*/ 137160 h 205740"/>
+              <a:gd name="connsiteX18" fmla="*/ 1874520 w 2960370"/>
+              <a:gd name="connsiteY18" fmla="*/ 91440 h 205740"/>
+              <a:gd name="connsiteX19" fmla="*/ 1908810 w 2960370"/>
+              <a:gd name="connsiteY19" fmla="*/ 80010 h 205740"/>
+              <a:gd name="connsiteX20" fmla="*/ 1988820 w 2960370"/>
+              <a:gd name="connsiteY20" fmla="*/ 45720 h 205740"/>
+              <a:gd name="connsiteX21" fmla="*/ 2023110 w 2960370"/>
+              <a:gd name="connsiteY21" fmla="*/ 22860 h 205740"/>
+              <a:gd name="connsiteX22" fmla="*/ 2240280 w 2960370"/>
+              <a:gd name="connsiteY22" fmla="*/ 22860 h 205740"/>
+              <a:gd name="connsiteX23" fmla="*/ 2308860 w 2960370"/>
+              <a:gd name="connsiteY23" fmla="*/ 80010 h 205740"/>
+              <a:gd name="connsiteX24" fmla="*/ 2423160 w 2960370"/>
+              <a:gd name="connsiteY24" fmla="*/ 114300 h 205740"/>
+              <a:gd name="connsiteX25" fmla="*/ 2800350 w 2960370"/>
+              <a:gd name="connsiteY25" fmla="*/ 114300 h 205740"/>
+              <a:gd name="connsiteX26" fmla="*/ 2868930 w 2960370"/>
+              <a:gd name="connsiteY26" fmla="*/ 137160 h 205740"/>
+              <a:gd name="connsiteX27" fmla="*/ 2960370 w 2960370"/>
+              <a:gd name="connsiteY27" fmla="*/ 137160 h 205740"/>
+            </a:gdLst>
+            <a:ahLst/>
+            <a:cxnLst>
+              <a:cxn ang="0">
+                <a:pos x="connsiteX0" y="connsiteY0"/>
+              </a:cxn>
+              <a:cxn ang="0">
+                <a:pos x="connsiteX1" y="connsiteY1"/>
+              </a:cxn>
+              <a:cxn ang="0">
+                <a:pos x="connsiteX2" y="connsiteY2"/>
+              </a:cxn>
+              <a:cxn ang="0">
+                <a:pos x="connsiteX3" y="connsiteY3"/>
+              </a:cxn>
+              <a:cxn ang="0">
+                <a:pos x="connsiteX4" y="connsiteY4"/>
+              </a:cxn>
+              <a:cxn ang="0">
+                <a:pos x="connsiteX5" y="connsiteY5"/>
+              </a:cxn>
+              <a:cxn ang="0">
+                <a:pos x="connsiteX6" y="connsiteY6"/>
+              </a:cxn>
+              <a:cxn ang="0">
+                <a:pos x="connsiteX7" y="connsiteY7"/>
+              </a:cxn>
+              <a:cxn ang="0">
+                <a:pos x="connsiteX8" y="connsiteY8"/>
+              </a:cxn>
+              <a:cxn ang="0">
+                <a:pos x="connsiteX9" y="connsiteY9"/>
+              </a:cxn>
+              <a:cxn ang="0">
+                <a:pos x="connsiteX10" y="connsiteY10"/>
+              </a:cxn>
+              <a:cxn ang="0">
+                <a:pos x="connsiteX11" y="connsiteY11"/>
+              </a:cxn>
+              <a:cxn ang="0">
+                <a:pos x="connsiteX12" y="connsiteY12"/>
+              </a:cxn>
+              <a:cxn ang="0">
+                <a:pos x="connsiteX13" y="connsiteY13"/>
+              </a:cxn>
+              <a:cxn ang="0">
+                <a:pos x="connsiteX14" y="connsiteY14"/>
+              </a:cxn>
+              <a:cxn ang="0">
+                <a:pos x="connsiteX15" y="connsiteY15"/>
+              </a:cxn>
+              <a:cxn ang="0">
+                <a:pos x="connsiteX16" y="connsiteY16"/>
+              </a:cxn>
+              <a:cxn ang="0">
+                <a:pos x="connsiteX17" y="connsiteY17"/>
+              </a:cxn>
+              <a:cxn ang="0">
+                <a:pos x="connsiteX18" y="connsiteY18"/>
+              </a:cxn>
+              <a:cxn ang="0">
+                <a:pos x="connsiteX19" y="connsiteY19"/>
+              </a:cxn>
+              <a:cxn ang="0">
+                <a:pos x="connsiteX20" y="connsiteY20"/>
+              </a:cxn>
+              <a:cxn ang="0">
+                <a:pos x="connsiteX21" y="connsiteY21"/>
+              </a:cxn>
+              <a:cxn ang="0">
+                <a:pos x="connsiteX22" y="connsiteY22"/>
+              </a:cxn>
+              <a:cxn ang="0">
+                <a:pos x="connsiteX23" y="connsiteY23"/>
+              </a:cxn>
+              <a:cxn ang="0">
+                <a:pos x="connsiteX24" y="connsiteY24"/>
+              </a:cxn>
+              <a:cxn ang="0">
+                <a:pos x="connsiteX25" y="connsiteY25"/>
+              </a:cxn>
+              <a:cxn ang="0">
+                <a:pos x="connsiteX26" y="connsiteY26"/>
+              </a:cxn>
+              <a:cxn ang="0">
+                <a:pos x="connsiteX27" y="connsiteY27"/>
+              </a:cxn>
+            </a:cxnLst>
+            <a:rect l="l" t="t" r="r" b="b"/>
+            <a:pathLst>
+              <a:path w="2960370" h="205740">
+                <a:moveTo>
+                  <a:pt x="0" y="148590"/>
+                </a:moveTo>
+                <a:cubicBezTo>
+                  <a:pt x="19050" y="163830"/>
+                  <a:pt x="36462" y="181380"/>
+                  <a:pt x="57150" y="194310"/>
+                </a:cubicBezTo>
+                <a:cubicBezTo>
+                  <a:pt x="67367" y="200696"/>
+                  <a:pt x="79392" y="205740"/>
+                  <a:pt x="91440" y="205740"/>
+                </a:cubicBezTo>
+                <a:cubicBezTo>
+                  <a:pt x="190573" y="205740"/>
+                  <a:pt x="289560" y="198120"/>
+                  <a:pt x="388620" y="194310"/>
+                </a:cubicBezTo>
+                <a:cubicBezTo>
+                  <a:pt x="469036" y="167505"/>
+                  <a:pt x="369761" y="202392"/>
+                  <a:pt x="468630" y="160020"/>
+                </a:cubicBezTo>
+                <a:cubicBezTo>
+                  <a:pt x="532746" y="132542"/>
+                  <a:pt x="472823" y="169054"/>
+                  <a:pt x="548640" y="125730"/>
+                </a:cubicBezTo>
+                <a:cubicBezTo>
+                  <a:pt x="560567" y="118914"/>
+                  <a:pt x="570068" y="107693"/>
+                  <a:pt x="582930" y="102870"/>
+                </a:cubicBezTo>
+                <a:cubicBezTo>
+                  <a:pt x="601120" y="96049"/>
+                  <a:pt x="621233" y="96152"/>
+                  <a:pt x="640080" y="91440"/>
+                </a:cubicBezTo>
+                <a:cubicBezTo>
+                  <a:pt x="651769" y="88518"/>
+                  <a:pt x="662940" y="83820"/>
+                  <a:pt x="674370" y="80010"/>
+                </a:cubicBezTo>
+                <a:cubicBezTo>
+                  <a:pt x="746760" y="83820"/>
+                  <a:pt x="819125" y="94732"/>
+                  <a:pt x="891540" y="91440"/>
+                </a:cubicBezTo>
+                <a:cubicBezTo>
+                  <a:pt x="905263" y="90816"/>
+                  <a:pt x="912231" y="70523"/>
+                  <a:pt x="925830" y="68580"/>
+                </a:cubicBezTo>
+                <a:cubicBezTo>
+                  <a:pt x="993825" y="58866"/>
+                  <a:pt x="1062990" y="60960"/>
+                  <a:pt x="1131570" y="57150"/>
+                </a:cubicBezTo>
+                <a:cubicBezTo>
+                  <a:pt x="1213221" y="2716"/>
+                  <a:pt x="1173496" y="18093"/>
+                  <a:pt x="1245870" y="0"/>
+                </a:cubicBezTo>
+                <a:cubicBezTo>
+                  <a:pt x="1299210" y="3810"/>
+                  <a:pt x="1353561" y="413"/>
+                  <a:pt x="1405890" y="11430"/>
+                </a:cubicBezTo>
+                <a:cubicBezTo>
+                  <a:pt x="1433885" y="17324"/>
+                  <a:pt x="1500680" y="76808"/>
+                  <a:pt x="1520190" y="91440"/>
+                </a:cubicBezTo>
+                <a:cubicBezTo>
+                  <a:pt x="1563662" y="124044"/>
+                  <a:pt x="1560511" y="116310"/>
+                  <a:pt x="1623060" y="137160"/>
+                </a:cubicBezTo>
+                <a:lnTo>
+                  <a:pt x="1657350" y="148590"/>
+                </a:lnTo>
+                <a:cubicBezTo>
+                  <a:pt x="1695450" y="144780"/>
+                  <a:pt x="1734104" y="144669"/>
+                  <a:pt x="1771650" y="137160"/>
+                </a:cubicBezTo>
+                <a:cubicBezTo>
+                  <a:pt x="1804881" y="130514"/>
+                  <a:pt x="1843450" y="104756"/>
+                  <a:pt x="1874520" y="91440"/>
+                </a:cubicBezTo>
+                <a:cubicBezTo>
+                  <a:pt x="1885594" y="86694"/>
+                  <a:pt x="1898034" y="85398"/>
+                  <a:pt x="1908810" y="80010"/>
+                </a:cubicBezTo>
+                <a:cubicBezTo>
+                  <a:pt x="1987745" y="40543"/>
+                  <a:pt x="1893667" y="69508"/>
+                  <a:pt x="1988820" y="45720"/>
+                </a:cubicBezTo>
+                <a:cubicBezTo>
+                  <a:pt x="2000250" y="38100"/>
+                  <a:pt x="2010248" y="27683"/>
+                  <a:pt x="2023110" y="22860"/>
+                </a:cubicBezTo>
+                <a:cubicBezTo>
+                  <a:pt x="2089739" y="-2126"/>
+                  <a:pt x="2179130" y="18492"/>
+                  <a:pt x="2240280" y="22860"/>
+                </a:cubicBezTo>
+                <a:cubicBezTo>
+                  <a:pt x="2261814" y="44394"/>
+                  <a:pt x="2280216" y="67279"/>
+                  <a:pt x="2308860" y="80010"/>
+                </a:cubicBezTo>
+                <a:cubicBezTo>
+                  <a:pt x="2344638" y="95912"/>
+                  <a:pt x="2385162" y="104801"/>
+                  <a:pt x="2423160" y="114300"/>
+                </a:cubicBezTo>
+                <a:cubicBezTo>
+                  <a:pt x="2583086" y="94309"/>
+                  <a:pt x="2564917" y="91516"/>
+                  <a:pt x="2800350" y="114300"/>
+                </a:cubicBezTo>
+                <a:cubicBezTo>
+                  <a:pt x="2824335" y="116621"/>
+                  <a:pt x="2844833" y="137160"/>
+                  <a:pt x="2868930" y="137160"/>
+                </a:cubicBezTo>
+                <a:lnTo>
+                  <a:pt x="2960370" y="137160"/>
+                </a:lnTo>
+              </a:path>
+            </a:pathLst>
+          </a:custGeom>
+          <a:noFill/>
+        </p:spPr>
+        <p:style>
+          <a:lnRef idx="2">
+            <a:schemeClr val="accent1">
+              <a:shade val="50000"/>
+            </a:schemeClr>
+          </a:lnRef>
+          <a:fillRef idx="1">
+            <a:schemeClr val="accent1"/>
+          </a:fillRef>
+          <a:effectRef idx="0">
+            <a:schemeClr val="accent1"/>
+          </a:effectRef>
+          <a:fontRef idx="minor">
+            <a:schemeClr val="lt1"/>
+          </a:fontRef>
+        </p:style>
+        <p:txBody>
+          <a:bodyPr rtlCol="0" anchor="ctr"/>
+          <a:lstStyle/>
+          <a:p>
+            <a:pPr algn="ctr"/>
+            <a:endParaRPr lang="en-US"/>
+          </a:p>
+        </p:txBody>
+      </p:sp>
+    </p:spTree>
+    <p:extLst>
+      <p:ext uri="{BB962C8B-B14F-4D97-AF65-F5344CB8AC3E}">
+        <p14:creationId xmlns:p14="http://schemas.microsoft.com/office/powerpoint/2010/main" val="1031450727"/>
+      </p:ext>
+    </p:extLst>
+  </p:cSld>
+  <p:clrMapOvr>
+    <a:masterClrMapping/>
+  </p:clrMapOvr>
+  <p:timing>
+    <p:tnLst>
+      <p:par>
+        <p:cTn id="1" dur="indefinite" restart="never" nodeType="tmRoot"/>
+      </p:par>
+    </p:tnLst>
+  </p:timing>
+</p:sld>
+</file>
+
+<file path=ppt/slides/slide7.xml><?xml version="1.0" encoding="utf-8"?>
+<p:sld xmlns:a="http://schemas.openxmlformats.org/drawingml/2006/main" xmlns:r="http://schemas.openxmlformats.org/officeDocument/2006/relationships" xmlns:p="http://schemas.openxmlformats.org/presentationml/2006/main">
+  <p:cSld>
+    <p:spTree>
+      <p:nvGrpSpPr>
+        <p:cNvPr id="1" name=""/>
+        <p:cNvGrpSpPr/>
+        <p:nvPr/>
+      </p:nvGrpSpPr>
+      <p:grpSpPr>
+        <a:xfrm>
+          <a:off x="0" y="0"/>
+          <a:ext cx="0" cy="0"/>
+          <a:chOff x="0" y="0"/>
+          <a:chExt cx="0" cy="0"/>
+        </a:xfrm>
+      </p:grpSpPr>
+      <p:sp>
+        <p:nvSpPr>
+          <p:cNvPr id="2" name="TextBox 1"/>
           <p:cNvSpPr txBox="1"/>
           <p:nvPr/>
         </p:nvSpPr>
@@ -4195,6 +7275,284 @@
             <a:pPr algn="ctr"/>
             <a:r>
               <a:rPr lang="en-US" sz="2400" dirty="0" smtClean="0"/>
+              <a:t>Proposed Policy Change</a:t>
+            </a:r>
+            <a:endParaRPr lang="en-US" sz="2400" dirty="0"/>
+          </a:p>
+        </p:txBody>
+      </p:sp>
+      <p:sp>
+        <p:nvSpPr>
+          <p:cNvPr id="3" name="TextBox 2"/>
+          <p:cNvSpPr txBox="1"/>
+          <p:nvPr/>
+        </p:nvSpPr>
+        <p:spPr>
+          <a:xfrm>
+            <a:off x="0" y="1007715"/>
+            <a:ext cx="9144000" cy="1495794"/>
+          </a:xfrm>
+          <a:prstGeom prst="rect">
+            <a:avLst/>
+          </a:prstGeom>
+          <a:noFill/>
+        </p:spPr>
+        <p:txBody>
+          <a:bodyPr wrap="square" lIns="365760" rIns="182880" rtlCol="0">
+            <a:spAutoFit/>
+          </a:bodyPr>
+          <a:lstStyle/>
+          <a:p>
+            <a:pPr marL="342900" indent="-342900">
+              <a:lnSpc>
+                <a:spcPct val="114000"/>
+              </a:lnSpc>
+              <a:buFont typeface="Arial" panose="020B0604020202020204" pitchFamily="34" charset="0"/>
+              <a:buChar char="•"/>
+            </a:pPr>
+            <a:r>
+              <a:rPr lang="en-US" sz="2000" dirty="0" smtClean="0"/>
+              <a:t>Maintain the minimum set-aside.</a:t>
+            </a:r>
+          </a:p>
+          <a:p>
+            <a:pPr marL="342900" indent="-342900">
+              <a:lnSpc>
+                <a:spcPct val="114000"/>
+              </a:lnSpc>
+              <a:buFont typeface="Arial" panose="020B0604020202020204" pitchFamily="34" charset="0"/>
+              <a:buChar char="•"/>
+            </a:pPr>
+            <a:r>
+              <a:rPr lang="en-US" sz="2000" dirty="0" smtClean="0"/>
+              <a:t>Convert from relative proposal ratings to absolute ratings.</a:t>
+            </a:r>
+          </a:p>
+          <a:p>
+            <a:pPr marL="342900" indent="-342900">
+              <a:lnSpc>
+                <a:spcPct val="114000"/>
+              </a:lnSpc>
+              <a:buFont typeface="Arial" panose="020B0604020202020204" pitchFamily="34" charset="0"/>
+              <a:buChar char="•"/>
+            </a:pPr>
+            <a:r>
+              <a:rPr lang="en-US" sz="2000" dirty="0" smtClean="0"/>
+              <a:t>Fund all proposals that rate as excellent or very </a:t>
+            </a:r>
+            <a:r>
+              <a:rPr lang="en-US" sz="2000" dirty="0" smtClean="0"/>
+              <a:t>good, while funding is available.</a:t>
+            </a:r>
+            <a:endParaRPr lang="en-US" sz="2000" dirty="0" smtClean="0"/>
+          </a:p>
+          <a:p>
+            <a:pPr marL="342900" indent="-342900">
+              <a:lnSpc>
+                <a:spcPct val="114000"/>
+              </a:lnSpc>
+              <a:buFont typeface="Arial" panose="020B0604020202020204" pitchFamily="34" charset="0"/>
+              <a:buChar char="•"/>
+            </a:pPr>
+            <a:r>
+              <a:rPr lang="en-US" sz="2000" dirty="0"/>
+              <a:t>Cap </a:t>
+            </a:r>
+            <a:r>
+              <a:rPr lang="en-US" sz="2000" dirty="0" smtClean="0"/>
+              <a:t>total annual SBIR funding </a:t>
+            </a:r>
+            <a:r>
+              <a:rPr lang="en-US" sz="2000" dirty="0"/>
+              <a:t>at </a:t>
+            </a:r>
+            <a:r>
+              <a:rPr lang="en-US" sz="2000" dirty="0" smtClean="0"/>
+              <a:t>15</a:t>
+            </a:r>
+            <a:r>
+              <a:rPr lang="en-US" sz="2000" dirty="0" smtClean="0"/>
+              <a:t>% </a:t>
+            </a:r>
+            <a:r>
+              <a:rPr lang="en-US" sz="2000" dirty="0"/>
+              <a:t>of extramural R&amp;D funding. </a:t>
+            </a:r>
+            <a:endParaRPr lang="en-US" sz="2400" dirty="0"/>
+          </a:p>
+        </p:txBody>
+      </p:sp>
+    </p:spTree>
+    <p:extLst>
+      <p:ext uri="{BB962C8B-B14F-4D97-AF65-F5344CB8AC3E}">
+        <p14:creationId xmlns:p14="http://schemas.microsoft.com/office/powerpoint/2010/main" val="886274995"/>
+      </p:ext>
+    </p:extLst>
+  </p:cSld>
+  <p:clrMapOvr>
+    <a:masterClrMapping/>
+  </p:clrMapOvr>
+  <p:timing>
+    <p:tnLst>
+      <p:par>
+        <p:cTn id="1" dur="indefinite" restart="never" nodeType="tmRoot"/>
+      </p:par>
+    </p:tnLst>
+  </p:timing>
+</p:sld>
+</file>
+
+<file path=ppt/slides/slide8.xml><?xml version="1.0" encoding="utf-8"?>
+<p:sld xmlns:a="http://schemas.openxmlformats.org/drawingml/2006/main" xmlns:r="http://schemas.openxmlformats.org/officeDocument/2006/relationships" xmlns:p="http://schemas.openxmlformats.org/presentationml/2006/main">
+  <p:cSld>
+    <p:spTree>
+      <p:nvGrpSpPr>
+        <p:cNvPr id="1" name=""/>
+        <p:cNvGrpSpPr/>
+        <p:nvPr/>
+      </p:nvGrpSpPr>
+      <p:grpSpPr>
+        <a:xfrm>
+          <a:off x="0" y="0"/>
+          <a:ext cx="0" cy="0"/>
+          <a:chOff x="0" y="0"/>
+          <a:chExt cx="0" cy="0"/>
+        </a:xfrm>
+      </p:grpSpPr>
+      <p:sp>
+        <p:nvSpPr>
+          <p:cNvPr id="2" name="TextBox 1"/>
+          <p:cNvSpPr txBox="1"/>
+          <p:nvPr/>
+        </p:nvSpPr>
+        <p:spPr>
+          <a:xfrm>
+            <a:off x="0" y="1028700"/>
+            <a:ext cx="9144000" cy="4247317"/>
+          </a:xfrm>
+          <a:prstGeom prst="rect">
+            <a:avLst/>
+          </a:prstGeom>
+          <a:noFill/>
+        </p:spPr>
+        <p:txBody>
+          <a:bodyPr wrap="square" lIns="182880" rIns="182880" rtlCol="0">
+            <a:spAutoFit/>
+          </a:bodyPr>
+          <a:lstStyle/>
+          <a:p>
+            <a:r>
+              <a:rPr lang="en-US" dirty="0" smtClean="0"/>
+              <a:t>SBIR/STTR Dashboard [data] (</a:t>
+            </a:r>
+            <a:r>
+              <a:rPr lang="en-US" dirty="0" err="1" smtClean="0"/>
+              <a:t>n.d.</a:t>
+            </a:r>
+            <a:r>
+              <a:rPr lang="en-US" dirty="0" smtClean="0"/>
+              <a:t>). Retrieved April 18, 2019, from https://www.sbir.gov/awards/annual-reports?view_by=Year</a:t>
+            </a:r>
+          </a:p>
+          <a:p>
+            <a:endParaRPr lang="en-US" dirty="0"/>
+          </a:p>
+          <a:p>
+            <a:r>
+              <a:rPr lang="en-US" dirty="0" smtClean="0"/>
+              <a:t>Small Business Innovation Act: 11th Annual Report. (1993). Retrieved from https://www.sbir.gov/sites/default/files/SBIR_1993.pdf</a:t>
+            </a:r>
+          </a:p>
+          <a:p>
+            <a:endParaRPr lang="en-US" dirty="0"/>
+          </a:p>
+          <a:p>
+            <a:r>
+              <a:rPr lang="en-US" dirty="0" smtClean="0"/>
+              <a:t>User: Robert. </a:t>
+            </a:r>
+            <a:r>
+              <a:rPr lang="en-US" dirty="0"/>
+              <a:t>(2001). North face south tower after plane strike </a:t>
+            </a:r>
+            <a:r>
+              <a:rPr lang="en-US" dirty="0" smtClean="0"/>
+              <a:t>9-11 </a:t>
+            </a:r>
+            <a:r>
+              <a:rPr lang="en-US" dirty="0"/>
+              <a:t>[Image]. </a:t>
+            </a:r>
+            <a:r>
+              <a:rPr lang="en-US" dirty="0" smtClean="0"/>
+              <a:t>[CC </a:t>
+            </a:r>
+            <a:r>
+              <a:rPr lang="en-US" dirty="0"/>
+              <a:t>BY-SA 2.0 https://</a:t>
+            </a:r>
+            <a:r>
+              <a:rPr lang="en-US" dirty="0" smtClean="0"/>
+              <a:t>creativecommons.org/licenses/by-sa/2.0] . No changes made. Retrieved April 19, 2019</a:t>
+            </a:r>
+            <a:r>
+              <a:rPr lang="en-US" dirty="0"/>
+              <a:t>, from https://commons.wikimedia.org/wiki/Category:Terrorism#/</a:t>
+            </a:r>
+            <a:r>
+              <a:rPr lang="en-US" dirty="0" smtClean="0"/>
+              <a:t>media/File:North_face_south_tower_after_plane_strike_9-11.jpg</a:t>
+            </a:r>
+          </a:p>
+          <a:p>
+            <a:endParaRPr lang="en-US" dirty="0"/>
+          </a:p>
+          <a:p>
+            <a:r>
+              <a:rPr lang="en-US" dirty="0" smtClean="0"/>
+              <a:t>User: </a:t>
+            </a:r>
+            <a:r>
+              <a:rPr lang="en-US" dirty="0" err="1" smtClean="0"/>
+              <a:t>DavidBailey</a:t>
+            </a:r>
+            <a:r>
+              <a:rPr lang="en-US" dirty="0" smtClean="0"/>
+              <a:t>. (2009). A dry riverbed in California [Image]. No changes made. Retrieved April 19, 2019</a:t>
+            </a:r>
+            <a:r>
+              <a:rPr lang="en-US" dirty="0"/>
+              <a:t>, from https://commons.wikimedia.org/wiki/File:California_Drought_Dry_Riverbed_2009.jpg</a:t>
+            </a:r>
+            <a:endParaRPr lang="en-US" dirty="0" smtClean="0"/>
+          </a:p>
+        </p:txBody>
+      </p:sp>
+      <p:sp>
+        <p:nvSpPr>
+          <p:cNvPr id="3" name="TextBox 2"/>
+          <p:cNvSpPr txBox="1"/>
+          <p:nvPr/>
+        </p:nvSpPr>
+        <p:spPr>
+          <a:xfrm>
+            <a:off x="0" y="266700"/>
+            <a:ext cx="9144000" cy="461665"/>
+          </a:xfrm>
+          <a:prstGeom prst="rect">
+            <a:avLst/>
+          </a:prstGeom>
+          <a:noFill/>
+        </p:spPr>
+        <p:txBody>
+          <a:bodyPr wrap="square" rtlCol="0">
+            <a:spAutoFit/>
+          </a:bodyPr>
+          <a:lstStyle/>
+          <a:p>
+            <a:pPr algn="ctr"/>
+            <a:r>
+              <a:rPr lang="en-US" sz="2400" dirty="0" smtClean="0"/>
               <a:t>References</a:t>
             </a:r>
             <a:endParaRPr lang="en-US" sz="2400" dirty="0"/>
@@ -4205,6 +7563,157 @@
     <p:extLst>
       <p:ext uri="{BB962C8B-B14F-4D97-AF65-F5344CB8AC3E}">
         <p14:creationId xmlns:p14="http://schemas.microsoft.com/office/powerpoint/2010/main" val="242620626"/>
+      </p:ext>
+    </p:extLst>
+  </p:cSld>
+  <p:clrMapOvr>
+    <a:masterClrMapping/>
+  </p:clrMapOvr>
+  <p:timing>
+    <p:tnLst>
+      <p:par>
+        <p:cTn id="1" dur="indefinite" restart="never" nodeType="tmRoot"/>
+      </p:par>
+    </p:tnLst>
+  </p:timing>
+</p:sld>
+</file>
+
+<file path=ppt/slides/slide9.xml><?xml version="1.0" encoding="utf-8"?>
+<p:sld xmlns:a="http://schemas.openxmlformats.org/drawingml/2006/main" xmlns:r="http://schemas.openxmlformats.org/officeDocument/2006/relationships" xmlns:p="http://schemas.openxmlformats.org/presentationml/2006/main">
+  <p:cSld>
+    <p:spTree>
+      <p:nvGrpSpPr>
+        <p:cNvPr id="1" name=""/>
+        <p:cNvGrpSpPr/>
+        <p:nvPr/>
+      </p:nvGrpSpPr>
+      <p:grpSpPr>
+        <a:xfrm>
+          <a:off x="0" y="0"/>
+          <a:ext cx="0" cy="0"/>
+          <a:chOff x="0" y="0"/>
+          <a:chExt cx="0" cy="0"/>
+        </a:xfrm>
+      </p:grpSpPr>
+      <p:sp>
+        <p:nvSpPr>
+          <p:cNvPr id="2" name="TextBox 1"/>
+          <p:cNvSpPr txBox="1"/>
+          <p:nvPr/>
+        </p:nvSpPr>
+        <p:spPr>
+          <a:xfrm>
+            <a:off x="0" y="1028700"/>
+            <a:ext cx="9144000" cy="3693319"/>
+          </a:xfrm>
+          <a:prstGeom prst="rect">
+            <a:avLst/>
+          </a:prstGeom>
+          <a:noFill/>
+        </p:spPr>
+        <p:txBody>
+          <a:bodyPr wrap="square" lIns="182880" rIns="182880" rtlCol="0">
+            <a:spAutoFit/>
+          </a:bodyPr>
+          <a:lstStyle/>
+          <a:p>
+            <a:r>
+              <a:rPr lang="en-US" dirty="0" smtClean="0"/>
+              <a:t>User: </a:t>
+            </a:r>
+            <a:r>
+              <a:rPr lang="en-US" dirty="0" err="1" smtClean="0"/>
+              <a:t>Lokal_Profil</a:t>
+            </a:r>
+            <a:r>
+              <a:rPr lang="en-US" dirty="0" smtClean="0"/>
+              <a:t>. (2007). Blank outline of the US [Image]. </a:t>
+            </a:r>
+            <a:r>
+              <a:rPr lang="en-US" dirty="0"/>
+              <a:t>CC-BY-SA 2.5 [https://</a:t>
+            </a:r>
+            <a:r>
+              <a:rPr lang="en-US" dirty="0" smtClean="0"/>
+              <a:t>creativecommons.org/licenses/by-sa/2.5].  Photocopy effect added. Retrieved April 19, 2019</a:t>
+            </a:r>
+            <a:r>
+              <a:rPr lang="en-US" dirty="0"/>
+              <a:t>, from https://commons.wikimedia.org/wiki/United_States#/media/File:Blank_US_Map,_</a:t>
+            </a:r>
+            <a:r>
+              <a:rPr lang="en-US" dirty="0" smtClean="0"/>
+              <a:t>Mainland_with_no_States.svg</a:t>
+            </a:r>
+          </a:p>
+          <a:p>
+            <a:endParaRPr lang="en-US" dirty="0"/>
+          </a:p>
+          <a:p>
+            <a:r>
+              <a:rPr lang="en-US" dirty="0" smtClean="0"/>
+              <a:t>User: Kremlin.ru. (2006). Official portrait of </a:t>
+            </a:r>
+            <a:r>
+              <a:rPr lang="en-US" dirty="0" err="1" smtClean="0"/>
+              <a:t>Vladmir</a:t>
+            </a:r>
+            <a:r>
+              <a:rPr lang="en-US" dirty="0" smtClean="0"/>
+              <a:t> Putin [Image]. </a:t>
+            </a:r>
+            <a:r>
+              <a:rPr lang="en-US" dirty="0"/>
+              <a:t>CC-BY 4.0 [https://</a:t>
+            </a:r>
+            <a:r>
+              <a:rPr lang="en-US" dirty="0" smtClean="0"/>
+              <a:t>creativecommons.org/licenses/by/4.0]. No changes made. Retrieved April 19, 2019</a:t>
+            </a:r>
+            <a:r>
+              <a:rPr lang="en-US" dirty="0"/>
+              <a:t>, from https://commons.wikimedia.org/w/index.php?title=Special:Search&amp;limit=500&amp;offset=0&amp;profile=default&amp;search=putin&amp;advancedSearch-current=%7B%7D&amp;ns0=1&amp;ns6=1&amp;ns12=1&amp;ns14=1&amp;ns100=1&amp;ns106=1&amp;searchToken=bcmpm63q76wb4lqzinwofwy4t#%2Fmedia%2FFile%3AVladimir_Putin_-_2006.jpg</a:t>
+            </a:r>
+            <a:endParaRPr lang="en-US" dirty="0" smtClean="0"/>
+          </a:p>
+        </p:txBody>
+      </p:sp>
+      <p:sp>
+        <p:nvSpPr>
+          <p:cNvPr id="3" name="TextBox 2"/>
+          <p:cNvSpPr txBox="1"/>
+          <p:nvPr/>
+        </p:nvSpPr>
+        <p:spPr>
+          <a:xfrm>
+            <a:off x="0" y="266700"/>
+            <a:ext cx="9144000" cy="461665"/>
+          </a:xfrm>
+          <a:prstGeom prst="rect">
+            <a:avLst/>
+          </a:prstGeom>
+          <a:noFill/>
+        </p:spPr>
+        <p:txBody>
+          <a:bodyPr wrap="square" rtlCol="0">
+            <a:spAutoFit/>
+          </a:bodyPr>
+          <a:lstStyle/>
+          <a:p>
+            <a:pPr algn="ctr"/>
+            <a:r>
+              <a:rPr lang="en-US" sz="2400" dirty="0" smtClean="0"/>
+              <a:t>References</a:t>
+            </a:r>
+            <a:endParaRPr lang="en-US" sz="2400" dirty="0"/>
+          </a:p>
+        </p:txBody>
+      </p:sp>
+    </p:spTree>
+    <p:extLst>
+      <p:ext uri="{BB962C8B-B14F-4D97-AF65-F5344CB8AC3E}">
+        <p14:creationId xmlns:p14="http://schemas.microsoft.com/office/powerpoint/2010/main" val="1749662596"/>
       </p:ext>
     </p:extLst>
   </p:cSld>

</xml_diff>

<commit_message>
Format notes for final exam questions
</commit_message>
<xml_diff>
--- a/FinalProject/Docs/Townes_POLS6310_2019_Spring_FinalProject_Presentation_v00.pptx
+++ b/FinalProject/Docs/Townes_POLS6310_2019_Spring_FinalProject_Presentation_v00.pptx
@@ -551,11 +551,11 @@
           <c:showPercent val="0"/>
           <c:showBubbleSize val="0"/>
         </c:dLbls>
-        <c:axId val="198540288"/>
-        <c:axId val="198542080"/>
+        <c:axId val="181764864"/>
+        <c:axId val="181766400"/>
       </c:scatterChart>
       <c:valAx>
-        <c:axId val="198540288"/>
+        <c:axId val="181764864"/>
         <c:scaling>
           <c:orientation val="minMax"/>
           <c:max val="2015"/>
@@ -567,13 +567,13 @@
         <c:majorTickMark val="cross"/>
         <c:minorTickMark val="out"/>
         <c:tickLblPos val="nextTo"/>
-        <c:crossAx val="198542080"/>
+        <c:crossAx val="181766400"/>
         <c:crosses val="autoZero"/>
         <c:crossBetween val="midCat"/>
         <c:minorUnit val="1"/>
       </c:valAx>
       <c:valAx>
-        <c:axId val="198542080"/>
+        <c:axId val="181766400"/>
         <c:scaling>
           <c:orientation val="minMax"/>
         </c:scaling>
@@ -584,7 +584,7 @@
         <c:majorTickMark val="out"/>
         <c:minorTickMark val="none"/>
         <c:tickLblPos val="nextTo"/>
-        <c:crossAx val="198540288"/>
+        <c:crossAx val="181764864"/>
         <c:crosses val="autoZero"/>
         <c:crossBetween val="midCat"/>
       </c:valAx>
@@ -1289,11 +1289,11 @@
           <c:showPercent val="0"/>
           <c:showBubbleSize val="0"/>
         </c:dLbls>
-        <c:axId val="698886784"/>
-        <c:axId val="698901248"/>
+        <c:axId val="119933568"/>
+        <c:axId val="119935744"/>
       </c:scatterChart>
       <c:valAx>
-        <c:axId val="698886784"/>
+        <c:axId val="119933568"/>
         <c:scaling>
           <c:orientation val="minMax"/>
           <c:max val="2015"/>
@@ -1305,12 +1305,12 @@
         <c:majorTickMark val="cross"/>
         <c:minorTickMark val="out"/>
         <c:tickLblPos val="nextTo"/>
-        <c:crossAx val="698901248"/>
+        <c:crossAx val="119935744"/>
         <c:crosses val="autoZero"/>
         <c:crossBetween val="midCat"/>
       </c:valAx>
       <c:valAx>
-        <c:axId val="698901248"/>
+        <c:axId val="119935744"/>
         <c:scaling>
           <c:orientation val="minMax"/>
         </c:scaling>
@@ -1321,7 +1321,7 @@
         <c:majorTickMark val="out"/>
         <c:minorTickMark val="none"/>
         <c:tickLblPos val="nextTo"/>
-        <c:crossAx val="698886784"/>
+        <c:crossAx val="119933568"/>
         <c:crosses val="autoZero"/>
         <c:crossBetween val="midCat"/>
       </c:valAx>
@@ -1697,6 +1697,106 @@
 </file>
 
 <file path=ppt/notesSlides/notesSlide1.xml><?xml version="1.0" encoding="utf-8"?>
+<p:notes xmlns:a="http://schemas.openxmlformats.org/drawingml/2006/main" xmlns:r="http://schemas.openxmlformats.org/officeDocument/2006/relationships" xmlns:p="http://schemas.openxmlformats.org/presentationml/2006/main">
+  <p:cSld>
+    <p:spTree>
+      <p:nvGrpSpPr>
+        <p:cNvPr id="1" name=""/>
+        <p:cNvGrpSpPr/>
+        <p:nvPr/>
+      </p:nvGrpSpPr>
+      <p:grpSpPr>
+        <a:xfrm>
+          <a:off x="0" y="0"/>
+          <a:ext cx="0" cy="0"/>
+          <a:chOff x="0" y="0"/>
+          <a:chExt cx="0" cy="0"/>
+        </a:xfrm>
+      </p:grpSpPr>
+      <p:sp>
+        <p:nvSpPr>
+          <p:cNvPr id="2" name="Slide Image Placeholder 1"/>
+          <p:cNvSpPr>
+            <a:spLocks noGrp="1" noRot="1" noChangeAspect="1"/>
+          </p:cNvSpPr>
+          <p:nvPr>
+            <p:ph type="sldImg"/>
+          </p:nvPr>
+        </p:nvSpPr>
+        <p:spPr/>
+      </p:sp>
+      <p:sp>
+        <p:nvSpPr>
+          <p:cNvPr id="3" name="Notes Placeholder 2"/>
+          <p:cNvSpPr>
+            <a:spLocks noGrp="1"/>
+          </p:cNvSpPr>
+          <p:nvPr>
+            <p:ph type="body" idx="1"/>
+          </p:nvPr>
+        </p:nvSpPr>
+        <p:spPr/>
+        <p:txBody>
+          <a:bodyPr/>
+          <a:lstStyle/>
+          <a:p>
+            <a:r>
+              <a:rPr lang="en-US" dirty="0" smtClean="0"/>
+              <a:t>Why one problem definition over another?</a:t>
+            </a:r>
+          </a:p>
+          <a:p>
+            <a:r>
+              <a:rPr lang="en-US" dirty="0" smtClean="0"/>
+              <a:t>How the politics surrounding the issue can be managed?</a:t>
+            </a:r>
+          </a:p>
+          <a:p>
+            <a:r>
+              <a:rPr lang="en-US" dirty="0" smtClean="0"/>
+              <a:t>What model of policy process are you assuming and why?</a:t>
+            </a:r>
+            <a:endParaRPr lang="en-US" dirty="0"/>
+          </a:p>
+        </p:txBody>
+      </p:sp>
+      <p:sp>
+        <p:nvSpPr>
+          <p:cNvPr id="4" name="Slide Number Placeholder 3"/>
+          <p:cNvSpPr>
+            <a:spLocks noGrp="1"/>
+          </p:cNvSpPr>
+          <p:nvPr>
+            <p:ph type="sldNum" sz="quarter" idx="10"/>
+          </p:nvPr>
+        </p:nvSpPr>
+        <p:spPr/>
+        <p:txBody>
+          <a:bodyPr/>
+          <a:lstStyle/>
+          <a:p>
+            <a:fld id="{859DE06D-F133-4988-97F6-9372E6CBBFD7}" type="slidenum">
+              <a:rPr lang="en-US" smtClean="0"/>
+              <a:t>1</a:t>
+            </a:fld>
+            <a:endParaRPr lang="en-US"/>
+          </a:p>
+        </p:txBody>
+      </p:sp>
+    </p:spTree>
+    <p:extLst>
+      <p:ext uri="{BB962C8B-B14F-4D97-AF65-F5344CB8AC3E}">
+        <p14:creationId xmlns:p14="http://schemas.microsoft.com/office/powerpoint/2010/main" val="2336215741"/>
+      </p:ext>
+    </p:extLst>
+  </p:cSld>
+  <p:clrMapOvr>
+    <a:masterClrMapping/>
+  </p:clrMapOvr>
+</p:notes>
+</file>
+
+<file path=ppt/notesSlides/notesSlide2.xml><?xml version="1.0" encoding="utf-8"?>
 <p:notes xmlns:a="http://schemas.openxmlformats.org/drawingml/2006/main" xmlns:r="http://schemas.openxmlformats.org/officeDocument/2006/relationships" xmlns:p="http://schemas.openxmlformats.org/presentationml/2006/main">
   <p:cSld>
     <p:spTree>
@@ -4804,11 +4904,11 @@
             <a:pPr algn="ctr"/>
             <a:r>
               <a:rPr lang="en-US" sz="3200" b="1" dirty="0" smtClean="0"/>
-              <a:t>Rethinking </a:t>
+              <a:t>Rethinking the </a:t>
             </a:r>
             <a:r>
               <a:rPr lang="en-US" sz="3200" b="1" dirty="0" smtClean="0"/>
-              <a:t>the Set-Aside Requirement of the </a:t>
+              <a:t>Policy Design of the </a:t>
             </a:r>
             <a:r>
               <a:rPr lang="en-US" sz="3200" b="1" dirty="0" smtClean="0"/>
@@ -7338,13 +7438,8 @@
             </a:pPr>
             <a:r>
               <a:rPr lang="en-US" sz="2000" dirty="0" smtClean="0"/>
-              <a:t>Fund all proposals that rate as excellent or very </a:t>
-            </a:r>
-            <a:r>
-              <a:rPr lang="en-US" sz="2000" dirty="0" smtClean="0"/>
-              <a:t>good, while funding is available.</a:t>
-            </a:r>
-            <a:endParaRPr lang="en-US" sz="2000" dirty="0" smtClean="0"/>
+              <a:t>Fund all proposals that rate as excellent or very good, while funding is available.</a:t>
+            </a:r>
           </a:p>
           <a:p>
             <a:pPr marL="342900" indent="-342900">
@@ -7368,11 +7463,7 @@
             </a:r>
             <a:r>
               <a:rPr lang="en-US" sz="2000" dirty="0" smtClean="0"/>
-              <a:t>15</a:t>
-            </a:r>
-            <a:r>
-              <a:rPr lang="en-US" sz="2000" dirty="0" smtClean="0"/>
-              <a:t>% </a:t>
+              <a:t>15% </a:t>
             </a:r>
             <a:r>
               <a:rPr lang="en-US" sz="2000" dirty="0"/>

</xml_diff>

<commit_message>
Modified presentation for FinalProject
</commit_message>
<xml_diff>
--- a/FinalProject/Docs/Townes_POLS6310_2019_Spring_FinalProject_Presentation_v00.pptx
+++ b/FinalProject/Docs/Townes_POLS6310_2019_Spring_FinalProject_Presentation_v00.pptx
@@ -5,18 +5,20 @@
     <p:sldMasterId id="2147483648" r:id="rId1"/>
   </p:sldMasterIdLst>
   <p:notesMasterIdLst>
-    <p:notesMasterId r:id="rId11"/>
+    <p:notesMasterId r:id="rId13"/>
   </p:notesMasterIdLst>
   <p:sldIdLst>
     <p:sldId id="256" r:id="rId2"/>
-    <p:sldId id="257" r:id="rId3"/>
-    <p:sldId id="259" r:id="rId4"/>
-    <p:sldId id="265" r:id="rId5"/>
-    <p:sldId id="262" r:id="rId6"/>
-    <p:sldId id="264" r:id="rId7"/>
-    <p:sldId id="261" r:id="rId8"/>
-    <p:sldId id="258" r:id="rId9"/>
-    <p:sldId id="263" r:id="rId10"/>
+    <p:sldId id="266" r:id="rId3"/>
+    <p:sldId id="262" r:id="rId4"/>
+    <p:sldId id="257" r:id="rId5"/>
+    <p:sldId id="259" r:id="rId6"/>
+    <p:sldId id="265" r:id="rId7"/>
+    <p:sldId id="264" r:id="rId8"/>
+    <p:sldId id="261" r:id="rId9"/>
+    <p:sldId id="267" r:id="rId10"/>
+    <p:sldId id="258" r:id="rId11"/>
+    <p:sldId id="263" r:id="rId12"/>
   </p:sldIdLst>
   <p:sldSz cx="9144000" cy="5715000" type="screen16x10"/>
   <p:notesSz cx="6858000" cy="9144000"/>
@@ -551,11 +553,11 @@
           <c:showPercent val="0"/>
           <c:showBubbleSize val="0"/>
         </c:dLbls>
-        <c:axId val="181764864"/>
-        <c:axId val="181766400"/>
+        <c:axId val="158505216"/>
+        <c:axId val="158507008"/>
       </c:scatterChart>
       <c:valAx>
-        <c:axId val="181764864"/>
+        <c:axId val="158505216"/>
         <c:scaling>
           <c:orientation val="minMax"/>
           <c:max val="2015"/>
@@ -567,13 +569,13 @@
         <c:majorTickMark val="cross"/>
         <c:minorTickMark val="out"/>
         <c:tickLblPos val="nextTo"/>
-        <c:crossAx val="181766400"/>
+        <c:crossAx val="158507008"/>
         <c:crosses val="autoZero"/>
         <c:crossBetween val="midCat"/>
         <c:minorUnit val="1"/>
       </c:valAx>
       <c:valAx>
-        <c:axId val="181766400"/>
+        <c:axId val="158507008"/>
         <c:scaling>
           <c:orientation val="minMax"/>
         </c:scaling>
@@ -584,7 +586,7 @@
         <c:majorTickMark val="out"/>
         <c:minorTickMark val="none"/>
         <c:tickLblPos val="nextTo"/>
-        <c:crossAx val="181764864"/>
+        <c:crossAx val="158505216"/>
         <c:crosses val="autoZero"/>
         <c:crossBetween val="midCat"/>
       </c:valAx>
@@ -629,11 +631,313 @@
             </a:pPr>
             <a:r>
               <a:rPr lang="en-US"/>
-              <a:t>Targets for Small</a:t>
+              <a:t>Utilization Efficiency</a:t>
             </a:r>
             <a:r>
               <a:rPr lang="en-US" baseline="0"/>
-              <a:t> Business R&amp;D Funding</a:t>
+              <a:t> of </a:t>
+            </a:r>
+            <a:r>
+              <a:rPr lang="en-US"/>
+              <a:t>Small Business for </a:t>
+            </a:r>
+            <a:r>
+              <a:rPr lang="en-US" baseline="0"/>
+              <a:t>Federally-Funded R&amp;D</a:t>
+            </a:r>
+            <a:endParaRPr lang="en-US"/>
+          </a:p>
+        </c:rich>
+      </c:tx>
+      <c:layout/>
+      <c:overlay val="0"/>
+    </c:title>
+    <c:autoTitleDeleted val="0"/>
+    <c:plotArea>
+      <c:layout/>
+      <c:scatterChart>
+        <c:scatterStyle val="lineMarker"/>
+        <c:varyColors val="0"/>
+        <c:ser>
+          <c:idx val="0"/>
+          <c:order val="0"/>
+          <c:tx>
+            <c:strRef>
+              <c:f>Chart!$T$1</c:f>
+              <c:strCache>
+                <c:ptCount val="1"/>
+                <c:pt idx="0">
+                  <c:v>SBIR Pct of Potential</c:v>
+                </c:pt>
+              </c:strCache>
+            </c:strRef>
+          </c:tx>
+          <c:xVal>
+            <c:numRef>
+              <c:f>Chart!$S$2:$S$27</c:f>
+              <c:numCache>
+                <c:formatCode>General</c:formatCode>
+                <c:ptCount val="26"/>
+                <c:pt idx="0">
+                  <c:v>1990</c:v>
+                </c:pt>
+                <c:pt idx="1">
+                  <c:v>1991</c:v>
+                </c:pt>
+                <c:pt idx="2">
+                  <c:v>1992</c:v>
+                </c:pt>
+                <c:pt idx="3">
+                  <c:v>1993</c:v>
+                </c:pt>
+                <c:pt idx="4">
+                  <c:v>1994</c:v>
+                </c:pt>
+                <c:pt idx="5">
+                  <c:v>1995</c:v>
+                </c:pt>
+                <c:pt idx="6">
+                  <c:v>1996</c:v>
+                </c:pt>
+                <c:pt idx="7">
+                  <c:v>1997</c:v>
+                </c:pt>
+                <c:pt idx="8">
+                  <c:v>1998</c:v>
+                </c:pt>
+                <c:pt idx="9">
+                  <c:v>1999</c:v>
+                </c:pt>
+                <c:pt idx="10">
+                  <c:v>2000</c:v>
+                </c:pt>
+                <c:pt idx="11">
+                  <c:v>2001</c:v>
+                </c:pt>
+                <c:pt idx="12">
+                  <c:v>2002</c:v>
+                </c:pt>
+                <c:pt idx="13">
+                  <c:v>2003</c:v>
+                </c:pt>
+                <c:pt idx="14">
+                  <c:v>2004</c:v>
+                </c:pt>
+                <c:pt idx="15">
+                  <c:v>2005</c:v>
+                </c:pt>
+                <c:pt idx="16">
+                  <c:v>2006</c:v>
+                </c:pt>
+                <c:pt idx="17">
+                  <c:v>2007</c:v>
+                </c:pt>
+                <c:pt idx="18">
+                  <c:v>2008</c:v>
+                </c:pt>
+                <c:pt idx="19">
+                  <c:v>2009</c:v>
+                </c:pt>
+                <c:pt idx="20">
+                  <c:v>2010</c:v>
+                </c:pt>
+                <c:pt idx="21">
+                  <c:v>2011</c:v>
+                </c:pt>
+                <c:pt idx="22">
+                  <c:v>2012</c:v>
+                </c:pt>
+                <c:pt idx="23">
+                  <c:v>2013</c:v>
+                </c:pt>
+                <c:pt idx="24">
+                  <c:v>2014</c:v>
+                </c:pt>
+                <c:pt idx="25">
+                  <c:v>2015</c:v>
+                </c:pt>
+              </c:numCache>
+            </c:numRef>
+          </c:xVal>
+          <c:yVal>
+            <c:numRef>
+              <c:f>Chart!$T$2:$T$27</c:f>
+              <c:numCache>
+                <c:formatCode>0.00%</c:formatCode>
+                <c:ptCount val="26"/>
+                <c:pt idx="0">
+                  <c:v>0.31291336079903176</c:v>
+                </c:pt>
+                <c:pt idx="1">
+                  <c:v>0.31696110663001692</c:v>
+                </c:pt>
+                <c:pt idx="2">
+                  <c:v>0.31870133940698325</c:v>
+                </c:pt>
+                <c:pt idx="3">
+                  <c:v>0.31870133940698325</c:v>
+                </c:pt>
+                <c:pt idx="4">
+                  <c:v>0.29695819850537519</c:v>
+                </c:pt>
+                <c:pt idx="5">
+                  <c:v>0.31417322434052192</c:v>
+                </c:pt>
+                <c:pt idx="6">
+                  <c:v>0.32517907384116584</c:v>
+                </c:pt>
+                <c:pt idx="7">
+                  <c:v>0.32281249471455076</c:v>
+                </c:pt>
+                <c:pt idx="8">
+                  <c:v>0.33640808016064533</c:v>
+                </c:pt>
+                <c:pt idx="9">
+                  <c:v>0.33640808016064533</c:v>
+                </c:pt>
+                <c:pt idx="10">
+                  <c:v>0.30303721931421135</c:v>
+                </c:pt>
+                <c:pt idx="11">
+                  <c:v>0.33893339454943977</c:v>
+                </c:pt>
+                <c:pt idx="12">
+                  <c:v>0.29501687736228793</c:v>
+                </c:pt>
+                <c:pt idx="13">
+                  <c:v>0.32784927351810844</c:v>
+                </c:pt>
+                <c:pt idx="14">
+                  <c:v>0.32311974698661361</c:v>
+                </c:pt>
+                <c:pt idx="15">
+                  <c:v>0.34497296569717978</c:v>
+                </c:pt>
+                <c:pt idx="16">
+                  <c:v>0.37183833435567315</c:v>
+                </c:pt>
+                <c:pt idx="17">
+                  <c:v>0.38686490932385847</c:v>
+                </c:pt>
+                <c:pt idx="18">
+                  <c:v>0.38033887264106064</c:v>
+                </c:pt>
+                <c:pt idx="19">
+                  <c:v>0.3777798937824654</c:v>
+                </c:pt>
+                <c:pt idx="20">
+                  <c:v>0.3618273688942481</c:v>
+                </c:pt>
+                <c:pt idx="21">
+                  <c:v>0.43454022001553017</c:v>
+                </c:pt>
+                <c:pt idx="22">
+                  <c:v>0.40209987908471057</c:v>
+                </c:pt>
+                <c:pt idx="23">
+                  <c:v>0.42696431913244037</c:v>
+                </c:pt>
+                <c:pt idx="24">
+                  <c:v>0.41602855319559939</c:v>
+                </c:pt>
+                <c:pt idx="25">
+                  <c:v>0.45636985906238581</c:v>
+                </c:pt>
+              </c:numCache>
+            </c:numRef>
+          </c:yVal>
+          <c:smooth val="0"/>
+        </c:ser>
+        <c:dLbls>
+          <c:showLegendKey val="0"/>
+          <c:showVal val="0"/>
+          <c:showCatName val="0"/>
+          <c:showSerName val="0"/>
+          <c:showPercent val="0"/>
+          <c:showBubbleSize val="0"/>
+        </c:dLbls>
+        <c:axId val="198032384"/>
+        <c:axId val="198157056"/>
+      </c:scatterChart>
+      <c:valAx>
+        <c:axId val="198032384"/>
+        <c:scaling>
+          <c:orientation val="minMax"/>
+          <c:max val="2015"/>
+          <c:min val="1990"/>
+        </c:scaling>
+        <c:delete val="0"/>
+        <c:axPos val="b"/>
+        <c:numFmt formatCode="General" sourceLinked="1"/>
+        <c:majorTickMark val="cross"/>
+        <c:minorTickMark val="out"/>
+        <c:tickLblPos val="nextTo"/>
+        <c:crossAx val="198157056"/>
+        <c:crosses val="autoZero"/>
+        <c:crossBetween val="midCat"/>
+      </c:valAx>
+      <c:valAx>
+        <c:axId val="198157056"/>
+        <c:scaling>
+          <c:orientation val="minMax"/>
+        </c:scaling>
+        <c:delete val="0"/>
+        <c:axPos val="l"/>
+        <c:majorGridlines/>
+        <c:numFmt formatCode="0.00%" sourceLinked="1"/>
+        <c:majorTickMark val="out"/>
+        <c:minorTickMark val="none"/>
+        <c:tickLblPos val="nextTo"/>
+        <c:crossAx val="198032384"/>
+        <c:crosses val="autoZero"/>
+        <c:crossBetween val="midCat"/>
+      </c:valAx>
+    </c:plotArea>
+    <c:plotVisOnly val="1"/>
+    <c:dispBlanksAs val="gap"/>
+    <c:showDLblsOverMax val="0"/>
+  </c:chart>
+  <c:spPr>
+    <a:ln>
+      <a:noFill/>
+    </a:ln>
+  </c:spPr>
+  <c:externalData r:id="rId1">
+    <c:autoUpdate val="0"/>
+  </c:externalData>
+</c:chartSpace>
+</file>
+
+<file path=ppt/charts/chart3.xml><?xml version="1.0" encoding="utf-8"?>
+<c:chartSpace xmlns:c="http://schemas.openxmlformats.org/drawingml/2006/chart" xmlns:a="http://schemas.openxmlformats.org/drawingml/2006/main" xmlns:r="http://schemas.openxmlformats.org/officeDocument/2006/relationships">
+  <c:date1904 val="0"/>
+  <c:lang val="en-US"/>
+  <c:roundedCorners val="0"/>
+  <mc:AlternateContent xmlns:mc="http://schemas.openxmlformats.org/markup-compatibility/2006">
+    <mc:Choice xmlns:c14="http://schemas.microsoft.com/office/drawing/2007/8/2/chart" Requires="c14">
+      <c14:style val="102"/>
+    </mc:Choice>
+    <mc:Fallback>
+      <c:style val="2"/>
+    </mc:Fallback>
+  </mc:AlternateContent>
+  <c:chart>
+    <c:title>
+      <c:tx>
+        <c:rich>
+          <a:bodyPr/>
+          <a:lstStyle/>
+          <a:p>
+            <a:pPr>
+              <a:defRPr/>
+            </a:pPr>
+            <a:r>
+              <a:rPr lang="en-US"/>
+              <a:t>Small</a:t>
+            </a:r>
+            <a:r>
+              <a:rPr lang="en-US" baseline="0"/>
+              <a:t> Business Participation in Federally Funded R&amp;D</a:t>
             </a:r>
             <a:endParaRPr lang="en-US"/>
           </a:p>
@@ -990,82 +1294,82 @@
                 <c:formatCode>0.00%</c:formatCode>
                 <c:ptCount val="26"/>
                 <c:pt idx="0">
-                  <c:v>4.5346288932896141E-2</c:v>
+                  <c:v>2.5710550768848112E-2</c:v>
                 </c:pt>
                 <c:pt idx="1">
-                  <c:v>5.221862614201879E-2</c:v>
+                  <c:v>2.9699625019090455E-2</c:v>
                 </c:pt>
                 <c:pt idx="2">
-                  <c:v>4.8527854451927276E-2</c:v>
+                  <c:v>2.7554206482956603E-2</c:v>
                 </c:pt>
                 <c:pt idx="3">
-                  <c:v>6.5700764877829623E-2</c:v>
+                  <c:v>3.7598308316348257E-2</c:v>
                 </c:pt>
                 <c:pt idx="4">
-                  <c:v>7.1988122820615633E-2</c:v>
+                  <c:v>4.1315272184054404E-2</c:v>
                 </c:pt>
                 <c:pt idx="5">
-                  <c:v>8.2662367756665481E-2</c:v>
+                  <c:v>4.7675063708869737E-2</c:v>
                 </c:pt>
                 <c:pt idx="6">
-                  <c:v>8.4276464979243265E-2</c:v>
+                  <c:v>4.8642211030432578E-2</c:v>
                 </c:pt>
                 <c:pt idx="7">
-                  <c:v>9.9313486905973788E-2</c:v>
+                  <c:v>5.7721968253696798E-2</c:v>
                 </c:pt>
                 <c:pt idx="8">
-                  <c:v>9.5433980174787908E-2</c:v>
+                  <c:v>5.5367287017810858E-2</c:v>
                 </c:pt>
                 <c:pt idx="9">
-                  <c:v>9.2905487302346657E-2</c:v>
+                  <c:v>5.3837167747786491E-2</c:v>
                 </c:pt>
                 <c:pt idx="10">
-                  <c:v>0.1174960330668553</c:v>
+                  <c:v>6.8872106974220498E-2</c:v>
                 </c:pt>
                 <c:pt idx="11">
-                  <c:v>0.13157754429262633</c:v>
+                  <c:v>7.7638872229034789E-2</c:v>
                 </c:pt>
                 <c:pt idx="12">
-                  <c:v>0.12645530295920784</c:v>
+                  <c:v>7.4436450016466676E-2</c:v>
                 </c:pt>
                 <c:pt idx="13">
-                  <c:v>0.1225168202707379</c:v>
+                  <c:v>7.1984599830261092E-2</c:v>
                 </c:pt>
                 <c:pt idx="14">
-                  <c:v>0.12643900059712318</c:v>
+                  <c:v>7.4426282452373926E-2</c:v>
                 </c:pt>
                 <c:pt idx="15">
-                  <c:v>0.10968641899381416</c:v>
+                  <c:v>6.4059783089266603E-2</c:v>
                 </c:pt>
                 <c:pt idx="16">
-                  <c:v>9.8048230088917832E-2</c:v>
+                  <c:v>5.6953082929089745E-2</c:v>
                 </c:pt>
                 <c:pt idx="17">
-                  <c:v>8.8303613220131097E-2</c:v>
+                  <c:v>5.1061526123744261E-2</c:v>
                 </c:pt>
                 <c:pt idx="18">
-                  <c:v>9.0560523572040891E-2</c:v>
+                  <c:v>5.2421313818112741E-2</c:v>
                 </c:pt>
                 <c:pt idx="19">
-                  <c:v>0.12329445793584255</c:v>
+                  <c:v>7.2467988337594602E-2</c:v>
                 </c:pt>
                 <c:pt idx="20">
-                  <c:v>0.13953621098603594</c:v>
+                  <c:v>8.2645466195862244E-2</c:v>
                 </c:pt>
                 <c:pt idx="21">
-                  <c:v>9.2789552446865001E-2</c:v>
+                  <c:v>5.3767095690706534E-2</c:v>
                 </c:pt>
                 <c:pt idx="22">
-                  <c:v>8.5652985219278763E-2</c:v>
+                  <c:v>4.9468144799758806E-2</c:v>
                 </c:pt>
                 <c:pt idx="23">
-                  <c:v>9.0822554345615064E-2</c:v>
+                  <c:v>5.2579371445597739E-2</c:v>
                 </c:pt>
                 <c:pt idx="24">
-                  <c:v>9.9265533835264139E-2</c:v>
+                  <c:v>5.7692811105290613E-2</c:v>
                 </c:pt>
                 <c:pt idx="25">
-                  <c:v>8.8456951293445982E-2</c:v>
+                  <c:v>5.1153822350645375E-2</c:v>
                 </c:pt>
               </c:numCache>
             </c:numRef>
@@ -1289,11 +1593,11 @@
           <c:showPercent val="0"/>
           <c:showBubbleSize val="0"/>
         </c:dLbls>
-        <c:axId val="119933568"/>
-        <c:axId val="119935744"/>
+        <c:axId val="8517504"/>
+        <c:axId val="140378112"/>
       </c:scatterChart>
       <c:valAx>
-        <c:axId val="119933568"/>
+        <c:axId val="8517504"/>
         <c:scaling>
           <c:orientation val="minMax"/>
           <c:max val="2015"/>
@@ -1305,12 +1609,12 @@
         <c:majorTickMark val="cross"/>
         <c:minorTickMark val="out"/>
         <c:tickLblPos val="nextTo"/>
-        <c:crossAx val="119935744"/>
+        <c:crossAx val="140378112"/>
         <c:crosses val="autoZero"/>
         <c:crossBetween val="midCat"/>
       </c:valAx>
       <c:valAx>
-        <c:axId val="119935744"/>
+        <c:axId val="140378112"/>
         <c:scaling>
           <c:orientation val="minMax"/>
         </c:scaling>
@@ -1318,12 +1622,13 @@
         <c:axPos val="l"/>
         <c:majorGridlines/>
         <c:numFmt formatCode="0.00%" sourceLinked="1"/>
-        <c:majorTickMark val="out"/>
-        <c:minorTickMark val="none"/>
+        <c:majorTickMark val="cross"/>
+        <c:minorTickMark val="out"/>
         <c:tickLblPos val="nextTo"/>
-        <c:crossAx val="119933568"/>
+        <c:crossAx val="8517504"/>
         <c:crosses val="autoZero"/>
         <c:crossBetween val="midCat"/>
+        <c:minorUnit val="1.0000000000000002E-2"/>
       </c:valAx>
     </c:plotArea>
     <c:legend>
@@ -1867,7 +2172,7 @@
           <a:p>
             <a:fld id="{859DE06D-F133-4988-97F6-9372E6CBBFD7}" type="slidenum">
               <a:rPr lang="en-US" smtClean="0"/>
-              <a:t>6</a:t>
+              <a:t>7</a:t>
             </a:fld>
             <a:endParaRPr lang="en-US"/>
           </a:p>
@@ -4904,15 +5209,7 @@
             <a:pPr algn="ctr"/>
             <a:r>
               <a:rPr lang="en-US" sz="3200" b="1" dirty="0" smtClean="0"/>
-              <a:t>Rethinking the </a:t>
-            </a:r>
-            <a:r>
-              <a:rPr lang="en-US" sz="3200" b="1" dirty="0" smtClean="0"/>
-              <a:t>Policy Design of the </a:t>
-            </a:r>
-            <a:r>
-              <a:rPr lang="en-US" sz="3200" b="1" dirty="0" smtClean="0"/>
-              <a:t/>
+              <a:t>Rethinking the Policy Design of the </a:t>
             </a:r>
             <a:br>
               <a:rPr lang="en-US" sz="3200" b="1" dirty="0" smtClean="0"/>
@@ -4991,7 +5288,7 @@
 </p:sld>
 </file>
 
-<file path=ppt/slides/slide2.xml><?xml version="1.0" encoding="utf-8"?>
+<file path=ppt/slides/slide10.xml><?xml version="1.0" encoding="utf-8"?>
 <p:sld xmlns:a="http://schemas.openxmlformats.org/drawingml/2006/main" xmlns:r="http://schemas.openxmlformats.org/officeDocument/2006/relationships" xmlns:p="http://schemas.openxmlformats.org/presentationml/2006/main">
   <p:cSld>
     <p:spTree>
@@ -5008,34 +5305,150 @@
           <a:chExt cx="0" cy="0"/>
         </a:xfrm>
       </p:grpSpPr>
-      <p:graphicFrame>
-        <p:nvGraphicFramePr>
-          <p:cNvPr id="4" name="Chart 3"/>
-          <p:cNvGraphicFramePr>
-            <a:graphicFrameLocks/>
-          </p:cNvGraphicFramePr>
-          <p:nvPr>
-            <p:extLst>
-              <p:ext uri="{D42A27DB-BD31-4B8C-83A1-F6EECF244321}">
-                <p14:modId xmlns:p14="http://schemas.microsoft.com/office/powerpoint/2010/main" val="141705039"/>
-              </p:ext>
-            </p:extLst>
-          </p:nvPr>
-        </p:nvGraphicFramePr>
-        <p:xfrm>
-          <a:off x="548640" y="365760"/>
-          <a:ext cx="8046720" cy="4846320"/>
-        </p:xfrm>
-        <a:graphic>
-          <a:graphicData uri="http://schemas.openxmlformats.org/drawingml/2006/chart">
-            <c:chart xmlns:c="http://schemas.openxmlformats.org/drawingml/2006/chart" xmlns:r="http://schemas.openxmlformats.org/officeDocument/2006/relationships" r:id="rId2"/>
-          </a:graphicData>
-        </a:graphic>
-      </p:graphicFrame>
+      <p:sp>
+        <p:nvSpPr>
+          <p:cNvPr id="2" name="TextBox 1"/>
+          <p:cNvSpPr txBox="1"/>
+          <p:nvPr/>
+        </p:nvSpPr>
+        <p:spPr>
+          <a:xfrm>
+            <a:off x="0" y="1028700"/>
+            <a:ext cx="9144000" cy="4247317"/>
+          </a:xfrm>
+          <a:prstGeom prst="rect">
+            <a:avLst/>
+          </a:prstGeom>
+          <a:noFill/>
+        </p:spPr>
+        <p:txBody>
+          <a:bodyPr wrap="square" lIns="182880" rIns="182880" rtlCol="0">
+            <a:spAutoFit/>
+          </a:bodyPr>
+          <a:lstStyle/>
+          <a:p>
+            <a:r>
+              <a:rPr lang="en-US" dirty="0" smtClean="0"/>
+              <a:t>SBIR/STTR Dashboard [data] (</a:t>
+            </a:r>
+            <a:r>
+              <a:rPr lang="en-US" dirty="0" err="1" smtClean="0"/>
+              <a:t>n.d.</a:t>
+            </a:r>
+            <a:r>
+              <a:rPr lang="en-US" dirty="0" smtClean="0"/>
+              <a:t>). Retrieved April 18, 2019, from https://www.sbir.gov/awards/annual-reports?view_by=Year</a:t>
+            </a:r>
+          </a:p>
+          <a:p>
+            <a:endParaRPr lang="en-US" dirty="0"/>
+          </a:p>
+          <a:p>
+            <a:r>
+              <a:rPr lang="en-US" dirty="0" smtClean="0"/>
+              <a:t>Small Business Innovation Act: 11th Annual Report. (1993). Retrieved from https://www.sbir.gov/sites/default/files/SBIR_1993.pdf</a:t>
+            </a:r>
+          </a:p>
+          <a:p>
+            <a:endParaRPr lang="en-US" dirty="0"/>
+          </a:p>
+          <a:p>
+            <a:r>
+              <a:rPr lang="en-US" dirty="0" smtClean="0"/>
+              <a:t>User: Robert. </a:t>
+            </a:r>
+            <a:r>
+              <a:rPr lang="en-US" dirty="0"/>
+              <a:t>(2001). North face south tower after plane strike </a:t>
+            </a:r>
+            <a:r>
+              <a:rPr lang="en-US" dirty="0" smtClean="0"/>
+              <a:t>9-11 </a:t>
+            </a:r>
+            <a:r>
+              <a:rPr lang="en-US" dirty="0"/>
+              <a:t>[Image]. </a:t>
+            </a:r>
+            <a:r>
+              <a:rPr lang="en-US" dirty="0" smtClean="0"/>
+              <a:t>[CC </a:t>
+            </a:r>
+            <a:r>
+              <a:rPr lang="en-US" dirty="0"/>
+              <a:t>BY-SA 2.0 https://</a:t>
+            </a:r>
+            <a:r>
+              <a:rPr lang="en-US" dirty="0" smtClean="0"/>
+              <a:t>creativecommons.org/licenses/by-sa/2.0] . No changes made. Retrieved April 19, 2019</a:t>
+            </a:r>
+            <a:r>
+              <a:rPr lang="en-US" dirty="0"/>
+              <a:t>, from https://commons.wikimedia.org/wiki/Category:Terrorism#/</a:t>
+            </a:r>
+            <a:r>
+              <a:rPr lang="en-US" dirty="0" smtClean="0"/>
+              <a:t>media/File:North_face_south_tower_after_plane_strike_9-11.jpg</a:t>
+            </a:r>
+          </a:p>
+          <a:p>
+            <a:endParaRPr lang="en-US" dirty="0"/>
+          </a:p>
+          <a:p>
+            <a:r>
+              <a:rPr lang="en-US" dirty="0" smtClean="0"/>
+              <a:t>User: </a:t>
+            </a:r>
+            <a:r>
+              <a:rPr lang="en-US" dirty="0" err="1" smtClean="0"/>
+              <a:t>DavidBailey</a:t>
+            </a:r>
+            <a:r>
+              <a:rPr lang="en-US" dirty="0" smtClean="0"/>
+              <a:t>. (2009). A dry riverbed in California [Image]. No changes made. Retrieved April 19, 2019</a:t>
+            </a:r>
+            <a:r>
+              <a:rPr lang="en-US" dirty="0"/>
+              <a:t>, from https://commons.wikimedia.org/wiki/File:California_Drought_Dry_Riverbed_2009.jpg</a:t>
+            </a:r>
+            <a:endParaRPr lang="en-US" dirty="0" smtClean="0"/>
+          </a:p>
+        </p:txBody>
+      </p:sp>
+      <p:sp>
+        <p:nvSpPr>
+          <p:cNvPr id="3" name="TextBox 2"/>
+          <p:cNvSpPr txBox="1"/>
+          <p:nvPr/>
+        </p:nvSpPr>
+        <p:spPr>
+          <a:xfrm>
+            <a:off x="0" y="266700"/>
+            <a:ext cx="9144000" cy="461665"/>
+          </a:xfrm>
+          <a:prstGeom prst="rect">
+            <a:avLst/>
+          </a:prstGeom>
+          <a:noFill/>
+        </p:spPr>
+        <p:txBody>
+          <a:bodyPr wrap="square" rtlCol="0">
+            <a:spAutoFit/>
+          </a:bodyPr>
+          <a:lstStyle/>
+          <a:p>
+            <a:pPr algn="ctr"/>
+            <a:r>
+              <a:rPr lang="en-US" sz="2400" dirty="0" smtClean="0"/>
+              <a:t>References</a:t>
+            </a:r>
+            <a:endParaRPr lang="en-US" sz="2400" dirty="0"/>
+          </a:p>
+        </p:txBody>
+      </p:sp>
     </p:spTree>
     <p:extLst>
       <p:ext uri="{BB962C8B-B14F-4D97-AF65-F5344CB8AC3E}">
-        <p14:creationId xmlns:p14="http://schemas.microsoft.com/office/powerpoint/2010/main" val="342248478"/>
+        <p14:creationId xmlns:p14="http://schemas.microsoft.com/office/powerpoint/2010/main" val="242620626"/>
       </p:ext>
     </p:extLst>
   </p:cSld>
@@ -5052,7 +5465,151 @@
 </p:sld>
 </file>
 
-<file path=ppt/slides/slide3.xml><?xml version="1.0" encoding="utf-8"?>
+<file path=ppt/slides/slide11.xml><?xml version="1.0" encoding="utf-8"?>
+<p:sld xmlns:a="http://schemas.openxmlformats.org/drawingml/2006/main" xmlns:r="http://schemas.openxmlformats.org/officeDocument/2006/relationships" xmlns:p="http://schemas.openxmlformats.org/presentationml/2006/main">
+  <p:cSld>
+    <p:spTree>
+      <p:nvGrpSpPr>
+        <p:cNvPr id="1" name=""/>
+        <p:cNvGrpSpPr/>
+        <p:nvPr/>
+      </p:nvGrpSpPr>
+      <p:grpSpPr>
+        <a:xfrm>
+          <a:off x="0" y="0"/>
+          <a:ext cx="0" cy="0"/>
+          <a:chOff x="0" y="0"/>
+          <a:chExt cx="0" cy="0"/>
+        </a:xfrm>
+      </p:grpSpPr>
+      <p:sp>
+        <p:nvSpPr>
+          <p:cNvPr id="2" name="TextBox 1"/>
+          <p:cNvSpPr txBox="1"/>
+          <p:nvPr/>
+        </p:nvSpPr>
+        <p:spPr>
+          <a:xfrm>
+            <a:off x="0" y="1028700"/>
+            <a:ext cx="9144000" cy="3693319"/>
+          </a:xfrm>
+          <a:prstGeom prst="rect">
+            <a:avLst/>
+          </a:prstGeom>
+          <a:noFill/>
+        </p:spPr>
+        <p:txBody>
+          <a:bodyPr wrap="square" lIns="182880" rIns="182880" rtlCol="0">
+            <a:spAutoFit/>
+          </a:bodyPr>
+          <a:lstStyle/>
+          <a:p>
+            <a:r>
+              <a:rPr lang="en-US" dirty="0" smtClean="0"/>
+              <a:t>User: </a:t>
+            </a:r>
+            <a:r>
+              <a:rPr lang="en-US" dirty="0" err="1" smtClean="0"/>
+              <a:t>Lokal_Profil</a:t>
+            </a:r>
+            <a:r>
+              <a:rPr lang="en-US" dirty="0" smtClean="0"/>
+              <a:t>. (2007). Blank outline of the US [Image]. </a:t>
+            </a:r>
+            <a:r>
+              <a:rPr lang="en-US" dirty="0"/>
+              <a:t>CC-BY-SA 2.5 [https://</a:t>
+            </a:r>
+            <a:r>
+              <a:rPr lang="en-US" dirty="0" smtClean="0"/>
+              <a:t>creativecommons.org/licenses/by-sa/2.5].  Photocopy effect added. Retrieved April 19, 2019</a:t>
+            </a:r>
+            <a:r>
+              <a:rPr lang="en-US" dirty="0"/>
+              <a:t>, from https://commons.wikimedia.org/wiki/United_States#/media/File:Blank_US_Map,_</a:t>
+            </a:r>
+            <a:r>
+              <a:rPr lang="en-US" dirty="0" smtClean="0"/>
+              <a:t>Mainland_with_no_States.svg</a:t>
+            </a:r>
+          </a:p>
+          <a:p>
+            <a:endParaRPr lang="en-US" dirty="0"/>
+          </a:p>
+          <a:p>
+            <a:r>
+              <a:rPr lang="en-US" dirty="0" smtClean="0"/>
+              <a:t>User: Kremlin.ru. (2006). Official portrait of </a:t>
+            </a:r>
+            <a:r>
+              <a:rPr lang="en-US" dirty="0" err="1" smtClean="0"/>
+              <a:t>Vladmir</a:t>
+            </a:r>
+            <a:r>
+              <a:rPr lang="en-US" dirty="0" smtClean="0"/>
+              <a:t> Putin [Image]. </a:t>
+            </a:r>
+            <a:r>
+              <a:rPr lang="en-US" dirty="0"/>
+              <a:t>CC-BY 4.0 [https://</a:t>
+            </a:r>
+            <a:r>
+              <a:rPr lang="en-US" dirty="0" smtClean="0"/>
+              <a:t>creativecommons.org/licenses/by/4.0]. No changes made. Retrieved April 19, 2019</a:t>
+            </a:r>
+            <a:r>
+              <a:rPr lang="en-US" dirty="0"/>
+              <a:t>, from https://commons.wikimedia.org/w/index.php?title=Special:Search&amp;limit=500&amp;offset=0&amp;profile=default&amp;search=putin&amp;advancedSearch-current=%7B%7D&amp;ns0=1&amp;ns6=1&amp;ns12=1&amp;ns14=1&amp;ns100=1&amp;ns106=1&amp;searchToken=bcmpm63q76wb4lqzinwofwy4t#%2Fmedia%2FFile%3AVladimir_Putin_-_2006.jpg</a:t>
+            </a:r>
+            <a:endParaRPr lang="en-US" dirty="0" smtClean="0"/>
+          </a:p>
+        </p:txBody>
+      </p:sp>
+      <p:sp>
+        <p:nvSpPr>
+          <p:cNvPr id="3" name="TextBox 2"/>
+          <p:cNvSpPr txBox="1"/>
+          <p:nvPr/>
+        </p:nvSpPr>
+        <p:spPr>
+          <a:xfrm>
+            <a:off x="0" y="266700"/>
+            <a:ext cx="9144000" cy="461665"/>
+          </a:xfrm>
+          <a:prstGeom prst="rect">
+            <a:avLst/>
+          </a:prstGeom>
+          <a:noFill/>
+        </p:spPr>
+        <p:txBody>
+          <a:bodyPr wrap="square" rtlCol="0">
+            <a:spAutoFit/>
+          </a:bodyPr>
+          <a:lstStyle/>
+          <a:p>
+            <a:pPr algn="ctr"/>
+            <a:r>
+              <a:rPr lang="en-US" sz="2400" dirty="0" smtClean="0"/>
+              <a:t>References</a:t>
+            </a:r>
+            <a:endParaRPr lang="en-US" sz="2400" dirty="0"/>
+          </a:p>
+        </p:txBody>
+      </p:sp>
+    </p:spTree>
+    <p:extLst>
+      <p:ext uri="{BB962C8B-B14F-4D97-AF65-F5344CB8AC3E}">
+        <p14:creationId xmlns:p14="http://schemas.microsoft.com/office/powerpoint/2010/main" val="1749662596"/>
+      </p:ext>
+    </p:extLst>
+  </p:cSld>
+  <p:clrMapOvr>
+    <a:masterClrMapping/>
+  </p:clrMapOvr>
+</p:sld>
+</file>
+
+<file path=ppt/slides/slide2.xml><?xml version="1.0" encoding="utf-8"?>
 <p:sld xmlns:a="http://schemas.openxmlformats.org/drawingml/2006/main" xmlns:r="http://schemas.openxmlformats.org/officeDocument/2006/relationships" xmlns:p="http://schemas.openxmlformats.org/presentationml/2006/main">
   <p:cSld>
     <p:spTree>
@@ -5071,14 +5628,14 @@
       </p:grpSpPr>
       <p:pic>
         <p:nvPicPr>
-          <p:cNvPr id="2051" name="Picture 3"/>
+          <p:cNvPr id="1029" name="Picture 5" descr="https://upload.wikimedia.org/wikipedia/commons/thumb/c/c4/Southwest737-700N913WN_SANFebruary2019.jpg/800px-Southwest737-700N913WN_SANFebruary2019.jpg"/>
           <p:cNvPicPr>
             <a:picLocks noChangeAspect="1" noChangeArrowheads="1"/>
           </p:cNvPicPr>
           <p:nvPr/>
         </p:nvPicPr>
         <p:blipFill>
-          <a:blip r:embed="rId2">
+          <a:blip r:embed="rId2" cstate="print">
             <a:extLst>
               <a:ext uri="{28A0092B-C50C-407E-A947-70E740481C1C}">
                 <a14:useLocalDpi xmlns:a14="http://schemas.microsoft.com/office/drawing/2010/main" val="0"/>
@@ -5092,17 +5649,64 @@
         </p:blipFill>
         <p:spPr bwMode="auto">
           <a:xfrm>
-            <a:off x="537469" y="365760"/>
-            <a:ext cx="8069063" cy="4846320"/>
+            <a:off x="3885024" y="1197487"/>
+            <a:ext cx="2134776" cy="1371600"/>
           </a:xfrm>
           <a:prstGeom prst="rect">
             <a:avLst/>
           </a:prstGeom>
-          <a:noFill/>
           <a:ln>
             <a:noFill/>
           </a:ln>
-          <a:effectLst/>
+          <a:effectLst>
+            <a:softEdge rad="76200"/>
+          </a:effectLst>
+          <a:extLst>
+            <a:ext uri="{909E8E84-426E-40DD-AFC4-6F175D3DCCD1}">
+              <a14:hiddenFill xmlns:a14="http://schemas.microsoft.com/office/drawing/2010/main">
+                <a:solidFill>
+                  <a:srgbClr val="FFFFFF"/>
+                </a:solidFill>
+              </a14:hiddenFill>
+            </a:ext>
+          </a:extLst>
+        </p:spPr>
+      </p:pic>
+      <p:pic>
+        <p:nvPicPr>
+          <p:cNvPr id="1027" name="Picture 3"/>
+          <p:cNvPicPr>
+            <a:picLocks noChangeAspect="1" noChangeArrowheads="1"/>
+          </p:cNvPicPr>
+          <p:nvPr/>
+        </p:nvPicPr>
+        <p:blipFill>
+          <a:blip r:embed="rId3" cstate="print">
+            <a:extLst>
+              <a:ext uri="{28A0092B-C50C-407E-A947-70E740481C1C}">
+                <a14:useLocalDpi xmlns:a14="http://schemas.microsoft.com/office/drawing/2010/main" val="0"/>
+              </a:ext>
+            </a:extLst>
+          </a:blip>
+          <a:srcRect/>
+          <a:stretch>
+            <a:fillRect/>
+          </a:stretch>
+        </p:blipFill>
+        <p:spPr bwMode="auto">
+          <a:xfrm>
+            <a:off x="4189707" y="114300"/>
+            <a:ext cx="2058693" cy="1371600"/>
+          </a:xfrm>
+          <a:prstGeom prst="rect">
+            <a:avLst/>
+          </a:prstGeom>
+          <a:ln>
+            <a:noFill/>
+          </a:ln>
+          <a:effectLst>
+            <a:softEdge rad="112500"/>
+          </a:effectLst>
           <a:extLst>
             <a:ext uri="{909E8E84-426E-40DD-AFC4-6F175D3DCCD1}">
               <a14:hiddenFill xmlns:a14="http://schemas.microsoft.com/office/drawing/2010/main">
@@ -5121,14 +5725,354 @@
                 <a:tailEnd/>
               </a14:hiddenLine>
             </a:ext>
-            <a:ext uri="{AF507438-7753-43E0-B8FC-AC1667EBCBE1}">
-              <a14:hiddenEffects xmlns:a14="http://schemas.microsoft.com/office/drawing/2010/main">
-                <a:effectLst>
-                  <a:outerShdw dist="35921" dir="2700000" algn="ctr" rotWithShape="0">
-                    <a:schemeClr val="bg2"/>
-                  </a:outerShdw>
-                </a:effectLst>
-              </a14:hiddenEffects>
+          </a:extLst>
+        </p:spPr>
+      </p:pic>
+      <p:pic>
+        <p:nvPicPr>
+          <p:cNvPr id="1026" name="Picture 2" descr="C:\Users\townesm\AppData\Local\Temp\Kitty_hawk_gross.jpg"/>
+          <p:cNvPicPr>
+            <a:picLocks noChangeAspect="1" noChangeArrowheads="1"/>
+          </p:cNvPicPr>
+          <p:nvPr/>
+        </p:nvPicPr>
+        <p:blipFill>
+          <a:blip r:embed="rId4" cstate="print">
+            <a:extLst>
+              <a:ext uri="{28A0092B-C50C-407E-A947-70E740481C1C}">
+                <a14:useLocalDpi xmlns:a14="http://schemas.microsoft.com/office/drawing/2010/main" val="0"/>
+              </a:ext>
+            </a:extLst>
+          </a:blip>
+          <a:srcRect/>
+          <a:stretch>
+            <a:fillRect/>
+          </a:stretch>
+        </p:blipFill>
+        <p:spPr bwMode="auto">
+          <a:xfrm>
+            <a:off x="6172200" y="190500"/>
+            <a:ext cx="2743200" cy="2018235"/>
+          </a:xfrm>
+          <a:prstGeom prst="rect">
+            <a:avLst/>
+          </a:prstGeom>
+          <a:ln>
+            <a:noFill/>
+          </a:ln>
+          <a:effectLst>
+            <a:softEdge rad="112500"/>
+          </a:effectLst>
+          <a:extLst>
+            <a:ext uri="{909E8E84-426E-40DD-AFC4-6F175D3DCCD1}">
+              <a14:hiddenFill xmlns:a14="http://schemas.microsoft.com/office/drawing/2010/main">
+                <a:solidFill>
+                  <a:srgbClr val="FFFFFF"/>
+                </a:solidFill>
+              </a14:hiddenFill>
+            </a:ext>
+          </a:extLst>
+        </p:spPr>
+      </p:pic>
+      <p:pic>
+        <p:nvPicPr>
+          <p:cNvPr id="1031" name="Picture 7" descr="https://upload.wikimedia.org/wikipedia/commons/1/15/1896_telephone.jpg"/>
+          <p:cNvPicPr>
+            <a:picLocks noChangeAspect="1" noChangeArrowheads="1"/>
+          </p:cNvPicPr>
+          <p:nvPr/>
+        </p:nvPicPr>
+        <p:blipFill>
+          <a:blip r:embed="rId5" cstate="print">
+            <a:extLst>
+              <a:ext uri="{28A0092B-C50C-407E-A947-70E740481C1C}">
+                <a14:useLocalDpi xmlns:a14="http://schemas.microsoft.com/office/drawing/2010/main" val="0"/>
+              </a:ext>
+            </a:extLst>
+          </a:blip>
+          <a:srcRect/>
+          <a:stretch>
+            <a:fillRect/>
+          </a:stretch>
+        </p:blipFill>
+        <p:spPr bwMode="auto">
+          <a:xfrm>
+            <a:off x="914400" y="3543300"/>
+            <a:ext cx="1781825" cy="1828800"/>
+          </a:xfrm>
+          <a:prstGeom prst="rect">
+            <a:avLst/>
+          </a:prstGeom>
+          <a:noFill/>
+          <a:extLst>
+            <a:ext uri="{909E8E84-426E-40DD-AFC4-6F175D3DCCD1}">
+              <a14:hiddenFill xmlns:a14="http://schemas.microsoft.com/office/drawing/2010/main">
+                <a:solidFill>
+                  <a:srgbClr val="FFFFFF"/>
+                </a:solidFill>
+              </a14:hiddenFill>
+            </a:ext>
+          </a:extLst>
+        </p:spPr>
+      </p:pic>
+      <p:pic>
+        <p:nvPicPr>
+          <p:cNvPr id="1033" name="Picture 9" descr="Samsung Galaxy W (GT-I8150) front 2.jpg"/>
+          <p:cNvPicPr>
+            <a:picLocks noChangeAspect="1" noChangeArrowheads="1"/>
+          </p:cNvPicPr>
+          <p:nvPr/>
+        </p:nvPicPr>
+        <p:blipFill>
+          <a:blip r:embed="rId6" cstate="print">
+            <a:extLst>
+              <a:ext uri="{28A0092B-C50C-407E-A947-70E740481C1C}">
+                <a14:useLocalDpi xmlns:a14="http://schemas.microsoft.com/office/drawing/2010/main" val="0"/>
+              </a:ext>
+            </a:extLst>
+          </a:blip>
+          <a:srcRect/>
+          <a:stretch>
+            <a:fillRect/>
+          </a:stretch>
+        </p:blipFill>
+        <p:spPr bwMode="auto">
+          <a:xfrm>
+            <a:off x="247855" y="2857500"/>
+            <a:ext cx="1142167" cy="1828800"/>
+          </a:xfrm>
+          <a:prstGeom prst="rect">
+            <a:avLst/>
+          </a:prstGeom>
+          <a:ln>
+            <a:noFill/>
+          </a:ln>
+          <a:effectLst>
+            <a:softEdge rad="112500"/>
+          </a:effectLst>
+          <a:extLst>
+            <a:ext uri="{909E8E84-426E-40DD-AFC4-6F175D3DCCD1}">
+              <a14:hiddenFill xmlns:a14="http://schemas.microsoft.com/office/drawing/2010/main">
+                <a:solidFill>
+                  <a:srgbClr val="FFFFFF"/>
+                </a:solidFill>
+              </a14:hiddenFill>
+            </a:ext>
+          </a:extLst>
+        </p:spPr>
+      </p:pic>
+      <p:pic>
+        <p:nvPicPr>
+          <p:cNvPr id="1035" name="Picture 11" descr="Image result for garrett morgan inventions"/>
+          <p:cNvPicPr>
+            <a:picLocks noChangeAspect="1" noChangeArrowheads="1"/>
+          </p:cNvPicPr>
+          <p:nvPr/>
+        </p:nvPicPr>
+        <p:blipFill>
+          <a:blip r:embed="rId7">
+            <a:extLst>
+              <a:ext uri="{28A0092B-C50C-407E-A947-70E740481C1C}">
+                <a14:useLocalDpi xmlns:a14="http://schemas.microsoft.com/office/drawing/2010/main" val="0"/>
+              </a:ext>
+            </a:extLst>
+          </a:blip>
+          <a:srcRect/>
+          <a:stretch>
+            <a:fillRect/>
+          </a:stretch>
+        </p:blipFill>
+        <p:spPr bwMode="auto">
+          <a:xfrm>
+            <a:off x="5873809" y="3900487"/>
+            <a:ext cx="2581275" cy="1685926"/>
+          </a:xfrm>
+          <a:prstGeom prst="rect">
+            <a:avLst/>
+          </a:prstGeom>
+          <a:ln>
+            <a:noFill/>
+          </a:ln>
+          <a:effectLst>
+            <a:softEdge rad="50800"/>
+          </a:effectLst>
+          <a:extLst>
+            <a:ext uri="{909E8E84-426E-40DD-AFC4-6F175D3DCCD1}">
+              <a14:hiddenFill xmlns:a14="http://schemas.microsoft.com/office/drawing/2010/main">
+                <a:solidFill>
+                  <a:srgbClr val="FFFFFF"/>
+                </a:solidFill>
+              </a14:hiddenFill>
+            </a:ext>
+          </a:extLst>
+        </p:spPr>
+      </p:pic>
+      <p:pic>
+        <p:nvPicPr>
+          <p:cNvPr id="1037" name="Picture 13" descr="Image result for garrett morgan traffic signal"/>
+          <p:cNvPicPr>
+            <a:picLocks noChangeAspect="1" noChangeArrowheads="1"/>
+          </p:cNvPicPr>
+          <p:nvPr/>
+        </p:nvPicPr>
+        <p:blipFill>
+          <a:blip r:embed="rId8" cstate="print">
+            <a:extLst>
+              <a:ext uri="{28A0092B-C50C-407E-A947-70E740481C1C}">
+                <a14:useLocalDpi xmlns:a14="http://schemas.microsoft.com/office/drawing/2010/main" val="0"/>
+              </a:ext>
+            </a:extLst>
+          </a:blip>
+          <a:srcRect/>
+          <a:stretch>
+            <a:fillRect/>
+          </a:stretch>
+        </p:blipFill>
+        <p:spPr bwMode="auto">
+          <a:xfrm>
+            <a:off x="914400" y="285217"/>
+            <a:ext cx="673492" cy="1828800"/>
+          </a:xfrm>
+          <a:prstGeom prst="rect">
+            <a:avLst/>
+          </a:prstGeom>
+          <a:ln>
+            <a:noFill/>
+          </a:ln>
+          <a:effectLst>
+            <a:softEdge rad="63500"/>
+          </a:effectLst>
+          <a:extLst>
+            <a:ext uri="{909E8E84-426E-40DD-AFC4-6F175D3DCCD1}">
+              <a14:hiddenFill xmlns:a14="http://schemas.microsoft.com/office/drawing/2010/main">
+                <a:solidFill>
+                  <a:srgbClr val="FFFFFF"/>
+                </a:solidFill>
+              </a14:hiddenFill>
+            </a:ext>
+          </a:extLst>
+        </p:spPr>
+      </p:pic>
+      <p:pic>
+        <p:nvPicPr>
+          <p:cNvPr id="1039" name="Picture 15" descr="Image result for traffic light"/>
+          <p:cNvPicPr>
+            <a:picLocks noChangeAspect="1" noChangeArrowheads="1"/>
+          </p:cNvPicPr>
+          <p:nvPr/>
+        </p:nvPicPr>
+        <p:blipFill rotWithShape="1">
+          <a:blip r:embed="rId9">
+            <a:extLst>
+              <a:ext uri="{28A0092B-C50C-407E-A947-70E740481C1C}">
+                <a14:useLocalDpi xmlns:a14="http://schemas.microsoft.com/office/drawing/2010/main" val="0"/>
+              </a:ext>
+            </a:extLst>
+          </a:blip>
+          <a:srcRect l="28027" t="9572" r="35746" b="21857"/>
+          <a:stretch/>
+        </p:blipFill>
+        <p:spPr bwMode="auto">
+          <a:xfrm>
+            <a:off x="1561222" y="766957"/>
+            <a:ext cx="1097280" cy="1828800"/>
+          </a:xfrm>
+          <a:prstGeom prst="rect">
+            <a:avLst/>
+          </a:prstGeom>
+          <a:noFill/>
+          <a:extLst>
+            <a:ext uri="{909E8E84-426E-40DD-AFC4-6F175D3DCCD1}">
+              <a14:hiddenFill xmlns:a14="http://schemas.microsoft.com/office/drawing/2010/main">
+                <a:solidFill>
+                  <a:srgbClr val="FFFFFF"/>
+                </a:solidFill>
+              </a14:hiddenFill>
+            </a:ext>
+          </a:extLst>
+        </p:spPr>
+      </p:pic>
+      <p:pic>
+        <p:nvPicPr>
+          <p:cNvPr id="1041" name="Picture 17" descr="Image result for gas mask"/>
+          <p:cNvPicPr>
+            <a:picLocks noChangeAspect="1" noChangeArrowheads="1"/>
+          </p:cNvPicPr>
+          <p:nvPr/>
+        </p:nvPicPr>
+        <p:blipFill rotWithShape="1">
+          <a:blip r:embed="rId10" cstate="print">
+            <a:extLst>
+              <a:ext uri="{28A0092B-C50C-407E-A947-70E740481C1C}">
+                <a14:useLocalDpi xmlns:a14="http://schemas.microsoft.com/office/drawing/2010/main" val="0"/>
+              </a:ext>
+            </a:extLst>
+          </a:blip>
+          <a:srcRect l="25660" r="24377"/>
+          <a:stretch/>
+        </p:blipFill>
+        <p:spPr bwMode="auto">
+          <a:xfrm>
+            <a:off x="7314942" y="2628900"/>
+            <a:ext cx="1371858" cy="1828800"/>
+          </a:xfrm>
+          <a:prstGeom prst="rect">
+            <a:avLst/>
+          </a:prstGeom>
+          <a:noFill/>
+          <a:extLst>
+            <a:ext uri="{909E8E84-426E-40DD-AFC4-6F175D3DCCD1}">
+              <a14:hiddenFill xmlns:a14="http://schemas.microsoft.com/office/drawing/2010/main">
+                <a:solidFill>
+                  <a:srgbClr val="FFFFFF"/>
+                </a:solidFill>
+              </a14:hiddenFill>
+            </a:ext>
+          </a:extLst>
+        </p:spPr>
+      </p:pic>
+      <p:pic>
+        <p:nvPicPr>
+          <p:cNvPr id="1042" name="Picture 18" descr="C:\Users\townesm\AppData\Local\Temp\Macintosh_classic.jpg"/>
+          <p:cNvPicPr>
+            <a:picLocks noChangeAspect="1" noChangeArrowheads="1"/>
+          </p:cNvPicPr>
+          <p:nvPr/>
+        </p:nvPicPr>
+        <p:blipFill>
+          <a:blip r:embed="rId11" cstate="print">
+            <a:extLst>
+              <a:ext uri="{28A0092B-C50C-407E-A947-70E740481C1C}">
+                <a14:useLocalDpi xmlns:a14="http://schemas.microsoft.com/office/drawing/2010/main" val="0"/>
+              </a:ext>
+            </a:extLst>
+          </a:blip>
+          <a:srcRect/>
+          <a:stretch>
+            <a:fillRect/>
+          </a:stretch>
+        </p:blipFill>
+        <p:spPr bwMode="auto">
+          <a:xfrm>
+            <a:off x="3200400" y="2986087"/>
+            <a:ext cx="2138950" cy="1828800"/>
+          </a:xfrm>
+          <a:prstGeom prst="rect">
+            <a:avLst/>
+          </a:prstGeom>
+          <a:ln>
+            <a:noFill/>
+          </a:ln>
+          <a:effectLst>
+            <a:softEdge rad="63500"/>
+          </a:effectLst>
+          <a:extLst>
+            <a:ext uri="{909E8E84-426E-40DD-AFC4-6F175D3DCCD1}">
+              <a14:hiddenFill xmlns:a14="http://schemas.microsoft.com/office/drawing/2010/main">
+                <a:solidFill>
+                  <a:srgbClr val="FFFFFF"/>
+                </a:solidFill>
+              </a14:hiddenFill>
             </a:ext>
           </a:extLst>
         </p:spPr>
@@ -5136,85 +6080,17 @@
     </p:spTree>
     <p:extLst>
       <p:ext uri="{BB962C8B-B14F-4D97-AF65-F5344CB8AC3E}">
-        <p14:creationId xmlns:p14="http://schemas.microsoft.com/office/powerpoint/2010/main" val="243680360"/>
+        <p14:creationId xmlns:p14="http://schemas.microsoft.com/office/powerpoint/2010/main" val="3525328067"/>
       </p:ext>
     </p:extLst>
   </p:cSld>
   <p:clrMapOvr>
     <a:masterClrMapping/>
   </p:clrMapOvr>
-  <p:timing>
-    <p:tnLst>
-      <p:par>
-        <p:cTn id="1" dur="indefinite" restart="never" nodeType="tmRoot"/>
-      </p:par>
-    </p:tnLst>
-  </p:timing>
 </p:sld>
 </file>
 
-<file path=ppt/slides/slide4.xml><?xml version="1.0" encoding="utf-8"?>
-<p:sld xmlns:a="http://schemas.openxmlformats.org/drawingml/2006/main" xmlns:r="http://schemas.openxmlformats.org/officeDocument/2006/relationships" xmlns:p="http://schemas.openxmlformats.org/presentationml/2006/main">
-  <p:cSld>
-    <p:spTree>
-      <p:nvGrpSpPr>
-        <p:cNvPr id="1" name=""/>
-        <p:cNvGrpSpPr/>
-        <p:nvPr/>
-      </p:nvGrpSpPr>
-      <p:grpSpPr>
-        <a:xfrm>
-          <a:off x="0" y="0"/>
-          <a:ext cx="0" cy="0"/>
-          <a:chOff x="0" y="0"/>
-          <a:chExt cx="0" cy="0"/>
-        </a:xfrm>
-      </p:grpSpPr>
-      <p:graphicFrame>
-        <p:nvGraphicFramePr>
-          <p:cNvPr id="2" name="Chart 1"/>
-          <p:cNvGraphicFramePr>
-            <a:graphicFrameLocks/>
-          </p:cNvGraphicFramePr>
-          <p:nvPr>
-            <p:extLst>
-              <p:ext uri="{D42A27DB-BD31-4B8C-83A1-F6EECF244321}">
-                <p14:modId xmlns:p14="http://schemas.microsoft.com/office/powerpoint/2010/main" val="461872040"/>
-              </p:ext>
-            </p:extLst>
-          </p:nvPr>
-        </p:nvGraphicFramePr>
-        <p:xfrm>
-          <a:off x="766762" y="365760"/>
-          <a:ext cx="7610476" cy="4846320"/>
-        </p:xfrm>
-        <a:graphic>
-          <a:graphicData uri="http://schemas.openxmlformats.org/drawingml/2006/chart">
-            <c:chart xmlns:c="http://schemas.openxmlformats.org/drawingml/2006/chart" xmlns:r="http://schemas.openxmlformats.org/officeDocument/2006/relationships" r:id="rId2"/>
-          </a:graphicData>
-        </a:graphic>
-      </p:graphicFrame>
-    </p:spTree>
-    <p:extLst>
-      <p:ext uri="{BB962C8B-B14F-4D97-AF65-F5344CB8AC3E}">
-        <p14:creationId xmlns:p14="http://schemas.microsoft.com/office/powerpoint/2010/main" val="4043928245"/>
-      </p:ext>
-    </p:extLst>
-  </p:cSld>
-  <p:clrMapOvr>
-    <a:masterClrMapping/>
-  </p:clrMapOvr>
-  <p:timing>
-    <p:tnLst>
-      <p:par>
-        <p:cTn id="1" dur="indefinite" restart="never" nodeType="tmRoot"/>
-      </p:par>
-    </p:tnLst>
-  </p:timing>
-</p:sld>
-</file>
-
-<file path=ppt/slides/slide5.xml><?xml version="1.0" encoding="utf-8"?>
+<file path=ppt/slides/slide3.xml><?xml version="1.0" encoding="utf-8"?>
 <p:sld xmlns:a="http://schemas.openxmlformats.org/drawingml/2006/main" xmlns:r="http://schemas.openxmlformats.org/officeDocument/2006/relationships" xmlns:p="http://schemas.openxmlformats.org/presentationml/2006/main">
   <p:cSld>
     <p:spTree>
@@ -5314,15 +6190,15 @@
         </p:spPr>
         <p:style>
           <a:lnRef idx="2">
-            <a:schemeClr val="accent1">
+            <a:schemeClr val="dk1">
               <a:shade val="50000"/>
             </a:schemeClr>
           </a:lnRef>
           <a:fillRef idx="1">
-            <a:schemeClr val="accent1"/>
+            <a:schemeClr val="dk1"/>
           </a:fillRef>
           <a:effectRef idx="0">
-            <a:schemeClr val="accent1"/>
+            <a:schemeClr val="dk1"/>
           </a:effectRef>
           <a:fontRef idx="minor">
             <a:schemeClr val="lt1"/>
@@ -5358,15 +6234,15 @@
         </p:spPr>
         <p:style>
           <a:lnRef idx="2">
-            <a:schemeClr val="accent1">
+            <a:schemeClr val="dk1">
               <a:shade val="50000"/>
             </a:schemeClr>
           </a:lnRef>
           <a:fillRef idx="1">
-            <a:schemeClr val="accent1"/>
+            <a:schemeClr val="dk1"/>
           </a:fillRef>
           <a:effectRef idx="0">
-            <a:schemeClr val="accent1"/>
+            <a:schemeClr val="dk1"/>
           </a:effectRef>
           <a:fontRef idx="minor">
             <a:schemeClr val="lt1"/>
@@ -5402,15 +6278,15 @@
         </p:spPr>
         <p:style>
           <a:lnRef idx="2">
-            <a:schemeClr val="accent1">
+            <a:schemeClr val="dk1">
               <a:shade val="50000"/>
             </a:schemeClr>
           </a:lnRef>
           <a:fillRef idx="1">
-            <a:schemeClr val="accent1"/>
+            <a:schemeClr val="dk1"/>
           </a:fillRef>
           <a:effectRef idx="0">
-            <a:schemeClr val="accent1"/>
+            <a:schemeClr val="dk1"/>
           </a:effectRef>
           <a:fontRef idx="minor">
             <a:schemeClr val="lt1"/>
@@ -5446,15 +6322,15 @@
         </p:spPr>
         <p:style>
           <a:lnRef idx="2">
-            <a:schemeClr val="accent1">
+            <a:schemeClr val="dk1">
               <a:shade val="50000"/>
             </a:schemeClr>
           </a:lnRef>
           <a:fillRef idx="1">
-            <a:schemeClr val="accent1"/>
+            <a:schemeClr val="dk1"/>
           </a:fillRef>
           <a:effectRef idx="0">
-            <a:schemeClr val="accent1"/>
+            <a:schemeClr val="dk1"/>
           </a:effectRef>
           <a:fontRef idx="minor">
             <a:schemeClr val="lt1"/>
@@ -6210,7 +7086,190 @@
 </p:sld>
 </file>
 
+<file path=ppt/slides/slide4.xml><?xml version="1.0" encoding="utf-8"?>
+<p:sld xmlns:a="http://schemas.openxmlformats.org/drawingml/2006/main" xmlns:r="http://schemas.openxmlformats.org/officeDocument/2006/relationships" xmlns:p="http://schemas.openxmlformats.org/presentationml/2006/main">
+  <p:cSld>
+    <p:spTree>
+      <p:nvGrpSpPr>
+        <p:cNvPr id="1" name=""/>
+        <p:cNvGrpSpPr/>
+        <p:nvPr/>
+      </p:nvGrpSpPr>
+      <p:grpSpPr>
+        <a:xfrm>
+          <a:off x="0" y="0"/>
+          <a:ext cx="0" cy="0"/>
+          <a:chOff x="0" y="0"/>
+          <a:chExt cx="0" cy="0"/>
+        </a:xfrm>
+      </p:grpSpPr>
+      <p:graphicFrame>
+        <p:nvGraphicFramePr>
+          <p:cNvPr id="4" name="Chart 3"/>
+          <p:cNvGraphicFramePr>
+            <a:graphicFrameLocks/>
+          </p:cNvGraphicFramePr>
+          <p:nvPr>
+            <p:extLst>
+              <p:ext uri="{D42A27DB-BD31-4B8C-83A1-F6EECF244321}">
+                <p14:modId xmlns:p14="http://schemas.microsoft.com/office/powerpoint/2010/main" val="141705039"/>
+              </p:ext>
+            </p:extLst>
+          </p:nvPr>
+        </p:nvGraphicFramePr>
+        <p:xfrm>
+          <a:off x="548640" y="365760"/>
+          <a:ext cx="8046720" cy="4846320"/>
+        </p:xfrm>
+        <a:graphic>
+          <a:graphicData uri="http://schemas.openxmlformats.org/drawingml/2006/chart">
+            <c:chart xmlns:c="http://schemas.openxmlformats.org/drawingml/2006/chart" xmlns:r="http://schemas.openxmlformats.org/officeDocument/2006/relationships" r:id="rId2"/>
+          </a:graphicData>
+        </a:graphic>
+      </p:graphicFrame>
+    </p:spTree>
+    <p:extLst>
+      <p:ext uri="{BB962C8B-B14F-4D97-AF65-F5344CB8AC3E}">
+        <p14:creationId xmlns:p14="http://schemas.microsoft.com/office/powerpoint/2010/main" val="342248478"/>
+      </p:ext>
+    </p:extLst>
+  </p:cSld>
+  <p:clrMapOvr>
+    <a:masterClrMapping/>
+  </p:clrMapOvr>
+  <p:timing>
+    <p:tnLst>
+      <p:par>
+        <p:cTn id="1" dur="indefinite" restart="never" nodeType="tmRoot"/>
+      </p:par>
+    </p:tnLst>
+  </p:timing>
+</p:sld>
+</file>
+
+<file path=ppt/slides/slide5.xml><?xml version="1.0" encoding="utf-8"?>
+<p:sld xmlns:a="http://schemas.openxmlformats.org/drawingml/2006/main" xmlns:r="http://schemas.openxmlformats.org/officeDocument/2006/relationships" xmlns:p="http://schemas.openxmlformats.org/presentationml/2006/main">
+  <p:cSld>
+    <p:spTree>
+      <p:nvGrpSpPr>
+        <p:cNvPr id="1" name=""/>
+        <p:cNvGrpSpPr/>
+        <p:nvPr/>
+      </p:nvGrpSpPr>
+      <p:grpSpPr>
+        <a:xfrm>
+          <a:off x="0" y="0"/>
+          <a:ext cx="0" cy="0"/>
+          <a:chOff x="0" y="0"/>
+          <a:chExt cx="0" cy="0"/>
+        </a:xfrm>
+      </p:grpSpPr>
+      <p:graphicFrame>
+        <p:nvGraphicFramePr>
+          <p:cNvPr id="3" name="Chart 2"/>
+          <p:cNvGraphicFramePr>
+            <a:graphicFrameLocks noChangeAspect="1"/>
+          </p:cNvGraphicFramePr>
+          <p:nvPr>
+            <p:extLst>
+              <p:ext uri="{D42A27DB-BD31-4B8C-83A1-F6EECF244321}">
+                <p14:modId xmlns:p14="http://schemas.microsoft.com/office/powerpoint/2010/main" val="2786657692"/>
+              </p:ext>
+            </p:extLst>
+          </p:nvPr>
+        </p:nvGraphicFramePr>
+        <p:xfrm>
+          <a:off x="532637" y="365760"/>
+          <a:ext cx="8078726" cy="4846320"/>
+        </p:xfrm>
+        <a:graphic>
+          <a:graphicData uri="http://schemas.openxmlformats.org/drawingml/2006/chart">
+            <c:chart xmlns:c="http://schemas.openxmlformats.org/drawingml/2006/chart" xmlns:r="http://schemas.openxmlformats.org/officeDocument/2006/relationships" r:id="rId2"/>
+          </a:graphicData>
+        </a:graphic>
+      </p:graphicFrame>
+    </p:spTree>
+    <p:extLst>
+      <p:ext uri="{BB962C8B-B14F-4D97-AF65-F5344CB8AC3E}">
+        <p14:creationId xmlns:p14="http://schemas.microsoft.com/office/powerpoint/2010/main" val="243680360"/>
+      </p:ext>
+    </p:extLst>
+  </p:cSld>
+  <p:clrMapOvr>
+    <a:masterClrMapping/>
+  </p:clrMapOvr>
+  <p:timing>
+    <p:tnLst>
+      <p:par>
+        <p:cTn id="1" dur="indefinite" restart="never" nodeType="tmRoot"/>
+      </p:par>
+    </p:tnLst>
+  </p:timing>
+</p:sld>
+</file>
+
 <file path=ppt/slides/slide6.xml><?xml version="1.0" encoding="utf-8"?>
+<p:sld xmlns:a="http://schemas.openxmlformats.org/drawingml/2006/main" xmlns:r="http://schemas.openxmlformats.org/officeDocument/2006/relationships" xmlns:p="http://schemas.openxmlformats.org/presentationml/2006/main">
+  <p:cSld>
+    <p:spTree>
+      <p:nvGrpSpPr>
+        <p:cNvPr id="1" name=""/>
+        <p:cNvGrpSpPr/>
+        <p:nvPr/>
+      </p:nvGrpSpPr>
+      <p:grpSpPr>
+        <a:xfrm>
+          <a:off x="0" y="0"/>
+          <a:ext cx="0" cy="0"/>
+          <a:chOff x="0" y="0"/>
+          <a:chExt cx="0" cy="0"/>
+        </a:xfrm>
+      </p:grpSpPr>
+      <p:graphicFrame>
+        <p:nvGraphicFramePr>
+          <p:cNvPr id="3" name="Chart 2"/>
+          <p:cNvGraphicFramePr>
+            <a:graphicFrameLocks noChangeAspect="1"/>
+          </p:cNvGraphicFramePr>
+          <p:nvPr>
+            <p:extLst>
+              <p:ext uri="{D42A27DB-BD31-4B8C-83A1-F6EECF244321}">
+                <p14:modId xmlns:p14="http://schemas.microsoft.com/office/powerpoint/2010/main" val="3278456515"/>
+              </p:ext>
+            </p:extLst>
+          </p:nvPr>
+        </p:nvGraphicFramePr>
+        <p:xfrm>
+          <a:off x="599757" y="365760"/>
+          <a:ext cx="7944486" cy="4846320"/>
+        </p:xfrm>
+        <a:graphic>
+          <a:graphicData uri="http://schemas.openxmlformats.org/drawingml/2006/chart">
+            <c:chart xmlns:c="http://schemas.openxmlformats.org/drawingml/2006/chart" xmlns:r="http://schemas.openxmlformats.org/officeDocument/2006/relationships" r:id="rId2"/>
+          </a:graphicData>
+        </a:graphic>
+      </p:graphicFrame>
+    </p:spTree>
+    <p:extLst>
+      <p:ext uri="{BB962C8B-B14F-4D97-AF65-F5344CB8AC3E}">
+        <p14:creationId xmlns:p14="http://schemas.microsoft.com/office/powerpoint/2010/main" val="4043928245"/>
+      </p:ext>
+    </p:extLst>
+  </p:cSld>
+  <p:clrMapOvr>
+    <a:masterClrMapping/>
+  </p:clrMapOvr>
+  <p:timing>
+    <p:tnLst>
+      <p:par>
+        <p:cTn id="1" dur="indefinite" restart="never" nodeType="tmRoot"/>
+      </p:par>
+    </p:tnLst>
+  </p:timing>
+</p:sld>
+</file>
+
+<file path=ppt/slides/slide7.xml><?xml version="1.0" encoding="utf-8"?>
 <p:sld xmlns:a="http://schemas.openxmlformats.org/drawingml/2006/main" xmlns:r="http://schemas.openxmlformats.org/officeDocument/2006/relationships" xmlns:p="http://schemas.openxmlformats.org/presentationml/2006/main">
   <p:cSld>
     <p:spTree>
@@ -6583,7 +7642,7 @@
         <p:spPr>
           <a:xfrm>
             <a:off x="3505200" y="4152900"/>
-            <a:ext cx="2225171" cy="369332"/>
+            <a:ext cx="2225171" cy="923330"/>
           </a:xfrm>
           <a:prstGeom prst="rect">
             <a:avLst/>
@@ -6600,7 +7659,29 @@
               <a:rPr lang="en-US" b="1" dirty="0" smtClean="0">
                 <a:latin typeface="Bradley Hand ITC" panose="03070402050302030203" pitchFamily="66" charset="0"/>
               </a:rPr>
-              <a:t>Minimum set-aside</a:t>
+              <a:t>SBIR </a:t>
+            </a:r>
+          </a:p>
+          <a:p>
+            <a:r>
+              <a:rPr lang="en-US" b="1" dirty="0">
+                <a:latin typeface="Bradley Hand ITC" panose="03070402050302030203" pitchFamily="66" charset="0"/>
+              </a:rPr>
+              <a:t>m</a:t>
+            </a:r>
+            <a:r>
+              <a:rPr lang="en-US" b="1" dirty="0" smtClean="0">
+                <a:latin typeface="Bradley Hand ITC" panose="03070402050302030203" pitchFamily="66" charset="0"/>
+              </a:rPr>
+              <a:t>inimum </a:t>
+            </a:r>
+          </a:p>
+          <a:p>
+            <a:r>
+              <a:rPr lang="en-US" b="1" dirty="0" smtClean="0">
+                <a:latin typeface="Bradley Hand ITC" panose="03070402050302030203" pitchFamily="66" charset="0"/>
+              </a:rPr>
+              <a:t>set-aside</a:t>
             </a:r>
             <a:endParaRPr lang="en-US" b="1" dirty="0">
               <a:latin typeface="Bradley Hand ITC" panose="03070402050302030203" pitchFamily="66" charset="0"/>
@@ -6617,9 +7698,9 @@
           <p:nvPr/>
         </p:nvCxnSpPr>
         <p:spPr>
-          <a:xfrm flipH="1">
-            <a:off x="2819400" y="4337566"/>
-            <a:ext cx="685800" cy="184666"/>
+          <a:xfrm flipH="1" flipV="1">
+            <a:off x="2819400" y="4522232"/>
+            <a:ext cx="685800" cy="92333"/>
           </a:xfrm>
           <a:prstGeom prst="line">
             <a:avLst/>
@@ -7333,166 +8414,6 @@
 </p:sld>
 </file>
 
-<file path=ppt/slides/slide7.xml><?xml version="1.0" encoding="utf-8"?>
-<p:sld xmlns:a="http://schemas.openxmlformats.org/drawingml/2006/main" xmlns:r="http://schemas.openxmlformats.org/officeDocument/2006/relationships" xmlns:p="http://schemas.openxmlformats.org/presentationml/2006/main">
-  <p:cSld>
-    <p:spTree>
-      <p:nvGrpSpPr>
-        <p:cNvPr id="1" name=""/>
-        <p:cNvGrpSpPr/>
-        <p:nvPr/>
-      </p:nvGrpSpPr>
-      <p:grpSpPr>
-        <a:xfrm>
-          <a:off x="0" y="0"/>
-          <a:ext cx="0" cy="0"/>
-          <a:chOff x="0" y="0"/>
-          <a:chExt cx="0" cy="0"/>
-        </a:xfrm>
-      </p:grpSpPr>
-      <p:sp>
-        <p:nvSpPr>
-          <p:cNvPr id="2" name="TextBox 1"/>
-          <p:cNvSpPr txBox="1"/>
-          <p:nvPr/>
-        </p:nvSpPr>
-        <p:spPr>
-          <a:xfrm>
-            <a:off x="0" y="266700"/>
-            <a:ext cx="9144000" cy="461665"/>
-          </a:xfrm>
-          <a:prstGeom prst="rect">
-            <a:avLst/>
-          </a:prstGeom>
-          <a:noFill/>
-        </p:spPr>
-        <p:txBody>
-          <a:bodyPr wrap="square" rtlCol="0">
-            <a:spAutoFit/>
-          </a:bodyPr>
-          <a:lstStyle/>
-          <a:p>
-            <a:pPr algn="ctr"/>
-            <a:r>
-              <a:rPr lang="en-US" sz="2400" dirty="0" smtClean="0"/>
-              <a:t>Proposed Policy Change</a:t>
-            </a:r>
-            <a:endParaRPr lang="en-US" sz="2400" dirty="0"/>
-          </a:p>
-        </p:txBody>
-      </p:sp>
-      <p:sp>
-        <p:nvSpPr>
-          <p:cNvPr id="3" name="TextBox 2"/>
-          <p:cNvSpPr txBox="1"/>
-          <p:nvPr/>
-        </p:nvSpPr>
-        <p:spPr>
-          <a:xfrm>
-            <a:off x="0" y="1007715"/>
-            <a:ext cx="9144000" cy="1495794"/>
-          </a:xfrm>
-          <a:prstGeom prst="rect">
-            <a:avLst/>
-          </a:prstGeom>
-          <a:noFill/>
-        </p:spPr>
-        <p:txBody>
-          <a:bodyPr wrap="square" lIns="365760" rIns="182880" rtlCol="0">
-            <a:spAutoFit/>
-          </a:bodyPr>
-          <a:lstStyle/>
-          <a:p>
-            <a:pPr marL="342900" indent="-342900">
-              <a:lnSpc>
-                <a:spcPct val="114000"/>
-              </a:lnSpc>
-              <a:buFont typeface="Arial" panose="020B0604020202020204" pitchFamily="34" charset="0"/>
-              <a:buChar char="•"/>
-            </a:pPr>
-            <a:r>
-              <a:rPr lang="en-US" sz="2000" dirty="0" smtClean="0"/>
-              <a:t>Maintain the minimum set-aside.</a:t>
-            </a:r>
-          </a:p>
-          <a:p>
-            <a:pPr marL="342900" indent="-342900">
-              <a:lnSpc>
-                <a:spcPct val="114000"/>
-              </a:lnSpc>
-              <a:buFont typeface="Arial" panose="020B0604020202020204" pitchFamily="34" charset="0"/>
-              <a:buChar char="•"/>
-            </a:pPr>
-            <a:r>
-              <a:rPr lang="en-US" sz="2000" dirty="0" smtClean="0"/>
-              <a:t>Convert from relative proposal ratings to absolute ratings.</a:t>
-            </a:r>
-          </a:p>
-          <a:p>
-            <a:pPr marL="342900" indent="-342900">
-              <a:lnSpc>
-                <a:spcPct val="114000"/>
-              </a:lnSpc>
-              <a:buFont typeface="Arial" panose="020B0604020202020204" pitchFamily="34" charset="0"/>
-              <a:buChar char="•"/>
-            </a:pPr>
-            <a:r>
-              <a:rPr lang="en-US" sz="2000" dirty="0" smtClean="0"/>
-              <a:t>Fund all proposals that rate as excellent or very good, while funding is available.</a:t>
-            </a:r>
-          </a:p>
-          <a:p>
-            <a:pPr marL="342900" indent="-342900">
-              <a:lnSpc>
-                <a:spcPct val="114000"/>
-              </a:lnSpc>
-              <a:buFont typeface="Arial" panose="020B0604020202020204" pitchFamily="34" charset="0"/>
-              <a:buChar char="•"/>
-            </a:pPr>
-            <a:r>
-              <a:rPr lang="en-US" sz="2000" dirty="0"/>
-              <a:t>Cap </a:t>
-            </a:r>
-            <a:r>
-              <a:rPr lang="en-US" sz="2000" dirty="0" smtClean="0"/>
-              <a:t>total annual SBIR funding </a:t>
-            </a:r>
-            <a:r>
-              <a:rPr lang="en-US" sz="2000" dirty="0"/>
-              <a:t>at </a:t>
-            </a:r>
-            <a:r>
-              <a:rPr lang="en-US" sz="2000" dirty="0" smtClean="0"/>
-              <a:t>15% </a:t>
-            </a:r>
-            <a:r>
-              <a:rPr lang="en-US" sz="2000" dirty="0"/>
-              <a:t>of extramural R&amp;D funding. </a:t>
-            </a:r>
-            <a:endParaRPr lang="en-US" sz="2400" dirty="0"/>
-          </a:p>
-        </p:txBody>
-      </p:sp>
-    </p:spTree>
-    <p:extLst>
-      <p:ext uri="{BB962C8B-B14F-4D97-AF65-F5344CB8AC3E}">
-        <p14:creationId xmlns:p14="http://schemas.microsoft.com/office/powerpoint/2010/main" val="886274995"/>
-      </p:ext>
-    </p:extLst>
-  </p:cSld>
-  <p:clrMapOvr>
-    <a:masterClrMapping/>
-  </p:clrMapOvr>
-  <p:timing>
-    <p:tnLst>
-      <p:par>
-        <p:cTn id="1" dur="indefinite" restart="never" nodeType="tmRoot"/>
-      </p:par>
-    </p:tnLst>
-  </p:timing>
-</p:sld>
-</file>
-
 <file path=ppt/slides/slide8.xml><?xml version="1.0" encoding="utf-8"?>
 <p:sld xmlns:a="http://schemas.openxmlformats.org/drawingml/2006/main" xmlns:r="http://schemas.openxmlformats.org/officeDocument/2006/relationships" xmlns:p="http://schemas.openxmlformats.org/presentationml/2006/main">
   <p:cSld>
@@ -7518,115 +8439,6 @@
         </p:nvSpPr>
         <p:spPr>
           <a:xfrm>
-            <a:off x="0" y="1028700"/>
-            <a:ext cx="9144000" cy="4247317"/>
-          </a:xfrm>
-          <a:prstGeom prst="rect">
-            <a:avLst/>
-          </a:prstGeom>
-          <a:noFill/>
-        </p:spPr>
-        <p:txBody>
-          <a:bodyPr wrap="square" lIns="182880" rIns="182880" rtlCol="0">
-            <a:spAutoFit/>
-          </a:bodyPr>
-          <a:lstStyle/>
-          <a:p>
-            <a:r>
-              <a:rPr lang="en-US" dirty="0" smtClean="0"/>
-              <a:t>SBIR/STTR Dashboard [data] (</a:t>
-            </a:r>
-            <a:r>
-              <a:rPr lang="en-US" dirty="0" err="1" smtClean="0"/>
-              <a:t>n.d.</a:t>
-            </a:r>
-            <a:r>
-              <a:rPr lang="en-US" dirty="0" smtClean="0"/>
-              <a:t>). Retrieved April 18, 2019, from https://www.sbir.gov/awards/annual-reports?view_by=Year</a:t>
-            </a:r>
-          </a:p>
-          <a:p>
-            <a:endParaRPr lang="en-US" dirty="0"/>
-          </a:p>
-          <a:p>
-            <a:r>
-              <a:rPr lang="en-US" dirty="0" smtClean="0"/>
-              <a:t>Small Business Innovation Act: 11th Annual Report. (1993). Retrieved from https://www.sbir.gov/sites/default/files/SBIR_1993.pdf</a:t>
-            </a:r>
-          </a:p>
-          <a:p>
-            <a:endParaRPr lang="en-US" dirty="0"/>
-          </a:p>
-          <a:p>
-            <a:r>
-              <a:rPr lang="en-US" dirty="0" smtClean="0"/>
-              <a:t>User: Robert. </a:t>
-            </a:r>
-            <a:r>
-              <a:rPr lang="en-US" dirty="0"/>
-              <a:t>(2001). North face south tower after plane strike </a:t>
-            </a:r>
-            <a:r>
-              <a:rPr lang="en-US" dirty="0" smtClean="0"/>
-              <a:t>9-11 </a:t>
-            </a:r>
-            <a:r>
-              <a:rPr lang="en-US" dirty="0"/>
-              <a:t>[Image]. </a:t>
-            </a:r>
-            <a:r>
-              <a:rPr lang="en-US" dirty="0" smtClean="0"/>
-              <a:t>[CC </a:t>
-            </a:r>
-            <a:r>
-              <a:rPr lang="en-US" dirty="0"/>
-              <a:t>BY-SA 2.0 https://</a:t>
-            </a:r>
-            <a:r>
-              <a:rPr lang="en-US" dirty="0" smtClean="0"/>
-              <a:t>creativecommons.org/licenses/by-sa/2.0] . No changes made. Retrieved April 19, 2019</a:t>
-            </a:r>
-            <a:r>
-              <a:rPr lang="en-US" dirty="0"/>
-              <a:t>, from https://commons.wikimedia.org/wiki/Category:Terrorism#/</a:t>
-            </a:r>
-            <a:r>
-              <a:rPr lang="en-US" dirty="0" smtClean="0"/>
-              <a:t>media/File:North_face_south_tower_after_plane_strike_9-11.jpg</a:t>
-            </a:r>
-          </a:p>
-          <a:p>
-            <a:endParaRPr lang="en-US" dirty="0"/>
-          </a:p>
-          <a:p>
-            <a:r>
-              <a:rPr lang="en-US" dirty="0" smtClean="0"/>
-              <a:t>User: </a:t>
-            </a:r>
-            <a:r>
-              <a:rPr lang="en-US" dirty="0" err="1" smtClean="0"/>
-              <a:t>DavidBailey</a:t>
-            </a:r>
-            <a:r>
-              <a:rPr lang="en-US" dirty="0" smtClean="0"/>
-              <a:t>. (2009). A dry riverbed in California [Image]. No changes made. Retrieved April 19, 2019</a:t>
-            </a:r>
-            <a:r>
-              <a:rPr lang="en-US" dirty="0"/>
-              <a:t>, from https://commons.wikimedia.org/wiki/File:California_Drought_Dry_Riverbed_2009.jpg</a:t>
-            </a:r>
-            <a:endParaRPr lang="en-US" dirty="0" smtClean="0"/>
-          </a:p>
-        </p:txBody>
-      </p:sp>
-      <p:sp>
-        <p:nvSpPr>
-          <p:cNvPr id="3" name="TextBox 2"/>
-          <p:cNvSpPr txBox="1"/>
-          <p:nvPr/>
-        </p:nvSpPr>
-        <p:spPr>
-          <a:xfrm>
             <a:off x="0" y="266700"/>
             <a:ext cx="9144000" cy="461665"/>
           </a:xfrm>
@@ -7644,7 +8456,99 @@
             <a:pPr algn="ctr"/>
             <a:r>
               <a:rPr lang="en-US" sz="2400" dirty="0" smtClean="0"/>
-              <a:t>References</a:t>
+              <a:t>Proposed Policy Change</a:t>
+            </a:r>
+            <a:endParaRPr lang="en-US" sz="2400" dirty="0"/>
+          </a:p>
+        </p:txBody>
+      </p:sp>
+      <p:sp>
+        <p:nvSpPr>
+          <p:cNvPr id="3" name="TextBox 2"/>
+          <p:cNvSpPr txBox="1"/>
+          <p:nvPr/>
+        </p:nvSpPr>
+        <p:spPr>
+          <a:xfrm>
+            <a:off x="0" y="1007715"/>
+            <a:ext cx="9144000" cy="1495794"/>
+          </a:xfrm>
+          <a:prstGeom prst="rect">
+            <a:avLst/>
+          </a:prstGeom>
+          <a:noFill/>
+        </p:spPr>
+        <p:txBody>
+          <a:bodyPr wrap="square" lIns="365760" rIns="182880" rtlCol="0">
+            <a:spAutoFit/>
+          </a:bodyPr>
+          <a:lstStyle/>
+          <a:p>
+            <a:pPr marL="342900" indent="-342900">
+              <a:lnSpc>
+                <a:spcPct val="114000"/>
+              </a:lnSpc>
+              <a:buFont typeface="Arial" panose="020B0604020202020204" pitchFamily="34" charset="0"/>
+              <a:buChar char="•"/>
+            </a:pPr>
+            <a:r>
+              <a:rPr lang="en-US" sz="2000" dirty="0" smtClean="0"/>
+              <a:t>Maintain the minimum set-aside.</a:t>
+            </a:r>
+          </a:p>
+          <a:p>
+            <a:pPr marL="342900" indent="-342900">
+              <a:lnSpc>
+                <a:spcPct val="114000"/>
+              </a:lnSpc>
+              <a:buFont typeface="Arial" panose="020B0604020202020204" pitchFamily="34" charset="0"/>
+              <a:buChar char="•"/>
+            </a:pPr>
+            <a:r>
+              <a:rPr lang="en-US" sz="2000" dirty="0" smtClean="0"/>
+              <a:t>Convert from relative proposal ratings to absolute ratings.</a:t>
+            </a:r>
+          </a:p>
+          <a:p>
+            <a:pPr marL="342900" indent="-342900">
+              <a:lnSpc>
+                <a:spcPct val="114000"/>
+              </a:lnSpc>
+              <a:buFont typeface="Arial" panose="020B0604020202020204" pitchFamily="34" charset="0"/>
+              <a:buChar char="•"/>
+            </a:pPr>
+            <a:r>
+              <a:rPr lang="en-US" sz="2000" dirty="0" smtClean="0"/>
+              <a:t>Fund all proposals that rate as excellent or very good, while funding is available.</a:t>
+            </a:r>
+          </a:p>
+          <a:p>
+            <a:pPr marL="342900" indent="-342900">
+              <a:lnSpc>
+                <a:spcPct val="114000"/>
+              </a:lnSpc>
+              <a:buFont typeface="Arial" panose="020B0604020202020204" pitchFamily="34" charset="0"/>
+              <a:buChar char="•"/>
+            </a:pPr>
+            <a:r>
+              <a:rPr lang="en-US" sz="2000" dirty="0"/>
+              <a:t>Cap </a:t>
+            </a:r>
+            <a:r>
+              <a:rPr lang="en-US" sz="2000" dirty="0" smtClean="0"/>
+              <a:t>total annual SBIR funding </a:t>
+            </a:r>
+            <a:r>
+              <a:rPr lang="en-US" sz="2000" dirty="0"/>
+              <a:t>at </a:t>
+            </a:r>
+            <a:r>
+              <a:rPr lang="en-US" sz="2000" dirty="0" smtClean="0"/>
+              <a:t>15% </a:t>
+            </a:r>
+            <a:r>
+              <a:rPr lang="en-US" sz="2000" dirty="0"/>
+              <a:t>of extramural R&amp;D funding. </a:t>
             </a:r>
             <a:endParaRPr lang="en-US" sz="2400" dirty="0"/>
           </a:p>
@@ -7653,7 +8557,7 @@
     </p:spTree>
     <p:extLst>
       <p:ext uri="{BB962C8B-B14F-4D97-AF65-F5344CB8AC3E}">
-        <p14:creationId xmlns:p14="http://schemas.microsoft.com/office/powerpoint/2010/main" val="242620626"/>
+        <p14:creationId xmlns:p14="http://schemas.microsoft.com/office/powerpoint/2010/main" val="886274995"/>
       </p:ext>
     </p:extLst>
   </p:cSld>
@@ -7695,91 +8599,8 @@
         </p:nvSpPr>
         <p:spPr>
           <a:xfrm>
-            <a:off x="0" y="1028700"/>
-            <a:ext cx="9144000" cy="3693319"/>
-          </a:xfrm>
-          <a:prstGeom prst="rect">
-            <a:avLst/>
-          </a:prstGeom>
-          <a:noFill/>
-        </p:spPr>
-        <p:txBody>
-          <a:bodyPr wrap="square" lIns="182880" rIns="182880" rtlCol="0">
-            <a:spAutoFit/>
-          </a:bodyPr>
-          <a:lstStyle/>
-          <a:p>
-            <a:r>
-              <a:rPr lang="en-US" dirty="0" smtClean="0"/>
-              <a:t>User: </a:t>
-            </a:r>
-            <a:r>
-              <a:rPr lang="en-US" dirty="0" err="1" smtClean="0"/>
-              <a:t>Lokal_Profil</a:t>
-            </a:r>
-            <a:r>
-              <a:rPr lang="en-US" dirty="0" smtClean="0"/>
-              <a:t>. (2007). Blank outline of the US [Image]. </a:t>
-            </a:r>
-            <a:r>
-              <a:rPr lang="en-US" dirty="0"/>
-              <a:t>CC-BY-SA 2.5 [https://</a:t>
-            </a:r>
-            <a:r>
-              <a:rPr lang="en-US" dirty="0" smtClean="0"/>
-              <a:t>creativecommons.org/licenses/by-sa/2.5].  Photocopy effect added. Retrieved April 19, 2019</a:t>
-            </a:r>
-            <a:r>
-              <a:rPr lang="en-US" dirty="0"/>
-              <a:t>, from https://commons.wikimedia.org/wiki/United_States#/media/File:Blank_US_Map,_</a:t>
-            </a:r>
-            <a:r>
-              <a:rPr lang="en-US" dirty="0" smtClean="0"/>
-              <a:t>Mainland_with_no_States.svg</a:t>
-            </a:r>
-          </a:p>
-          <a:p>
-            <a:endParaRPr lang="en-US" dirty="0"/>
-          </a:p>
-          <a:p>
-            <a:r>
-              <a:rPr lang="en-US" dirty="0" smtClean="0"/>
-              <a:t>User: Kremlin.ru. (2006). Official portrait of </a:t>
-            </a:r>
-            <a:r>
-              <a:rPr lang="en-US" dirty="0" err="1" smtClean="0"/>
-              <a:t>Vladmir</a:t>
-            </a:r>
-            <a:r>
-              <a:rPr lang="en-US" dirty="0" smtClean="0"/>
-              <a:t> Putin [Image]. </a:t>
-            </a:r>
-            <a:r>
-              <a:rPr lang="en-US" dirty="0"/>
-              <a:t>CC-BY 4.0 [https://</a:t>
-            </a:r>
-            <a:r>
-              <a:rPr lang="en-US" dirty="0" smtClean="0"/>
-              <a:t>creativecommons.org/licenses/by/4.0]. No changes made. Retrieved April 19, 2019</a:t>
-            </a:r>
-            <a:r>
-              <a:rPr lang="en-US" dirty="0"/>
-              <a:t>, from https://commons.wikimedia.org/w/index.php?title=Special:Search&amp;limit=500&amp;offset=0&amp;profile=default&amp;search=putin&amp;advancedSearch-current=%7B%7D&amp;ns0=1&amp;ns6=1&amp;ns12=1&amp;ns14=1&amp;ns100=1&amp;ns106=1&amp;searchToken=bcmpm63q76wb4lqzinwofwy4t#%2Fmedia%2FFile%3AVladimir_Putin_-_2006.jpg</a:t>
-            </a:r>
-            <a:endParaRPr lang="en-US" dirty="0" smtClean="0"/>
-          </a:p>
-        </p:txBody>
-      </p:sp>
-      <p:sp>
-        <p:nvSpPr>
-          <p:cNvPr id="3" name="TextBox 2"/>
-          <p:cNvSpPr txBox="1"/>
-          <p:nvPr/>
-        </p:nvSpPr>
-        <p:spPr>
-          <a:xfrm>
-            <a:off x="0" y="266700"/>
-            <a:ext cx="9144000" cy="461665"/>
+            <a:off x="1752600" y="2247900"/>
+            <a:ext cx="5562600" cy="369332"/>
           </a:xfrm>
           <a:prstGeom prst="rect">
             <a:avLst/>
@@ -7794,17 +8615,17 @@
           <a:p>
             <a:pPr algn="ctr"/>
             <a:r>
-              <a:rPr lang="en-US" sz="2400" dirty="0" smtClean="0"/>
-              <a:t>References</a:t>
-            </a:r>
-            <a:endParaRPr lang="en-US" sz="2400" dirty="0"/>
+              <a:rPr lang="en-US" dirty="0" smtClean="0"/>
+              <a:t>How to enact policy change.</a:t>
+            </a:r>
+            <a:endParaRPr lang="en-US" dirty="0"/>
           </a:p>
         </p:txBody>
       </p:sp>
     </p:spTree>
     <p:extLst>
       <p:ext uri="{BB962C8B-B14F-4D97-AF65-F5344CB8AC3E}">
-        <p14:creationId xmlns:p14="http://schemas.microsoft.com/office/powerpoint/2010/main" val="1749662596"/>
+        <p14:creationId xmlns:p14="http://schemas.microsoft.com/office/powerpoint/2010/main" val="2211152735"/>
       </p:ext>
     </p:extLst>
   </p:cSld>

</xml_diff>

<commit_message>
Updated presentation for FinalProject
</commit_message>
<xml_diff>
--- a/FinalProject/Docs/Townes_POLS6310_2019_Spring_FinalProject_Presentation_v00.pptx
+++ b/FinalProject/Docs/Townes_POLS6310_2019_Spring_FinalProject_Presentation_v00.pptx
@@ -5,27 +5,28 @@
     <p:sldMasterId id="2147483648" r:id="rId1"/>
   </p:sldMasterIdLst>
   <p:notesMasterIdLst>
-    <p:notesMasterId r:id="rId20"/>
+    <p:notesMasterId r:id="rId21"/>
   </p:notesMasterIdLst>
   <p:sldIdLst>
     <p:sldId id="256" r:id="rId2"/>
     <p:sldId id="268" r:id="rId3"/>
     <p:sldId id="274" r:id="rId4"/>
-    <p:sldId id="257" r:id="rId5"/>
-    <p:sldId id="259" r:id="rId6"/>
-    <p:sldId id="265" r:id="rId7"/>
-    <p:sldId id="266" r:id="rId8"/>
-    <p:sldId id="262" r:id="rId9"/>
-    <p:sldId id="270" r:id="rId10"/>
-    <p:sldId id="261" r:id="rId11"/>
-    <p:sldId id="267" r:id="rId12"/>
-    <p:sldId id="271" r:id="rId13"/>
-    <p:sldId id="258" r:id="rId14"/>
-    <p:sldId id="263" r:id="rId15"/>
-    <p:sldId id="273" r:id="rId16"/>
-    <p:sldId id="272" r:id="rId17"/>
-    <p:sldId id="264" r:id="rId18"/>
-    <p:sldId id="269" r:id="rId19"/>
+    <p:sldId id="275" r:id="rId5"/>
+    <p:sldId id="257" r:id="rId6"/>
+    <p:sldId id="259" r:id="rId7"/>
+    <p:sldId id="265" r:id="rId8"/>
+    <p:sldId id="266" r:id="rId9"/>
+    <p:sldId id="262" r:id="rId10"/>
+    <p:sldId id="270" r:id="rId11"/>
+    <p:sldId id="261" r:id="rId12"/>
+    <p:sldId id="267" r:id="rId13"/>
+    <p:sldId id="271" r:id="rId14"/>
+    <p:sldId id="258" r:id="rId15"/>
+    <p:sldId id="263" r:id="rId16"/>
+    <p:sldId id="273" r:id="rId17"/>
+    <p:sldId id="272" r:id="rId18"/>
+    <p:sldId id="264" r:id="rId19"/>
+    <p:sldId id="269" r:id="rId20"/>
   </p:sldIdLst>
   <p:sldSz cx="9144000" cy="5715000" type="screen16x10"/>
   <p:notesSz cx="6858000" cy="9144000"/>
@@ -560,11 +561,11 @@
           <c:showPercent val="0"/>
           <c:showBubbleSize val="0"/>
         </c:dLbls>
-        <c:axId val="108351872"/>
-        <c:axId val="108353408"/>
+        <c:axId val="42296448"/>
+        <c:axId val="42297984"/>
       </c:scatterChart>
       <c:valAx>
-        <c:axId val="108351872"/>
+        <c:axId val="42296448"/>
         <c:scaling>
           <c:orientation val="minMax"/>
           <c:max val="2015"/>
@@ -576,13 +577,13 @@
         <c:majorTickMark val="cross"/>
         <c:minorTickMark val="out"/>
         <c:tickLblPos val="nextTo"/>
-        <c:crossAx val="108353408"/>
+        <c:crossAx val="42297984"/>
         <c:crosses val="autoZero"/>
         <c:crossBetween val="midCat"/>
         <c:minorUnit val="1"/>
       </c:valAx>
       <c:valAx>
-        <c:axId val="108353408"/>
+        <c:axId val="42297984"/>
         <c:scaling>
           <c:orientation val="minMax"/>
         </c:scaling>
@@ -593,7 +594,7 @@
         <c:majorTickMark val="out"/>
         <c:minorTickMark val="none"/>
         <c:tickLblPos val="nextTo"/>
-        <c:crossAx val="108351872"/>
+        <c:crossAx val="42296448"/>
         <c:crosses val="autoZero"/>
         <c:crossBetween val="midCat"/>
       </c:valAx>
@@ -637,22 +638,18 @@
               <a:defRPr/>
             </a:pPr>
             <a:r>
-              <a:rPr lang="en-US"/>
-              <a:t>Utilization Efficiency</a:t>
-            </a:r>
-            <a:r>
-              <a:rPr lang="en-US" baseline="0"/>
-              <a:t> of </a:t>
-            </a:r>
-            <a:r>
-              <a:rPr lang="en-US"/>
-              <a:t>Small Business for </a:t>
-            </a:r>
-            <a:r>
-              <a:rPr lang="en-US" baseline="0"/>
-              <a:t>Federally-Funded R&amp;D</a:t>
-            </a:r>
-            <a:endParaRPr lang="en-US"/>
+              <a:rPr lang="en-US" dirty="0" smtClean="0"/>
+              <a:t>Small </a:t>
+            </a:r>
+            <a:r>
+              <a:rPr lang="en-US" dirty="0"/>
+              <a:t>Business </a:t>
+            </a:r>
+            <a:r>
+              <a:rPr lang="en-US" baseline="0" dirty="0" smtClean="0"/>
+              <a:t>Federally-Funded R&amp;D Percentage of Potential</a:t>
+            </a:r>
+            <a:endParaRPr lang="en-US" dirty="0"/>
           </a:p>
         </c:rich>
       </c:tx>
@@ -863,11 +860,11 @@
           <c:showPercent val="0"/>
           <c:showBubbleSize val="0"/>
         </c:dLbls>
-        <c:axId val="157024256"/>
-        <c:axId val="157027328"/>
+        <c:axId val="118059392"/>
+        <c:axId val="118060928"/>
       </c:scatterChart>
       <c:valAx>
-        <c:axId val="157024256"/>
+        <c:axId val="118059392"/>
         <c:scaling>
           <c:orientation val="minMax"/>
           <c:max val="2015"/>
@@ -879,12 +876,12 @@
         <c:majorTickMark val="cross"/>
         <c:minorTickMark val="out"/>
         <c:tickLblPos val="nextTo"/>
-        <c:crossAx val="157027328"/>
+        <c:crossAx val="118060928"/>
         <c:crosses val="autoZero"/>
         <c:crossBetween val="midCat"/>
       </c:valAx>
       <c:valAx>
-        <c:axId val="157027328"/>
+        <c:axId val="118060928"/>
         <c:scaling>
           <c:orientation val="minMax"/>
         </c:scaling>
@@ -895,7 +892,7 @@
         <c:majorTickMark val="out"/>
         <c:minorTickMark val="none"/>
         <c:tickLblPos val="nextTo"/>
-        <c:crossAx val="157024256"/>
+        <c:crossAx val="118059392"/>
         <c:crosses val="autoZero"/>
         <c:crossBetween val="midCat"/>
       </c:valAx>
@@ -951,8 +948,12 @@
               <a:t>Fair Share </a:t>
             </a:r>
             <a:r>
+              <a:rPr lang="en-US" baseline="0" dirty="0" smtClean="0"/>
+              <a:t>of Federally </a:t>
+            </a:r>
+            <a:r>
               <a:rPr lang="en-US" baseline="0" dirty="0"/>
-              <a:t>Federally Funded R&amp;D</a:t>
+              <a:t>Funded R&amp;D</a:t>
             </a:r>
             <a:endParaRPr lang="en-US" dirty="0"/>
           </a:p>
@@ -1608,11 +1609,11 @@
           <c:showPercent val="0"/>
           <c:showBubbleSize val="0"/>
         </c:dLbls>
-        <c:axId val="108872448"/>
-        <c:axId val="108874368"/>
+        <c:axId val="117833728"/>
+        <c:axId val="117834880"/>
       </c:scatterChart>
       <c:valAx>
-        <c:axId val="108872448"/>
+        <c:axId val="117833728"/>
         <c:scaling>
           <c:orientation val="minMax"/>
           <c:max val="2015"/>
@@ -1624,12 +1625,12 @@
         <c:majorTickMark val="cross"/>
         <c:minorTickMark val="out"/>
         <c:tickLblPos val="nextTo"/>
-        <c:crossAx val="108874368"/>
+        <c:crossAx val="117834880"/>
         <c:crosses val="autoZero"/>
         <c:crossBetween val="midCat"/>
       </c:valAx>
       <c:valAx>
-        <c:axId val="108874368"/>
+        <c:axId val="117834880"/>
         <c:scaling>
           <c:orientation val="minMax"/>
         </c:scaling>
@@ -1640,7 +1641,7 @@
         <c:majorTickMark val="cross"/>
         <c:minorTickMark val="out"/>
         <c:tickLblPos val="nextTo"/>
-        <c:crossAx val="108872448"/>
+        <c:crossAx val="117833728"/>
         <c:crosses val="autoZero"/>
         <c:crossBetween val="midCat"/>
         <c:minorUnit val="1.0000000000000002E-2"/>
@@ -1748,7 +1749,7 @@
           <a:p>
             <a:fld id="{1DDE1E71-8F58-4980-B6E2-DAE065DEDC1F}" type="datetimeFigureOut">
               <a:rPr lang="en-US" smtClean="0"/>
-              <a:t>04/24/2019</a:t>
+              <a:t>04/25/2019</a:t>
             </a:fld>
             <a:endParaRPr lang="en-US"/>
           </a:p>
@@ -2189,7 +2190,7 @@
           <a:p>
             <a:fld id="{859DE06D-F133-4988-97F6-9372E6CBBFD7}" type="slidenum">
               <a:rPr lang="en-US" smtClean="0"/>
-              <a:t>8</a:t>
+              <a:t>9</a:t>
             </a:fld>
             <a:endParaRPr lang="en-US"/>
           </a:p>
@@ -2276,7 +2277,7 @@
           <a:p>
             <a:fld id="{859DE06D-F133-4988-97F6-9372E6CBBFD7}" type="slidenum">
               <a:rPr lang="en-US" smtClean="0"/>
-              <a:t>9</a:t>
+              <a:t>10</a:t>
             </a:fld>
             <a:endParaRPr lang="en-US"/>
           </a:p>
@@ -2378,7 +2379,7 @@
           <a:p>
             <a:fld id="{859DE06D-F133-4988-97F6-9372E6CBBFD7}" type="slidenum">
               <a:rPr lang="en-US" smtClean="0"/>
-              <a:t>11</a:t>
+              <a:t>12</a:t>
             </a:fld>
             <a:endParaRPr lang="en-US"/>
           </a:p>
@@ -2476,7 +2477,7 @@
           <a:p>
             <a:fld id="{859DE06D-F133-4988-97F6-9372E6CBBFD7}" type="slidenum">
               <a:rPr lang="en-US" smtClean="0"/>
-              <a:t>17</a:t>
+              <a:t>18</a:t>
             </a:fld>
             <a:endParaRPr lang="en-US"/>
           </a:p>
@@ -2590,7 +2591,7 @@
           <a:p>
             <a:fld id="{859DE06D-F133-4988-97F6-9372E6CBBFD7}" type="slidenum">
               <a:rPr lang="en-US" smtClean="0"/>
-              <a:t>18</a:t>
+              <a:t>19</a:t>
             </a:fld>
             <a:endParaRPr lang="en-US"/>
           </a:p>
@@ -2790,7 +2791,7 @@
           <a:p>
             <a:fld id="{7A82E564-8FF3-43DC-B0C7-D811F2D95778}" type="datetimeFigureOut">
               <a:rPr lang="en-US" smtClean="0"/>
-              <a:t>04/24/2019</a:t>
+              <a:t>04/25/2019</a:t>
             </a:fld>
             <a:endParaRPr lang="en-US"/>
           </a:p>
@@ -2960,7 +2961,7 @@
           <a:p>
             <a:fld id="{7A82E564-8FF3-43DC-B0C7-D811F2D95778}" type="datetimeFigureOut">
               <a:rPr lang="en-US" smtClean="0"/>
-              <a:t>04/24/2019</a:t>
+              <a:t>04/25/2019</a:t>
             </a:fld>
             <a:endParaRPr lang="en-US"/>
           </a:p>
@@ -3140,7 +3141,7 @@
           <a:p>
             <a:fld id="{7A82E564-8FF3-43DC-B0C7-D811F2D95778}" type="datetimeFigureOut">
               <a:rPr lang="en-US" smtClean="0"/>
-              <a:t>04/24/2019</a:t>
+              <a:t>04/25/2019</a:t>
             </a:fld>
             <a:endParaRPr lang="en-US"/>
           </a:p>
@@ -3310,7 +3311,7 @@
           <a:p>
             <a:fld id="{7A82E564-8FF3-43DC-B0C7-D811F2D95778}" type="datetimeFigureOut">
               <a:rPr lang="en-US" smtClean="0"/>
-              <a:t>04/24/2019</a:t>
+              <a:t>04/25/2019</a:t>
             </a:fld>
             <a:endParaRPr lang="en-US"/>
           </a:p>
@@ -3556,7 +3557,7 @@
           <a:p>
             <a:fld id="{7A82E564-8FF3-43DC-B0C7-D811F2D95778}" type="datetimeFigureOut">
               <a:rPr lang="en-US" smtClean="0"/>
-              <a:t>04/24/2019</a:t>
+              <a:t>04/25/2019</a:t>
             </a:fld>
             <a:endParaRPr lang="en-US"/>
           </a:p>
@@ -3844,7 +3845,7 @@
           <a:p>
             <a:fld id="{7A82E564-8FF3-43DC-B0C7-D811F2D95778}" type="datetimeFigureOut">
               <a:rPr lang="en-US" smtClean="0"/>
-              <a:t>04/24/2019</a:t>
+              <a:t>04/25/2019</a:t>
             </a:fld>
             <a:endParaRPr lang="en-US"/>
           </a:p>
@@ -4271,7 +4272,7 @@
           <a:p>
             <a:fld id="{7A82E564-8FF3-43DC-B0C7-D811F2D95778}" type="datetimeFigureOut">
               <a:rPr lang="en-US" smtClean="0"/>
-              <a:t>04/24/2019</a:t>
+              <a:t>04/25/2019</a:t>
             </a:fld>
             <a:endParaRPr lang="en-US"/>
           </a:p>
@@ -4389,7 +4390,7 @@
           <a:p>
             <a:fld id="{7A82E564-8FF3-43DC-B0C7-D811F2D95778}" type="datetimeFigureOut">
               <a:rPr lang="en-US" smtClean="0"/>
-              <a:t>04/24/2019</a:t>
+              <a:t>04/25/2019</a:t>
             </a:fld>
             <a:endParaRPr lang="en-US"/>
           </a:p>
@@ -4484,7 +4485,7 @@
           <a:p>
             <a:fld id="{7A82E564-8FF3-43DC-B0C7-D811F2D95778}" type="datetimeFigureOut">
               <a:rPr lang="en-US" smtClean="0"/>
-              <a:t>04/24/2019</a:t>
+              <a:t>04/25/2019</a:t>
             </a:fld>
             <a:endParaRPr lang="en-US"/>
           </a:p>
@@ -4761,7 +4762,7 @@
           <a:p>
             <a:fld id="{7A82E564-8FF3-43DC-B0C7-D811F2D95778}" type="datetimeFigureOut">
               <a:rPr lang="en-US" smtClean="0"/>
-              <a:t>04/24/2019</a:t>
+              <a:t>04/25/2019</a:t>
             </a:fld>
             <a:endParaRPr lang="en-US"/>
           </a:p>
@@ -5014,7 +5015,7 @@
           <a:p>
             <a:fld id="{7A82E564-8FF3-43DC-B0C7-D811F2D95778}" type="datetimeFigureOut">
               <a:rPr lang="en-US" smtClean="0"/>
-              <a:t>04/24/2019</a:t>
+              <a:t>04/25/2019</a:t>
             </a:fld>
             <a:endParaRPr lang="en-US"/>
           </a:p>
@@ -5227,7 +5228,7 @@
           <a:p>
             <a:fld id="{7A82E564-8FF3-43DC-B0C7-D811F2D95778}" type="datetimeFigureOut">
               <a:rPr lang="en-US" smtClean="0"/>
-              <a:t>04/24/2019</a:t>
+              <a:t>04/25/2019</a:t>
             </a:fld>
             <a:endParaRPr lang="en-US"/>
           </a:p>
@@ -5627,22 +5628,14 @@
             <a:pPr algn="ctr"/>
             <a:r>
               <a:rPr lang="en-US" sz="4000" b="1" dirty="0" smtClean="0"/>
-              <a:t>Improving </a:t>
-            </a:r>
+              <a:t>Improving the </a:t>
+            </a:r>
+          </a:p>
+          <a:p>
+            <a:pPr algn="ctr"/>
             <a:r>
               <a:rPr lang="en-US" sz="4000" b="1" dirty="0" smtClean="0"/>
-              <a:t>the </a:t>
-            </a:r>
-          </a:p>
-          <a:p>
-            <a:pPr algn="ctr"/>
-            <a:r>
-              <a:rPr lang="en-US" sz="4000" b="1" dirty="0" smtClean="0"/>
-              <a:t>Small </a:t>
-            </a:r>
-            <a:r>
-              <a:rPr lang="en-US" sz="4000" b="1" dirty="0" smtClean="0"/>
-              <a:t>Business Innovation Act of 1982</a:t>
+              <a:t>Small Business Innovation Act of 1982</a:t>
             </a:r>
             <a:endParaRPr lang="en-US" sz="4000" b="1" dirty="0"/>
           </a:p>
@@ -5731,6 +5724,143 @@
           <a:chExt cx="0" cy="0"/>
         </a:xfrm>
       </p:grpSpPr>
+      <p:pic>
+        <p:nvPicPr>
+          <p:cNvPr id="3076" name="Picture 4" descr="Boat in storm evening — stock photo"/>
+          <p:cNvPicPr>
+            <a:picLocks noChangeAspect="1" noChangeArrowheads="1"/>
+          </p:cNvPicPr>
+          <p:nvPr/>
+        </p:nvPicPr>
+        <p:blipFill>
+          <a:blip r:embed="rId3">
+            <a:extLst>
+              <a:ext uri="{28A0092B-C50C-407E-A947-70E740481C1C}">
+                <a14:useLocalDpi xmlns:a14="http://schemas.microsoft.com/office/drawing/2010/main" val="0"/>
+              </a:ext>
+            </a:extLst>
+          </a:blip>
+          <a:srcRect/>
+          <a:stretch>
+            <a:fillRect/>
+          </a:stretch>
+        </p:blipFill>
+        <p:spPr bwMode="auto">
+          <a:xfrm>
+            <a:off x="0" y="-1714500"/>
+            <a:ext cx="9144000" cy="9144001"/>
+          </a:xfrm>
+          <a:prstGeom prst="rect">
+            <a:avLst/>
+          </a:prstGeom>
+          <a:noFill/>
+          <a:extLst>
+            <a:ext uri="{909E8E84-426E-40DD-AFC4-6F175D3DCCD1}">
+              <a14:hiddenFill xmlns:a14="http://schemas.microsoft.com/office/drawing/2010/main">
+                <a:solidFill>
+                  <a:srgbClr val="FFFFFF"/>
+                </a:solidFill>
+              </a14:hiddenFill>
+            </a:ext>
+          </a:extLst>
+        </p:spPr>
+      </p:pic>
+      <p:pic>
+        <p:nvPicPr>
+          <p:cNvPr id="4100" name="Picture 4" descr="Image result for anchor and chain"/>
+          <p:cNvPicPr>
+            <a:picLocks noChangeAspect="1" noChangeArrowheads="1"/>
+          </p:cNvPicPr>
+          <p:nvPr/>
+        </p:nvPicPr>
+        <p:blipFill>
+          <a:blip r:embed="rId4" cstate="print">
+            <a:extLst>
+              <a:ext uri="{BEBA8EAE-BF5A-486C-A8C5-ECC9F3942E4B}">
+                <a14:imgProps xmlns:a14="http://schemas.microsoft.com/office/drawing/2010/main">
+                  <a14:imgLayer r:embed="rId5">
+                    <a14:imgEffect>
+                      <a14:backgroundRemoval t="0" b="99805" l="0" r="100000"/>
+                    </a14:imgEffect>
+                    <a14:imgEffect>
+                      <a14:artisticLightScreen trans="55000"/>
+                    </a14:imgEffect>
+                  </a14:imgLayer>
+                </a14:imgProps>
+              </a:ext>
+              <a:ext uri="{28A0092B-C50C-407E-A947-70E740481C1C}">
+                <a14:useLocalDpi xmlns:a14="http://schemas.microsoft.com/office/drawing/2010/main" val="0"/>
+              </a:ext>
+            </a:extLst>
+          </a:blip>
+          <a:srcRect/>
+          <a:stretch>
+            <a:fillRect/>
+          </a:stretch>
+        </p:blipFill>
+        <p:spPr bwMode="auto">
+          <a:xfrm rot="2172986">
+            <a:off x="528191" y="3848984"/>
+            <a:ext cx="422699" cy="1313556"/>
+          </a:xfrm>
+          <a:prstGeom prst="rect">
+            <a:avLst/>
+          </a:prstGeom>
+          <a:noFill/>
+          <a:scene3d>
+            <a:camera prst="perspectiveContrastingLeftFacing" fov="7200000">
+              <a:rot lat="0" lon="3000000" rev="20400000"/>
+            </a:camera>
+            <a:lightRig rig="threePt" dir="t"/>
+          </a:scene3d>
+          <a:extLst>
+            <a:ext uri="{909E8E84-426E-40DD-AFC4-6F175D3DCCD1}">
+              <a14:hiddenFill xmlns:a14="http://schemas.microsoft.com/office/drawing/2010/main">
+                <a:solidFill>
+                  <a:srgbClr val="FFFFFF"/>
+                </a:solidFill>
+              </a14:hiddenFill>
+            </a:ext>
+          </a:extLst>
+        </p:spPr>
+      </p:pic>
+    </p:spTree>
+    <p:extLst>
+      <p:ext uri="{BB962C8B-B14F-4D97-AF65-F5344CB8AC3E}">
+        <p14:creationId xmlns:p14="http://schemas.microsoft.com/office/powerpoint/2010/main" val="3810706332"/>
+      </p:ext>
+    </p:extLst>
+  </p:cSld>
+  <p:clrMapOvr>
+    <a:masterClrMapping/>
+  </p:clrMapOvr>
+  <p:timing>
+    <p:tnLst>
+      <p:par>
+        <p:cTn id="1" dur="indefinite" restart="never" nodeType="tmRoot"/>
+      </p:par>
+    </p:tnLst>
+  </p:timing>
+</p:sld>
+</file>
+
+<file path=ppt/slides/slide11.xml><?xml version="1.0" encoding="utf-8"?>
+<p:sld xmlns:a="http://schemas.openxmlformats.org/drawingml/2006/main" xmlns:r="http://schemas.openxmlformats.org/officeDocument/2006/relationships" xmlns:p="http://schemas.openxmlformats.org/presentationml/2006/main">
+  <p:cSld>
+    <p:spTree>
+      <p:nvGrpSpPr>
+        <p:cNvPr id="1" name=""/>
+        <p:cNvGrpSpPr/>
+        <p:nvPr/>
+      </p:nvGrpSpPr>
+      <p:grpSpPr>
+        <a:xfrm>
+          <a:off x="0" y="0"/>
+          <a:ext cx="0" cy="0"/>
+          <a:chOff x="0" y="0"/>
+          <a:chExt cx="0" cy="0"/>
+        </a:xfrm>
+      </p:grpSpPr>
       <p:sp>
         <p:nvSpPr>
           <p:cNvPr id="2" name="TextBox 1"/>
@@ -5882,7 +6012,7 @@
 </p:sld>
 </file>
 
-<file path=ppt/slides/slide11.xml><?xml version="1.0" encoding="utf-8"?>
+<file path=ppt/slides/slide12.xml><?xml version="1.0" encoding="utf-8"?>
 <p:sld xmlns:a="http://schemas.openxmlformats.org/drawingml/2006/main" xmlns:r="http://schemas.openxmlformats.org/officeDocument/2006/relationships" xmlns:p="http://schemas.openxmlformats.org/presentationml/2006/main">
   <p:cSld>
     <p:spTree>
@@ -6012,89 +6142,6 @@
 </p:sld>
 </file>
 
-<file path=ppt/slides/slide12.xml><?xml version="1.0" encoding="utf-8"?>
-<p:sld xmlns:a="http://schemas.openxmlformats.org/drawingml/2006/main" xmlns:r="http://schemas.openxmlformats.org/officeDocument/2006/relationships" xmlns:p="http://schemas.openxmlformats.org/presentationml/2006/main">
-  <p:cSld>
-    <p:spTree>
-      <p:nvGrpSpPr>
-        <p:cNvPr id="1" name=""/>
-        <p:cNvGrpSpPr/>
-        <p:nvPr/>
-      </p:nvGrpSpPr>
-      <p:grpSpPr>
-        <a:xfrm>
-          <a:off x="0" y="0"/>
-          <a:ext cx="0" cy="0"/>
-          <a:chOff x="0" y="0"/>
-          <a:chExt cx="0" cy="0"/>
-        </a:xfrm>
-      </p:grpSpPr>
-      <p:sp>
-        <p:nvSpPr>
-          <p:cNvPr id="2" name="Title 1"/>
-          <p:cNvSpPr>
-            <a:spLocks noGrp="1"/>
-          </p:cNvSpPr>
-          <p:nvPr>
-            <p:ph type="title"/>
-          </p:nvPr>
-        </p:nvSpPr>
-        <p:spPr/>
-        <p:txBody>
-          <a:bodyPr/>
-          <a:lstStyle/>
-          <a:p>
-            <a:r>
-              <a:rPr lang="en-US" dirty="0" smtClean="0"/>
-              <a:t>Discussion and Suggestions</a:t>
-            </a:r>
-            <a:endParaRPr lang="en-US" dirty="0"/>
-          </a:p>
-        </p:txBody>
-      </p:sp>
-      <p:sp>
-        <p:nvSpPr>
-          <p:cNvPr id="3" name="Text Placeholder 2"/>
-          <p:cNvSpPr>
-            <a:spLocks noGrp="1"/>
-          </p:cNvSpPr>
-          <p:nvPr>
-            <p:ph type="body" idx="1"/>
-          </p:nvPr>
-        </p:nvSpPr>
-        <p:spPr/>
-        <p:txBody>
-          <a:bodyPr/>
-          <a:lstStyle/>
-          <a:p>
-            <a:r>
-              <a:rPr lang="en-US" dirty="0" smtClean="0"/>
-              <a:t>Open Discussion</a:t>
-            </a:r>
-            <a:endParaRPr lang="en-US" dirty="0"/>
-          </a:p>
-        </p:txBody>
-      </p:sp>
-    </p:spTree>
-    <p:extLst>
-      <p:ext uri="{BB962C8B-B14F-4D97-AF65-F5344CB8AC3E}">
-        <p14:creationId xmlns:p14="http://schemas.microsoft.com/office/powerpoint/2010/main" val="3614400491"/>
-      </p:ext>
-    </p:extLst>
-  </p:cSld>
-  <p:clrMapOvr>
-    <a:masterClrMapping/>
-  </p:clrMapOvr>
-  <p:timing>
-    <p:tnLst>
-      <p:par>
-        <p:cTn id="1" dur="indefinite" restart="never" nodeType="tmRoot"/>
-      </p:par>
-    </p:tnLst>
-  </p:timing>
-</p:sld>
-</file>
-
 <file path=ppt/slides/slide13.xml><?xml version="1.0" encoding="utf-8"?>
 <p:sld xmlns:a="http://schemas.openxmlformats.org/drawingml/2006/main" xmlns:r="http://schemas.openxmlformats.org/officeDocument/2006/relationships" xmlns:p="http://schemas.openxmlformats.org/presentationml/2006/main">
   <p:cSld>
@@ -6114,154 +6161,54 @@
       </p:grpSpPr>
       <p:sp>
         <p:nvSpPr>
-          <p:cNvPr id="2" name="TextBox 1"/>
-          <p:cNvSpPr txBox="1"/>
-          <p:nvPr/>
-        </p:nvSpPr>
-        <p:spPr>
-          <a:xfrm>
-            <a:off x="0" y="1028700"/>
-            <a:ext cx="9144000" cy="3970318"/>
-          </a:xfrm>
-          <a:prstGeom prst="rect">
-            <a:avLst/>
-          </a:prstGeom>
-          <a:noFill/>
-        </p:spPr>
+          <p:cNvPr id="2" name="Title 1"/>
+          <p:cNvSpPr>
+            <a:spLocks noGrp="1"/>
+          </p:cNvSpPr>
+          <p:nvPr>
+            <p:ph type="title"/>
+          </p:nvPr>
+        </p:nvSpPr>
+        <p:spPr/>
         <p:txBody>
-          <a:bodyPr wrap="square" lIns="182880" rIns="182880" rtlCol="0">
-            <a:spAutoFit/>
-          </a:bodyPr>
+          <a:bodyPr/>
           <a:lstStyle/>
           <a:p>
             <a:r>
               <a:rPr lang="en-US" dirty="0" smtClean="0"/>
-              <a:t>“Federal Funds for Research and Development, Detailed Historical Tables: Fiscal Years 1951-2002” (2015). </a:t>
-            </a:r>
-            <a:r>
-              <a:rPr lang="en-US" dirty="0"/>
-              <a:t>Available from https://wayback.archive-it.org/5902/20150627201426/http://www.nsf.gov/statistics/nsf03325/</a:t>
-            </a:r>
-            <a:endParaRPr lang="en-US" dirty="0" smtClean="0"/>
-          </a:p>
-          <a:p>
-            <a:endParaRPr lang="en-US" dirty="0" smtClean="0"/>
-          </a:p>
+              <a:t>Discussion and Suggestions</a:t>
+            </a:r>
+            <a:endParaRPr lang="en-US" dirty="0"/>
+          </a:p>
+        </p:txBody>
+      </p:sp>
+      <p:sp>
+        <p:nvSpPr>
+          <p:cNvPr id="3" name="Text Placeholder 2"/>
+          <p:cNvSpPr>
+            <a:spLocks noGrp="1"/>
+          </p:cNvSpPr>
+          <p:nvPr>
+            <p:ph type="body" idx="1"/>
+          </p:nvPr>
+        </p:nvSpPr>
+        <p:spPr/>
+        <p:txBody>
+          <a:bodyPr/>
+          <a:lstStyle/>
           <a:p>
             <a:r>
               <a:rPr lang="en-US" dirty="0" smtClean="0"/>
-              <a:t>“Federal obligations for research, development, and R&amp;D plant, by category of obligation, performer, and field of </a:t>
-            </a:r>
-            <a:r>
-              <a:rPr lang="en-US" dirty="0" err="1" smtClean="0"/>
-              <a:t>scence</a:t>
-            </a:r>
-            <a:r>
-              <a:rPr lang="en-US" dirty="0" smtClean="0"/>
-              <a:t> and engineering: Fiscal years 2009 through 2017”. (2018). </a:t>
-            </a:r>
-            <a:r>
-              <a:rPr lang="en-US" dirty="0"/>
-              <a:t>Available from https://</a:t>
-            </a:r>
-            <a:r>
-              <a:rPr lang="en-US" dirty="0" smtClean="0"/>
-              <a:t>nces.ed.gov/programs/digest/d17/tables/dt17_402.10.asp</a:t>
-            </a:r>
-          </a:p>
-          <a:p>
+              <a:t>Open Discussion</a:t>
+            </a:r>
             <a:endParaRPr lang="en-US" dirty="0"/>
-          </a:p>
-          <a:p>
-            <a:r>
-              <a:rPr lang="en-US" dirty="0" smtClean="0"/>
-              <a:t>The National Academies of Sciences, Engineering, and Medicine. (2000). Chapter F: National Science </a:t>
-            </a:r>
-            <a:r>
-              <a:rPr lang="en-US" dirty="0" err="1" smtClean="0"/>
-              <a:t>Foudnation</a:t>
-            </a:r>
-            <a:r>
-              <a:rPr lang="en-US" dirty="0" smtClean="0"/>
-              <a:t> Proposal Success Rates. </a:t>
-            </a:r>
-            <a:r>
-              <a:rPr lang="en-US" i="1" dirty="0" smtClean="0"/>
-              <a:t>Federal Funding of Astronomical Research</a:t>
-            </a:r>
-            <a:r>
-              <a:rPr lang="en-US" dirty="0" smtClean="0"/>
-              <a:t>. </a:t>
-            </a:r>
-            <a:r>
-              <a:rPr lang="en-US" dirty="0"/>
-              <a:t>Retrieved from https://www.nap.edu/read/9954/chapter/16</a:t>
-            </a:r>
-            <a:endParaRPr lang="en-US" dirty="0" smtClean="0"/>
-          </a:p>
-          <a:p>
-            <a:endParaRPr lang="en-US" dirty="0" smtClean="0"/>
-          </a:p>
-          <a:p>
-            <a:r>
-              <a:rPr lang="en-US" dirty="0" smtClean="0"/>
-              <a:t>SBIR/STTR </a:t>
-            </a:r>
-            <a:r>
-              <a:rPr lang="en-US" dirty="0" smtClean="0"/>
-              <a:t>Dashboard [data] (</a:t>
-            </a:r>
-            <a:r>
-              <a:rPr lang="en-US" dirty="0" err="1" smtClean="0"/>
-              <a:t>n.d.</a:t>
-            </a:r>
-            <a:r>
-              <a:rPr lang="en-US" dirty="0" smtClean="0"/>
-              <a:t>). Retrieved April 18, 2019, from https://</a:t>
-            </a:r>
-            <a:r>
-              <a:rPr lang="en-US" dirty="0" smtClean="0"/>
-              <a:t>www.sbir.gov/awards/annual-reports?view_by=Year</a:t>
-            </a:r>
-            <a:endParaRPr lang="en-US" dirty="0" smtClean="0"/>
-          </a:p>
-        </p:txBody>
-      </p:sp>
-      <p:sp>
-        <p:nvSpPr>
-          <p:cNvPr id="3" name="TextBox 2"/>
-          <p:cNvSpPr txBox="1"/>
-          <p:nvPr/>
-        </p:nvSpPr>
-        <p:spPr>
-          <a:xfrm>
-            <a:off x="0" y="266700"/>
-            <a:ext cx="9144000" cy="461665"/>
-          </a:xfrm>
-          <a:prstGeom prst="rect">
-            <a:avLst/>
-          </a:prstGeom>
-          <a:noFill/>
-        </p:spPr>
-        <p:txBody>
-          <a:bodyPr wrap="square" rtlCol="0">
-            <a:spAutoFit/>
-          </a:bodyPr>
-          <a:lstStyle/>
-          <a:p>
-            <a:pPr algn="ctr"/>
-            <a:r>
-              <a:rPr lang="en-US" sz="2400" dirty="0" smtClean="0"/>
-              <a:t>References</a:t>
-            </a:r>
-            <a:endParaRPr lang="en-US" sz="2400" dirty="0"/>
           </a:p>
         </p:txBody>
       </p:sp>
     </p:spTree>
     <p:extLst>
       <p:ext uri="{BB962C8B-B14F-4D97-AF65-F5344CB8AC3E}">
-        <p14:creationId xmlns:p14="http://schemas.microsoft.com/office/powerpoint/2010/main" val="242620626"/>
+        <p14:creationId xmlns:p14="http://schemas.microsoft.com/office/powerpoint/2010/main" val="3614400491"/>
       </p:ext>
     </p:extLst>
   </p:cSld>
@@ -6304,7 +6251,7 @@
         <p:spPr>
           <a:xfrm>
             <a:off x="0" y="1028700"/>
-            <a:ext cx="9144000" cy="3416320"/>
+            <a:ext cx="9144000" cy="4524315"/>
           </a:xfrm>
           <a:prstGeom prst="rect">
             <a:avLst/>
@@ -6317,98 +6264,112 @@
           </a:bodyPr>
           <a:lstStyle/>
           <a:p>
-            <a:pPr lvl="0"/>
-            <a:r>
-              <a:rPr lang="en-US" dirty="0" smtClean="0">
-                <a:solidFill>
-                  <a:prstClr val="black"/>
-                </a:solidFill>
-              </a:rPr>
-              <a:t>Small </a:t>
-            </a:r>
-            <a:r>
-              <a:rPr lang="en-US" dirty="0">
-                <a:solidFill>
-                  <a:prstClr val="black"/>
-                </a:solidFill>
-              </a:rPr>
-              <a:t>Business Innovation Act: 11th Annual Report. (1993). Retrieved from https://www.sbir.gov/sites/default/files/SBIR_1993.pdf</a:t>
-            </a:r>
-          </a:p>
-          <a:p>
-            <a:pPr lvl="0"/>
-            <a:endParaRPr lang="en-US" dirty="0" smtClean="0">
-              <a:solidFill>
-                <a:prstClr val="black"/>
-              </a:solidFill>
-            </a:endParaRPr>
-          </a:p>
-          <a:p>
-            <a:pPr lvl="0"/>
-            <a:r>
-              <a:rPr lang="en-US" dirty="0" smtClean="0">
-                <a:solidFill>
-                  <a:prstClr val="black"/>
-                </a:solidFill>
-              </a:rPr>
-              <a:t>User</a:t>
-            </a:r>
-            <a:r>
-              <a:rPr lang="en-US" dirty="0">
-                <a:solidFill>
-                  <a:prstClr val="black"/>
-                </a:solidFill>
-              </a:rPr>
-              <a:t>: Robert. (2001). North face south tower after plane strike 9-11 [Image]. [CC BY-SA 2.0 https://creativecommons.org/licenses/by-sa/2.0] . No changes made. Retrieved April 19, 2019, from https://commons.wikimedia.org/wiki/Category:Terrorism#/media/File:North_face_south_tower_after_plane_strike_9-11.jpg</a:t>
-            </a:r>
-          </a:p>
-          <a:p>
-            <a:pPr lvl="0"/>
-            <a:endParaRPr lang="en-US" dirty="0">
-              <a:solidFill>
-                <a:prstClr val="black"/>
-              </a:solidFill>
-            </a:endParaRPr>
-          </a:p>
-          <a:p>
-            <a:pPr lvl="0"/>
-            <a:r>
-              <a:rPr lang="en-US" dirty="0">
-                <a:solidFill>
-                  <a:prstClr val="black"/>
-                </a:solidFill>
-              </a:rPr>
-              <a:t>User: </a:t>
-            </a:r>
-            <a:r>
-              <a:rPr lang="en-US" dirty="0" err="1">
-                <a:solidFill>
-                  <a:prstClr val="black"/>
-                </a:solidFill>
-              </a:rPr>
-              <a:t>DavidBailey</a:t>
-            </a:r>
-            <a:r>
-              <a:rPr lang="en-US" dirty="0">
-                <a:solidFill>
-                  <a:prstClr val="black"/>
-                </a:solidFill>
-              </a:rPr>
-              <a:t>. (2009). A dry riverbed in California [Image]. No changes made. Retrieved April 19, 2019, from https://</a:t>
-            </a:r>
-            <a:r>
-              <a:rPr lang="en-US" dirty="0" smtClean="0">
-                <a:solidFill>
-                  <a:prstClr val="black"/>
-                </a:solidFill>
-              </a:rPr>
-              <a:t>commons.wikimedia.org/wiki/File:California_Drought_Dry_Riverbed_2009.jpg</a:t>
-            </a:r>
-            <a:endParaRPr lang="en-US" dirty="0">
-              <a:solidFill>
-                <a:prstClr val="black"/>
-              </a:solidFill>
-            </a:endParaRPr>
+            <a:r>
+              <a:rPr lang="en-US" dirty="0" smtClean="0"/>
+              <a:t>“Federal Funds for Research and Development, Detailed Historical Tables: Fiscal Years 1951-2002” (2015). </a:t>
+            </a:r>
+            <a:r>
+              <a:rPr lang="en-US" dirty="0" smtClean="0"/>
+              <a:t>Retrieved from </a:t>
+            </a:r>
+            <a:r>
+              <a:rPr lang="en-US" dirty="0"/>
+              <a:t>https://wayback.archive-it.org/5902/20150627201426/http://www.nsf.gov/statistics/nsf03325/</a:t>
+            </a:r>
+            <a:endParaRPr lang="en-US" dirty="0" smtClean="0"/>
+          </a:p>
+          <a:p>
+            <a:endParaRPr lang="en-US" dirty="0" smtClean="0"/>
+          </a:p>
+          <a:p>
+            <a:r>
+              <a:rPr lang="en-US" dirty="0" smtClean="0"/>
+              <a:t>“Federal </a:t>
+            </a:r>
+            <a:r>
+              <a:rPr lang="en-US" dirty="0"/>
+              <a:t>funds for industrial R&amp;D performance, by industry and by size of company: </a:t>
+            </a:r>
+            <a:r>
+              <a:rPr lang="en-US" dirty="0" smtClean="0"/>
+              <a:t>1953-98”. (</a:t>
+            </a:r>
+            <a:r>
+              <a:rPr lang="en-US" dirty="0" err="1" smtClean="0"/>
+              <a:t>n.d.</a:t>
+            </a:r>
+            <a:r>
+              <a:rPr lang="en-US" dirty="0" smtClean="0"/>
+              <a:t>). Industrial Research and Development Information System. </a:t>
+            </a:r>
+            <a:r>
+              <a:rPr lang="en-US" dirty="0"/>
+              <a:t>Retrieved from https://wayback.archive-it.org/5902/20181004145057/https://www.nsf.gov/statistics/iris/search_hist.cfm?indx=16</a:t>
+            </a:r>
+            <a:endParaRPr lang="en-US" dirty="0" smtClean="0"/>
+          </a:p>
+          <a:p>
+            <a:endParaRPr lang="en-US" dirty="0" smtClean="0"/>
+          </a:p>
+          <a:p>
+            <a:r>
+              <a:rPr lang="en-US" dirty="0" smtClean="0"/>
+              <a:t>“</a:t>
+            </a:r>
+            <a:r>
+              <a:rPr lang="en-US" dirty="0" smtClean="0"/>
+              <a:t>Federal obligations for research, development, and R&amp;D plant, by category of obligation, performer, and field of </a:t>
+            </a:r>
+            <a:r>
+              <a:rPr lang="en-US" dirty="0" err="1" smtClean="0"/>
+              <a:t>scence</a:t>
+            </a:r>
+            <a:r>
+              <a:rPr lang="en-US" dirty="0" smtClean="0"/>
+              <a:t> and engineering: Fiscal years 2009 through 2017”. (2018). </a:t>
+            </a:r>
+            <a:r>
+              <a:rPr lang="en-US" dirty="0"/>
+              <a:t>Available from https://</a:t>
+            </a:r>
+            <a:r>
+              <a:rPr lang="en-US" dirty="0" smtClean="0"/>
+              <a:t>nces.ed.gov/programs/digest/d17/tables/dt17_402.10.asp</a:t>
+            </a:r>
+          </a:p>
+          <a:p>
+            <a:endParaRPr lang="en-US" dirty="0"/>
+          </a:p>
+          <a:p>
+            <a:r>
+              <a:rPr lang="en-US" dirty="0" smtClean="0"/>
+              <a:t>The National Academies of Sciences, Engineering, and Medicine. (2000). Chapter F: National Science </a:t>
+            </a:r>
+            <a:r>
+              <a:rPr lang="en-US" dirty="0" err="1" smtClean="0"/>
+              <a:t>Foudnation</a:t>
+            </a:r>
+            <a:r>
+              <a:rPr lang="en-US" dirty="0" smtClean="0"/>
+              <a:t> Proposal Success Rates. </a:t>
+            </a:r>
+            <a:r>
+              <a:rPr lang="en-US" i="1" dirty="0" smtClean="0"/>
+              <a:t>Federal Funding of Astronomical Research</a:t>
+            </a:r>
+            <a:r>
+              <a:rPr lang="en-US" dirty="0" smtClean="0"/>
+              <a:t>. </a:t>
+            </a:r>
+            <a:r>
+              <a:rPr lang="en-US" dirty="0"/>
+              <a:t>Retrieved from https://</a:t>
+            </a:r>
+            <a:r>
+              <a:rPr lang="en-US" dirty="0" smtClean="0"/>
+              <a:t>www.nap.edu/read/9954/chapter/16</a:t>
+            </a:r>
+            <a:endParaRPr lang="en-US" dirty="0" smtClean="0"/>
           </a:p>
         </p:txBody>
       </p:sp>
@@ -6446,7 +6407,7 @@
     </p:spTree>
     <p:extLst>
       <p:ext uri="{BB962C8B-B14F-4D97-AF65-F5344CB8AC3E}">
-        <p14:creationId xmlns:p14="http://schemas.microsoft.com/office/powerpoint/2010/main" val="1749662596"/>
+        <p14:creationId xmlns:p14="http://schemas.microsoft.com/office/powerpoint/2010/main" val="242620626"/>
       </p:ext>
     </p:extLst>
   </p:cSld>
@@ -6489,7 +6450,7 @@
         <p:spPr>
           <a:xfrm>
             <a:off x="0" y="1028700"/>
-            <a:ext cx="9144000" cy="3693319"/>
+            <a:ext cx="9144000" cy="4247317"/>
           </a:xfrm>
           <a:prstGeom prst="rect">
             <a:avLst/>
@@ -6504,6 +6465,68 @@
           <a:p>
             <a:pPr lvl="0"/>
             <a:r>
+              <a:rPr lang="en-US" dirty="0">
+                <a:solidFill>
+                  <a:prstClr val="black"/>
+                </a:solidFill>
+              </a:rPr>
+              <a:t>SBIR/STTR Dashboard [data] (</a:t>
+            </a:r>
+            <a:r>
+              <a:rPr lang="en-US" dirty="0" err="1">
+                <a:solidFill>
+                  <a:prstClr val="black"/>
+                </a:solidFill>
+              </a:rPr>
+              <a:t>n.d.</a:t>
+            </a:r>
+            <a:r>
+              <a:rPr lang="en-US" dirty="0">
+                <a:solidFill>
+                  <a:prstClr val="black"/>
+                </a:solidFill>
+              </a:rPr>
+              <a:t>). Retrieved April 18, 2019, from https://www.sbir.gov/awards/annual-reports?view_by=Year</a:t>
+            </a:r>
+          </a:p>
+          <a:p>
+            <a:pPr lvl="0"/>
+            <a:endParaRPr lang="en-US" dirty="0" smtClean="0">
+              <a:solidFill>
+                <a:prstClr val="black"/>
+              </a:solidFill>
+            </a:endParaRPr>
+          </a:p>
+          <a:p>
+            <a:pPr lvl="0"/>
+            <a:r>
+              <a:rPr lang="en-US" dirty="0" smtClean="0">
+                <a:solidFill>
+                  <a:prstClr val="black"/>
+                </a:solidFill>
+              </a:rPr>
+              <a:t>Small </a:t>
+            </a:r>
+            <a:r>
+              <a:rPr lang="en-US" dirty="0">
+                <a:solidFill>
+                  <a:prstClr val="black"/>
+                </a:solidFill>
+              </a:rPr>
+              <a:t>Business Innovation Act: 11th Annual Report. (1993). Retrieved from https://www.sbir.gov/sites/default/files/SBIR_1993.pdf</a:t>
+            </a:r>
+          </a:p>
+          <a:p>
+            <a:pPr lvl="0"/>
+            <a:endParaRPr lang="en-US" dirty="0" smtClean="0">
+              <a:solidFill>
+                <a:prstClr val="black"/>
+              </a:solidFill>
+            </a:endParaRPr>
+          </a:p>
+          <a:p>
+            <a:pPr lvl="0"/>
+            <a:r>
               <a:rPr lang="en-US" dirty="0" smtClean="0">
                 <a:solidFill>
                   <a:prstClr val="black"/>
@@ -6517,7 +6540,26 @@
                   <a:prstClr val="black"/>
                 </a:solidFill>
               </a:rPr>
-              <a:t>: </a:t>
+              <a:t>: Robert. (2001). North face south tower after plane strike 9-11 [Image]. [CC BY-SA 2.0 https://creativecommons.org/licenses/by-sa/2.0] . No changes made. Retrieved April 19, 2019, from https://commons.wikimedia.org/wiki/Category:Terrorism#/media/File:North_face_south_tower_after_plane_strike_9-11.jpg</a:t>
+            </a:r>
+          </a:p>
+          <a:p>
+            <a:pPr lvl="0"/>
+            <a:endParaRPr lang="en-US" dirty="0">
+              <a:solidFill>
+                <a:prstClr val="black"/>
+              </a:solidFill>
+            </a:endParaRPr>
+          </a:p>
+          <a:p>
+            <a:pPr lvl="0"/>
+            <a:r>
+              <a:rPr lang="en-US" dirty="0">
+                <a:solidFill>
+                  <a:prstClr val="black"/>
+                </a:solidFill>
+              </a:rPr>
+              <a:t>User: </a:t>
             </a:r>
             <a:r>
               <a:rPr lang="en-US" dirty="0" err="1">
@@ -6525,7 +6567,7 @@
                   <a:prstClr val="black"/>
                 </a:solidFill>
               </a:rPr>
-              <a:t>Lokal_Profil</a:t>
+              <a:t>DavidBailey</a:t>
             </a:r>
             <a:r>
               <a:rPr lang="en-US" dirty="0">
@@ -6533,42 +6575,21 @@
                   <a:prstClr val="black"/>
                 </a:solidFill>
               </a:rPr>
-              <a:t>. (2007). Blank outline of the US [Image]. CC-BY-SA 2.5 [https://creativecommons.org/licenses/by-sa/2.5].  Photocopy effect added. Retrieved April 19, 2019, from https://commons.wikimedia.org/wiki/United_States#/media/File:Blank_US_Map,_Mainland_with_no_States.svg</a:t>
-            </a:r>
-          </a:p>
-          <a:p>
-            <a:endParaRPr lang="en-US" dirty="0" smtClean="0"/>
-          </a:p>
-          <a:p>
-            <a:r>
-              <a:rPr lang="en-US" dirty="0" smtClean="0"/>
-              <a:t>User</a:t>
-            </a:r>
-            <a:r>
-              <a:rPr lang="en-US" dirty="0" smtClean="0"/>
-              <a:t>: Kremlin.ru. (2006). Official portrait of </a:t>
-            </a:r>
-            <a:r>
-              <a:rPr lang="en-US" dirty="0" err="1" smtClean="0"/>
-              <a:t>Vladmir</a:t>
-            </a:r>
-            <a:r>
-              <a:rPr lang="en-US" dirty="0" smtClean="0"/>
-              <a:t> Putin [Image]. </a:t>
-            </a:r>
-            <a:r>
-              <a:rPr lang="en-US" dirty="0"/>
-              <a:t>CC-BY 4.0 [https://</a:t>
-            </a:r>
-            <a:r>
-              <a:rPr lang="en-US" dirty="0" smtClean="0"/>
-              <a:t>creativecommons.org/licenses/by/4.0]. No changes made. Retrieved April 19, 2019</a:t>
-            </a:r>
-            <a:r>
-              <a:rPr lang="en-US" dirty="0"/>
-              <a:t>, from https://commons.wikimedia.org/w/index.php?title=Special:Search&amp;limit=500&amp;offset=0&amp;profile=default&amp;search=putin&amp;advancedSearch-current=%7B%7D&amp;ns0=1&amp;ns6=1&amp;ns12=1&amp;ns14=1&amp;ns100=1&amp;ns106=1&amp;searchToken=bcmpm63q76wb4lqzinwofwy4t#%2Fmedia%2FFile%3AVladimir_Putin_-_2006.jpg</a:t>
-            </a:r>
-            <a:endParaRPr lang="en-US" dirty="0" smtClean="0"/>
+              <a:t>. (2009). A dry riverbed in California [Image]. No changes made. Retrieved April 19, 2019, from https://</a:t>
+            </a:r>
+            <a:r>
+              <a:rPr lang="en-US" dirty="0" smtClean="0">
+                <a:solidFill>
+                  <a:prstClr val="black"/>
+                </a:solidFill>
+              </a:rPr>
+              <a:t>commons.wikimedia.org/wiki/File:California_Drought_Dry_Riverbed_2009.jpg</a:t>
+            </a:r>
+            <a:endParaRPr lang="en-US" dirty="0">
+              <a:solidFill>
+                <a:prstClr val="black"/>
+              </a:solidFill>
+            </a:endParaRPr>
           </a:p>
         </p:txBody>
       </p:sp>
@@ -6606,7 +6627,7 @@
     </p:spTree>
     <p:extLst>
       <p:ext uri="{BB962C8B-B14F-4D97-AF65-F5344CB8AC3E}">
-        <p14:creationId xmlns:p14="http://schemas.microsoft.com/office/powerpoint/2010/main" val="4057056083"/>
+        <p14:creationId xmlns:p14="http://schemas.microsoft.com/office/powerpoint/2010/main" val="1749662596"/>
       </p:ext>
     </p:extLst>
   </p:cSld>
@@ -6642,6 +6663,162 @@
       </p:grpSpPr>
       <p:sp>
         <p:nvSpPr>
+          <p:cNvPr id="2" name="TextBox 1"/>
+          <p:cNvSpPr txBox="1"/>
+          <p:nvPr/>
+        </p:nvSpPr>
+        <p:spPr>
+          <a:xfrm>
+            <a:off x="0" y="1028700"/>
+            <a:ext cx="9144000" cy="3693319"/>
+          </a:xfrm>
+          <a:prstGeom prst="rect">
+            <a:avLst/>
+          </a:prstGeom>
+          <a:noFill/>
+        </p:spPr>
+        <p:txBody>
+          <a:bodyPr wrap="square" lIns="182880" rIns="182880" rtlCol="0">
+            <a:spAutoFit/>
+          </a:bodyPr>
+          <a:lstStyle/>
+          <a:p>
+            <a:pPr lvl="0"/>
+            <a:r>
+              <a:rPr lang="en-US" dirty="0" smtClean="0">
+                <a:solidFill>
+                  <a:prstClr val="black"/>
+                </a:solidFill>
+              </a:rPr>
+              <a:t>User</a:t>
+            </a:r>
+            <a:r>
+              <a:rPr lang="en-US" dirty="0">
+                <a:solidFill>
+                  <a:prstClr val="black"/>
+                </a:solidFill>
+              </a:rPr>
+              <a:t>: </a:t>
+            </a:r>
+            <a:r>
+              <a:rPr lang="en-US" dirty="0" err="1">
+                <a:solidFill>
+                  <a:prstClr val="black"/>
+                </a:solidFill>
+              </a:rPr>
+              <a:t>Lokal_Profil</a:t>
+            </a:r>
+            <a:r>
+              <a:rPr lang="en-US" dirty="0">
+                <a:solidFill>
+                  <a:prstClr val="black"/>
+                </a:solidFill>
+              </a:rPr>
+              <a:t>. (2007). Blank outline of the US [Image]. CC-BY-SA 2.5 [https://creativecommons.org/licenses/by-sa/2.5].  Photocopy effect added. Retrieved April 19, 2019, from https://commons.wikimedia.org/wiki/United_States#/media/File:Blank_US_Map,_Mainland_with_no_States.svg</a:t>
+            </a:r>
+          </a:p>
+          <a:p>
+            <a:endParaRPr lang="en-US" dirty="0" smtClean="0"/>
+          </a:p>
+          <a:p>
+            <a:r>
+              <a:rPr lang="en-US" dirty="0" smtClean="0"/>
+              <a:t>User: Kremlin.ru. (2006). Official portrait of </a:t>
+            </a:r>
+            <a:r>
+              <a:rPr lang="en-US" dirty="0" err="1" smtClean="0"/>
+              <a:t>Vladmir</a:t>
+            </a:r>
+            <a:r>
+              <a:rPr lang="en-US" dirty="0" smtClean="0"/>
+              <a:t> Putin [Image]. </a:t>
+            </a:r>
+            <a:r>
+              <a:rPr lang="en-US" dirty="0"/>
+              <a:t>CC-BY 4.0 [https://</a:t>
+            </a:r>
+            <a:r>
+              <a:rPr lang="en-US" dirty="0" smtClean="0"/>
+              <a:t>creativecommons.org/licenses/by/4.0]. No changes made. Retrieved April 19, 2019</a:t>
+            </a:r>
+            <a:r>
+              <a:rPr lang="en-US" dirty="0"/>
+              <a:t>, from https://commons.wikimedia.org/w/index.php?title=Special:Search&amp;limit=500&amp;offset=0&amp;profile=default&amp;search=putin&amp;advancedSearch-current=%7B%7D&amp;ns0=1&amp;ns6=1&amp;ns12=1&amp;ns14=1&amp;ns100=1&amp;ns106=1&amp;searchToken=bcmpm63q76wb4lqzinwofwy4t#%2Fmedia%2FFile%3AVladimir_Putin_-_2006.jpg</a:t>
+            </a:r>
+            <a:endParaRPr lang="en-US" dirty="0" smtClean="0"/>
+          </a:p>
+        </p:txBody>
+      </p:sp>
+      <p:sp>
+        <p:nvSpPr>
+          <p:cNvPr id="3" name="TextBox 2"/>
+          <p:cNvSpPr txBox="1"/>
+          <p:nvPr/>
+        </p:nvSpPr>
+        <p:spPr>
+          <a:xfrm>
+            <a:off x="0" y="266700"/>
+            <a:ext cx="9144000" cy="461665"/>
+          </a:xfrm>
+          <a:prstGeom prst="rect">
+            <a:avLst/>
+          </a:prstGeom>
+          <a:noFill/>
+        </p:spPr>
+        <p:txBody>
+          <a:bodyPr wrap="square" rtlCol="0">
+            <a:spAutoFit/>
+          </a:bodyPr>
+          <a:lstStyle/>
+          <a:p>
+            <a:pPr algn="ctr"/>
+            <a:r>
+              <a:rPr lang="en-US" sz="2400" dirty="0" smtClean="0"/>
+              <a:t>References</a:t>
+            </a:r>
+            <a:endParaRPr lang="en-US" sz="2400" dirty="0"/>
+          </a:p>
+        </p:txBody>
+      </p:sp>
+    </p:spTree>
+    <p:extLst>
+      <p:ext uri="{BB962C8B-B14F-4D97-AF65-F5344CB8AC3E}">
+        <p14:creationId xmlns:p14="http://schemas.microsoft.com/office/powerpoint/2010/main" val="4057056083"/>
+      </p:ext>
+    </p:extLst>
+  </p:cSld>
+  <p:clrMapOvr>
+    <a:masterClrMapping/>
+  </p:clrMapOvr>
+  <p:timing>
+    <p:tnLst>
+      <p:par>
+        <p:cTn id="1" dur="indefinite" restart="never" nodeType="tmRoot"/>
+      </p:par>
+    </p:tnLst>
+  </p:timing>
+</p:sld>
+</file>
+
+<file path=ppt/slides/slide17.xml><?xml version="1.0" encoding="utf-8"?>
+<p:sld xmlns:a="http://schemas.openxmlformats.org/drawingml/2006/main" xmlns:r="http://schemas.openxmlformats.org/officeDocument/2006/relationships" xmlns:p="http://schemas.openxmlformats.org/presentationml/2006/main">
+  <p:cSld>
+    <p:spTree>
+      <p:nvGrpSpPr>
+        <p:cNvPr id="1" name=""/>
+        <p:cNvGrpSpPr/>
+        <p:nvPr/>
+      </p:nvGrpSpPr>
+      <p:grpSpPr>
+        <a:xfrm>
+          <a:off x="0" y="0"/>
+          <a:ext cx="0" cy="0"/>
+          <a:chOff x="0" y="0"/>
+          <a:chExt cx="0" cy="0"/>
+        </a:xfrm>
+      </p:grpSpPr>
+      <p:sp>
+        <p:nvSpPr>
           <p:cNvPr id="2" name="Title 1"/>
           <p:cNvSpPr>
             <a:spLocks noGrp="1"/>
@@ -6706,7 +6883,7 @@
 </p:sld>
 </file>
 
-<file path=ppt/slides/slide17.xml><?xml version="1.0" encoding="utf-8"?>
+<file path=ppt/slides/slide18.xml><?xml version="1.0" encoding="utf-8"?>
 <p:sld xmlns:a="http://schemas.openxmlformats.org/drawingml/2006/main" xmlns:r="http://schemas.openxmlformats.org/officeDocument/2006/relationships" xmlns:p="http://schemas.openxmlformats.org/presentationml/2006/main">
   <p:cSld>
     <p:spTree>
@@ -7851,7 +8028,7 @@
 </p:sld>
 </file>
 
-<file path=ppt/slides/slide18.xml><?xml version="1.0" encoding="utf-8"?>
+<file path=ppt/slides/slide19.xml><?xml version="1.0" encoding="utf-8"?>
 <p:sld xmlns:a="http://schemas.openxmlformats.org/drawingml/2006/main" xmlns:r="http://schemas.openxmlformats.org/officeDocument/2006/relationships" xmlns:p="http://schemas.openxmlformats.org/presentationml/2006/main">
   <p:cSld>
     <p:spTree>
@@ -8356,7 +8533,6 @@
               <a:rPr lang="en-US" sz="1600" dirty="0" smtClean="0"/>
               <a:t>Project duration up to 6 months</a:t>
             </a:r>
-            <a:endParaRPr lang="en-US" sz="1600" dirty="0" smtClean="0"/>
           </a:p>
           <a:p>
             <a:pPr marL="742950" lvl="1" indent="-285750">
@@ -8376,17 +8552,8 @@
             </a:r>
             <a:r>
               <a:rPr lang="en-US" sz="1600" dirty="0" smtClean="0"/>
-              <a:t>udget up </a:t>
-            </a:r>
-            <a:r>
-              <a:rPr lang="en-US" sz="1600" dirty="0" smtClean="0"/>
-              <a:t>to $</a:t>
-            </a:r>
-            <a:r>
-              <a:rPr lang="en-US" sz="1600" dirty="0" smtClean="0"/>
-              <a:t>150,000</a:t>
-            </a:r>
-            <a:endParaRPr lang="en-US" sz="1600" dirty="0" smtClean="0"/>
+              <a:t>udget up to $150,000</a:t>
+            </a:r>
           </a:p>
           <a:p>
             <a:pPr marL="285750" indent="-285750">
@@ -8411,17 +8578,8 @@
             </a:pPr>
             <a:r>
               <a:rPr lang="en-US" sz="1600" dirty="0" smtClean="0"/>
-              <a:t>Project duration u</a:t>
-            </a:r>
-            <a:r>
-              <a:rPr lang="en-US" sz="1600" dirty="0" smtClean="0"/>
-              <a:t>p to 24 </a:t>
-            </a:r>
-            <a:r>
-              <a:rPr lang="en-US" sz="1600" dirty="0" smtClean="0"/>
-              <a:t>months </a:t>
-            </a:r>
-            <a:endParaRPr lang="en-US" sz="1600" dirty="0" smtClean="0"/>
+              <a:t>Project duration up to 24 months </a:t>
+            </a:r>
           </a:p>
           <a:p>
             <a:pPr marL="742950" lvl="1" indent="-285750">
@@ -8433,21 +8591,8 @@
             </a:pPr>
             <a:r>
               <a:rPr lang="en-US" sz="1600" dirty="0" smtClean="0"/>
-              <a:t>Project budget u</a:t>
-            </a:r>
-            <a:r>
-              <a:rPr lang="en-US" sz="1600" dirty="0" smtClean="0"/>
-              <a:t>p </a:t>
-            </a:r>
-            <a:r>
-              <a:rPr lang="en-US" sz="1600" dirty="0" smtClean="0"/>
-              <a:t>to $1 </a:t>
-            </a:r>
-            <a:r>
-              <a:rPr lang="en-US" sz="1600" dirty="0" smtClean="0"/>
-              <a:t>million</a:t>
-            </a:r>
-            <a:endParaRPr lang="en-US" sz="1600" dirty="0" smtClean="0"/>
+              <a:t>Project budget up to $1 million</a:t>
+            </a:r>
           </a:p>
           <a:p>
             <a:pPr marL="285750" indent="-285750">
@@ -8553,7 +8698,6 @@
               <a:rPr lang="en-US" sz="2400" b="1" dirty="0" smtClean="0"/>
               <a:t>Problem</a:t>
             </a:r>
-            <a:endParaRPr lang="en-US" sz="2400" b="1" dirty="0" smtClean="0"/>
           </a:p>
         </p:txBody>
       </p:sp>
@@ -8586,11 +8730,7 @@
             </a:pPr>
             <a:r>
               <a:rPr lang="en-US" sz="2000" dirty="0" smtClean="0"/>
-              <a:t>The </a:t>
-            </a:r>
-            <a:r>
-              <a:rPr lang="en-US" sz="2000" dirty="0" smtClean="0"/>
-              <a:t>minimum set-aside acts like an anchor holding down small business participation in federally-funded research and development.</a:t>
+              <a:t>The minimum set-aside acts like an anchor holding down small business participation in federally-funded research and development.</a:t>
             </a:r>
           </a:p>
           <a:p>
@@ -8667,6 +8807,295 @@
 </file>
 
 <file path=ppt/slides/slide4.xml><?xml version="1.0" encoding="utf-8"?>
+<p:sld xmlns:a="http://schemas.openxmlformats.org/drawingml/2006/main" xmlns:r="http://schemas.openxmlformats.org/officeDocument/2006/relationships" xmlns:p="http://schemas.openxmlformats.org/presentationml/2006/main">
+  <p:cSld>
+    <p:spTree>
+      <p:nvGrpSpPr>
+        <p:cNvPr id="1" name=""/>
+        <p:cNvGrpSpPr/>
+        <p:nvPr/>
+      </p:nvGrpSpPr>
+      <p:grpSpPr>
+        <a:xfrm>
+          <a:off x="0" y="0"/>
+          <a:ext cx="0" cy="0"/>
+          <a:chOff x="0" y="0"/>
+          <a:chExt cx="0" cy="0"/>
+        </a:xfrm>
+      </p:grpSpPr>
+      <p:pic>
+        <p:nvPicPr>
+          <p:cNvPr id="1026" name="Picture 2" descr="US Department of Justice Scales Of Justice.svg"/>
+          <p:cNvPicPr>
+            <a:picLocks noChangeAspect="1" noChangeArrowheads="1"/>
+          </p:cNvPicPr>
+          <p:nvPr/>
+        </p:nvPicPr>
+        <p:blipFill>
+          <a:blip r:embed="rId2">
+            <a:extLst>
+              <a:ext uri="{28A0092B-C50C-407E-A947-70E740481C1C}">
+                <a14:useLocalDpi xmlns:a14="http://schemas.microsoft.com/office/drawing/2010/main" val="0"/>
+              </a:ext>
+            </a:extLst>
+          </a:blip>
+          <a:srcRect/>
+          <a:stretch>
+            <a:fillRect/>
+          </a:stretch>
+        </p:blipFill>
+        <p:spPr bwMode="auto">
+          <a:xfrm>
+            <a:off x="2256438" y="108744"/>
+            <a:ext cx="4631124" cy="5394960"/>
+          </a:xfrm>
+          <a:prstGeom prst="rect">
+            <a:avLst/>
+          </a:prstGeom>
+          <a:noFill/>
+          <a:extLst>
+            <a:ext uri="{909E8E84-426E-40DD-AFC4-6F175D3DCCD1}">
+              <a14:hiddenFill xmlns:a14="http://schemas.microsoft.com/office/drawing/2010/main">
+                <a:solidFill>
+                  <a:srgbClr val="FFFFFF"/>
+                </a:solidFill>
+              </a14:hiddenFill>
+            </a:ext>
+          </a:extLst>
+        </p:spPr>
+      </p:pic>
+      <p:sp>
+        <p:nvSpPr>
+          <p:cNvPr id="2" name="Oval 1"/>
+          <p:cNvSpPr>
+            <a:spLocks noChangeAspect="1"/>
+          </p:cNvSpPr>
+          <p:nvPr/>
+        </p:nvSpPr>
+        <p:spPr>
+          <a:xfrm>
+            <a:off x="3566160" y="55881"/>
+            <a:ext cx="2011680" cy="2011680"/>
+          </a:xfrm>
+          <a:prstGeom prst="ellipse">
+            <a:avLst/>
+          </a:prstGeom>
+        </p:spPr>
+        <p:style>
+          <a:lnRef idx="0">
+            <a:schemeClr val="accent1"/>
+          </a:lnRef>
+          <a:fillRef idx="3">
+            <a:schemeClr val="accent1"/>
+          </a:fillRef>
+          <a:effectRef idx="3">
+            <a:schemeClr val="accent1"/>
+          </a:effectRef>
+          <a:fontRef idx="minor">
+            <a:schemeClr val="lt1"/>
+          </a:fontRef>
+        </p:style>
+        <p:txBody>
+          <a:bodyPr lIns="0" rIns="0" rtlCol="0" anchor="ctr"/>
+          <a:lstStyle/>
+          <a:p>
+            <a:pPr algn="ctr"/>
+            <a:r>
+              <a:rPr lang="en-US" sz="1400" b="1" dirty="0" smtClean="0"/>
+              <a:t>Measurement pointer is obscured</a:t>
+            </a:r>
+            <a:endParaRPr lang="en-US" sz="1400" b="1" dirty="0"/>
+          </a:p>
+        </p:txBody>
+      </p:sp>
+      <p:pic>
+        <p:nvPicPr>
+          <p:cNvPr id="1028" name="Picture 4" descr="https://upload.wikimedia.org/wikipedia/commons/thumb/0/08/Gold_coins_in_a_stack_jo_01.svg/1024px-Gold_coins_in_a_stack_jo_01.svg.png"/>
+          <p:cNvPicPr>
+            <a:picLocks noChangeAspect="1" noChangeArrowheads="1"/>
+          </p:cNvPicPr>
+          <p:nvPr/>
+        </p:nvPicPr>
+        <p:blipFill>
+          <a:blip r:embed="rId3" cstate="print">
+            <a:extLst>
+              <a:ext uri="{28A0092B-C50C-407E-A947-70E740481C1C}">
+                <a14:useLocalDpi xmlns:a14="http://schemas.microsoft.com/office/drawing/2010/main" val="0"/>
+              </a:ext>
+            </a:extLst>
+          </a:blip>
+          <a:srcRect/>
+          <a:stretch>
+            <a:fillRect/>
+          </a:stretch>
+        </p:blipFill>
+        <p:spPr bwMode="auto">
+          <a:xfrm>
+            <a:off x="5784895" y="3802064"/>
+            <a:ext cx="664644" cy="731520"/>
+          </a:xfrm>
+          <a:prstGeom prst="rect">
+            <a:avLst/>
+          </a:prstGeom>
+          <a:noFill/>
+          <a:extLst>
+            <a:ext uri="{909E8E84-426E-40DD-AFC4-6F175D3DCCD1}">
+              <a14:hiddenFill xmlns:a14="http://schemas.microsoft.com/office/drawing/2010/main">
+                <a:solidFill>
+                  <a:srgbClr val="FFFFFF"/>
+                </a:solidFill>
+              </a14:hiddenFill>
+            </a:ext>
+          </a:extLst>
+        </p:spPr>
+      </p:pic>
+      <p:sp>
+        <p:nvSpPr>
+          <p:cNvPr id="3" name="Line Callout 2 2"/>
+          <p:cNvSpPr/>
+          <p:nvPr/>
+        </p:nvSpPr>
+        <p:spPr>
+          <a:xfrm>
+            <a:off x="7183041" y="2791936"/>
+            <a:ext cx="1828800" cy="914400"/>
+          </a:xfrm>
+          <a:prstGeom prst="borderCallout2">
+            <a:avLst>
+              <a:gd name="adj1" fmla="val 18750"/>
+              <a:gd name="adj2" fmla="val -3505"/>
+              <a:gd name="adj3" fmla="val 18750"/>
+              <a:gd name="adj4" fmla="val -16667"/>
+              <a:gd name="adj5" fmla="val 112500"/>
+              <a:gd name="adj6" fmla="val -46667"/>
+            </a:avLst>
+          </a:prstGeom>
+        </p:spPr>
+        <p:style>
+          <a:lnRef idx="1">
+            <a:schemeClr val="dk1"/>
+          </a:lnRef>
+          <a:fillRef idx="2">
+            <a:schemeClr val="dk1"/>
+          </a:fillRef>
+          <a:effectRef idx="1">
+            <a:schemeClr val="dk1"/>
+          </a:effectRef>
+          <a:fontRef idx="minor">
+            <a:schemeClr val="dk1"/>
+          </a:fontRef>
+        </p:style>
+        <p:txBody>
+          <a:bodyPr rtlCol="0" anchor="ctr"/>
+          <a:lstStyle/>
+          <a:p>
+            <a:pPr algn="ctr"/>
+            <a:r>
+              <a:rPr lang="en-US" dirty="0" smtClean="0"/>
+              <a:t>This side can’t be less than 2.6% of your budget</a:t>
+            </a:r>
+            <a:endParaRPr lang="en-US" dirty="0"/>
+          </a:p>
+        </p:txBody>
+      </p:sp>
+      <p:pic>
+        <p:nvPicPr>
+          <p:cNvPr id="6" name="Picture 4" descr="https://upload.wikimedia.org/wikipedia/commons/thumb/0/08/Gold_coins_in_a_stack_jo_01.svg/1024px-Gold_coins_in_a_stack_jo_01.svg.png"/>
+          <p:cNvPicPr>
+            <a:picLocks noChangeAspect="1" noChangeArrowheads="1"/>
+          </p:cNvPicPr>
+          <p:nvPr/>
+        </p:nvPicPr>
+        <p:blipFill>
+          <a:blip r:embed="rId3" cstate="print">
+            <a:grayscl/>
+            <a:extLst>
+              <a:ext uri="{28A0092B-C50C-407E-A947-70E740481C1C}">
+                <a14:useLocalDpi xmlns:a14="http://schemas.microsoft.com/office/drawing/2010/main" val="0"/>
+              </a:ext>
+            </a:extLst>
+          </a:blip>
+          <a:srcRect/>
+          <a:stretch>
+            <a:fillRect/>
+          </a:stretch>
+        </p:blipFill>
+        <p:spPr bwMode="auto">
+          <a:xfrm>
+            <a:off x="2529728" y="3802064"/>
+            <a:ext cx="664644" cy="731520"/>
+          </a:xfrm>
+          <a:prstGeom prst="rect">
+            <a:avLst/>
+          </a:prstGeom>
+          <a:noFill/>
+          <a:extLst>
+            <a:ext uri="{909E8E84-426E-40DD-AFC4-6F175D3DCCD1}">
+              <a14:hiddenFill xmlns:a14="http://schemas.microsoft.com/office/drawing/2010/main">
+                <a:solidFill>
+                  <a:srgbClr val="FFFFFF"/>
+                </a:solidFill>
+              </a14:hiddenFill>
+            </a:ext>
+          </a:extLst>
+        </p:spPr>
+      </p:pic>
+      <p:pic>
+        <p:nvPicPr>
+          <p:cNvPr id="7" name="Picture 4" descr="https://upload.wikimedia.org/wikipedia/commons/thumb/0/08/Gold_coins_in_a_stack_jo_01.svg/1024px-Gold_coins_in_a_stack_jo_01.svg.png"/>
+          <p:cNvPicPr>
+            <a:picLocks noChangeAspect="1" noChangeArrowheads="1"/>
+          </p:cNvPicPr>
+          <p:nvPr/>
+        </p:nvPicPr>
+        <p:blipFill>
+          <a:blip r:embed="rId3" cstate="print">
+            <a:grayscl/>
+            <a:extLst>
+              <a:ext uri="{28A0092B-C50C-407E-A947-70E740481C1C}">
+                <a14:useLocalDpi xmlns:a14="http://schemas.microsoft.com/office/drawing/2010/main" val="0"/>
+              </a:ext>
+            </a:extLst>
+          </a:blip>
+          <a:srcRect/>
+          <a:stretch>
+            <a:fillRect/>
+          </a:stretch>
+        </p:blipFill>
+        <p:spPr bwMode="auto">
+          <a:xfrm>
+            <a:off x="2682128" y="3954464"/>
+            <a:ext cx="664644" cy="731520"/>
+          </a:xfrm>
+          <a:prstGeom prst="rect">
+            <a:avLst/>
+          </a:prstGeom>
+          <a:noFill/>
+          <a:extLst>
+            <a:ext uri="{909E8E84-426E-40DD-AFC4-6F175D3DCCD1}">
+              <a14:hiddenFill xmlns:a14="http://schemas.microsoft.com/office/drawing/2010/main">
+                <a:solidFill>
+                  <a:srgbClr val="FFFFFF"/>
+                </a:solidFill>
+              </a14:hiddenFill>
+            </a:ext>
+          </a:extLst>
+        </p:spPr>
+      </p:pic>
+    </p:spTree>
+    <p:extLst>
+      <p:ext uri="{BB962C8B-B14F-4D97-AF65-F5344CB8AC3E}">
+        <p14:creationId xmlns:p14="http://schemas.microsoft.com/office/powerpoint/2010/main" val="1343003376"/>
+      </p:ext>
+    </p:extLst>
+  </p:cSld>
+  <p:clrMapOvr>
+    <a:masterClrMapping/>
+  </p:clrMapOvr>
+</p:sld>
+</file>
+
+<file path=ppt/slides/slide5.xml><?xml version="1.0" encoding="utf-8"?>
 <p:sld xmlns:a="http://schemas.openxmlformats.org/drawingml/2006/main" xmlns:r="http://schemas.openxmlformats.org/officeDocument/2006/relationships" xmlns:p="http://schemas.openxmlformats.org/presentationml/2006/main">
   <p:cSld>
     <p:spTree>
@@ -8707,71 +9136,94 @@
           </a:graphicData>
         </a:graphic>
       </p:graphicFrame>
+      <p:cxnSp>
+        <p:nvCxnSpPr>
+          <p:cNvPr id="3" name="Straight Connector 2"/>
+          <p:cNvCxnSpPr/>
+          <p:nvPr/>
+        </p:nvCxnSpPr>
+        <p:spPr>
+          <a:xfrm flipV="1">
+            <a:off x="1064436" y="2221706"/>
+            <a:ext cx="7315200" cy="7144"/>
+          </a:xfrm>
+          <a:prstGeom prst="line">
+            <a:avLst/>
+          </a:prstGeom>
+          <a:ln w="63500">
+            <a:solidFill>
+              <a:srgbClr val="FFC000"/>
+            </a:solidFill>
+          </a:ln>
+        </p:spPr>
+        <p:style>
+          <a:lnRef idx="1">
+            <a:schemeClr val="accent1"/>
+          </a:lnRef>
+          <a:fillRef idx="0">
+            <a:schemeClr val="accent1"/>
+          </a:fillRef>
+          <a:effectRef idx="0">
+            <a:schemeClr val="accent1"/>
+          </a:effectRef>
+          <a:fontRef idx="minor">
+            <a:schemeClr val="tx1"/>
+          </a:fontRef>
+        </p:style>
+      </p:cxnSp>
+      <p:sp>
+        <p:nvSpPr>
+          <p:cNvPr id="6" name="Line Callout 2 5"/>
+          <p:cNvSpPr/>
+          <p:nvPr/>
+        </p:nvSpPr>
+        <p:spPr>
+          <a:xfrm flipH="1">
+            <a:off x="1114423" y="935830"/>
+            <a:ext cx="2021682" cy="814389"/>
+          </a:xfrm>
+          <a:prstGeom prst="borderCallout2">
+            <a:avLst>
+              <a:gd name="adj1" fmla="val 18750"/>
+              <a:gd name="adj2" fmla="val -3505"/>
+              <a:gd name="adj3" fmla="val 18750"/>
+              <a:gd name="adj4" fmla="val -16667"/>
+              <a:gd name="adj5" fmla="val 158371"/>
+              <a:gd name="adj6" fmla="val -61062"/>
+            </a:avLst>
+          </a:prstGeom>
+        </p:spPr>
+        <p:style>
+          <a:lnRef idx="1">
+            <a:schemeClr val="dk1"/>
+          </a:lnRef>
+          <a:fillRef idx="2">
+            <a:schemeClr val="dk1"/>
+          </a:fillRef>
+          <a:effectRef idx="1">
+            <a:schemeClr val="dk1"/>
+          </a:effectRef>
+          <a:fontRef idx="minor">
+            <a:schemeClr val="dk1"/>
+          </a:fontRef>
+        </p:style>
+        <p:txBody>
+          <a:bodyPr lIns="0" rIns="0" rtlCol="0" anchor="ctr"/>
+          <a:lstStyle/>
+          <a:p>
+            <a:pPr algn="ctr"/>
+            <a:r>
+              <a:rPr lang="en-US" sz="1400" dirty="0" smtClean="0"/>
+              <a:t>Estimated small business participation prior to 1982</a:t>
+            </a:r>
+            <a:endParaRPr lang="en-US" sz="1400" dirty="0"/>
+          </a:p>
+        </p:txBody>
+      </p:sp>
     </p:spTree>
     <p:extLst>
       <p:ext uri="{BB962C8B-B14F-4D97-AF65-F5344CB8AC3E}">
         <p14:creationId xmlns:p14="http://schemas.microsoft.com/office/powerpoint/2010/main" val="342248478"/>
-      </p:ext>
-    </p:extLst>
-  </p:cSld>
-  <p:clrMapOvr>
-    <a:masterClrMapping/>
-  </p:clrMapOvr>
-  <p:timing>
-    <p:tnLst>
-      <p:par>
-        <p:cTn id="1" dur="indefinite" restart="never" nodeType="tmRoot"/>
-      </p:par>
-    </p:tnLst>
-  </p:timing>
-</p:sld>
-</file>
-
-<file path=ppt/slides/slide5.xml><?xml version="1.0" encoding="utf-8"?>
-<p:sld xmlns:a="http://schemas.openxmlformats.org/drawingml/2006/main" xmlns:r="http://schemas.openxmlformats.org/officeDocument/2006/relationships" xmlns:p="http://schemas.openxmlformats.org/presentationml/2006/main">
-  <p:cSld>
-    <p:spTree>
-      <p:nvGrpSpPr>
-        <p:cNvPr id="1" name=""/>
-        <p:cNvGrpSpPr/>
-        <p:nvPr/>
-      </p:nvGrpSpPr>
-      <p:grpSpPr>
-        <a:xfrm>
-          <a:off x="0" y="0"/>
-          <a:ext cx="0" cy="0"/>
-          <a:chOff x="0" y="0"/>
-          <a:chExt cx="0" cy="0"/>
-        </a:xfrm>
-      </p:grpSpPr>
-      <p:graphicFrame>
-        <p:nvGraphicFramePr>
-          <p:cNvPr id="3" name="Chart 2"/>
-          <p:cNvGraphicFramePr>
-            <a:graphicFrameLocks noChangeAspect="1"/>
-          </p:cNvGraphicFramePr>
-          <p:nvPr>
-            <p:extLst>
-              <p:ext uri="{D42A27DB-BD31-4B8C-83A1-F6EECF244321}">
-                <p14:modId xmlns:p14="http://schemas.microsoft.com/office/powerpoint/2010/main" val="2786657692"/>
-              </p:ext>
-            </p:extLst>
-          </p:nvPr>
-        </p:nvGraphicFramePr>
-        <p:xfrm>
-          <a:off x="532637" y="365760"/>
-          <a:ext cx="8078726" cy="4846320"/>
-        </p:xfrm>
-        <a:graphic>
-          <a:graphicData uri="http://schemas.openxmlformats.org/drawingml/2006/chart">
-            <c:chart xmlns:c="http://schemas.openxmlformats.org/drawingml/2006/chart" xmlns:r="http://schemas.openxmlformats.org/officeDocument/2006/relationships" r:id="rId2"/>
-          </a:graphicData>
-        </a:graphic>
-      </p:graphicFrame>
-    </p:spTree>
-    <p:extLst>
-      <p:ext uri="{BB962C8B-B14F-4D97-AF65-F5344CB8AC3E}">
-        <p14:creationId xmlns:p14="http://schemas.microsoft.com/office/powerpoint/2010/main" val="243680360"/>
       </p:ext>
     </p:extLst>
   </p:cSld>
@@ -8814,7 +9266,68 @@
           <p:nvPr>
             <p:extLst>
               <p:ext uri="{D42A27DB-BD31-4B8C-83A1-F6EECF244321}">
-                <p14:modId xmlns:p14="http://schemas.microsoft.com/office/powerpoint/2010/main" val="2859589968"/>
+                <p14:modId xmlns:p14="http://schemas.microsoft.com/office/powerpoint/2010/main" val="1020455205"/>
+              </p:ext>
+            </p:extLst>
+          </p:nvPr>
+        </p:nvGraphicFramePr>
+        <p:xfrm>
+          <a:off x="532637" y="365760"/>
+          <a:ext cx="8078726" cy="4846320"/>
+        </p:xfrm>
+        <a:graphic>
+          <a:graphicData uri="http://schemas.openxmlformats.org/drawingml/2006/chart">
+            <c:chart xmlns:c="http://schemas.openxmlformats.org/drawingml/2006/chart" xmlns:r="http://schemas.openxmlformats.org/officeDocument/2006/relationships" r:id="rId2"/>
+          </a:graphicData>
+        </a:graphic>
+      </p:graphicFrame>
+    </p:spTree>
+    <p:extLst>
+      <p:ext uri="{BB962C8B-B14F-4D97-AF65-F5344CB8AC3E}">
+        <p14:creationId xmlns:p14="http://schemas.microsoft.com/office/powerpoint/2010/main" val="243680360"/>
+      </p:ext>
+    </p:extLst>
+  </p:cSld>
+  <p:clrMapOvr>
+    <a:masterClrMapping/>
+  </p:clrMapOvr>
+  <p:timing>
+    <p:tnLst>
+      <p:par>
+        <p:cTn id="1" dur="indefinite" restart="never" nodeType="tmRoot"/>
+      </p:par>
+    </p:tnLst>
+  </p:timing>
+</p:sld>
+</file>
+
+<file path=ppt/slides/slide7.xml><?xml version="1.0" encoding="utf-8"?>
+<p:sld xmlns:a="http://schemas.openxmlformats.org/drawingml/2006/main" xmlns:r="http://schemas.openxmlformats.org/officeDocument/2006/relationships" xmlns:p="http://schemas.openxmlformats.org/presentationml/2006/main">
+  <p:cSld>
+    <p:spTree>
+      <p:nvGrpSpPr>
+        <p:cNvPr id="1" name=""/>
+        <p:cNvGrpSpPr/>
+        <p:nvPr/>
+      </p:nvGrpSpPr>
+      <p:grpSpPr>
+        <a:xfrm>
+          <a:off x="0" y="0"/>
+          <a:ext cx="0" cy="0"/>
+          <a:chOff x="0" y="0"/>
+          <a:chExt cx="0" cy="0"/>
+        </a:xfrm>
+      </p:grpSpPr>
+      <p:graphicFrame>
+        <p:nvGraphicFramePr>
+          <p:cNvPr id="3" name="Chart 2"/>
+          <p:cNvGraphicFramePr>
+            <a:graphicFrameLocks noChangeAspect="1"/>
+          </p:cNvGraphicFramePr>
+          <p:nvPr>
+            <p:extLst>
+              <p:ext uri="{D42A27DB-BD31-4B8C-83A1-F6EECF244321}">
+                <p14:modId xmlns:p14="http://schemas.microsoft.com/office/powerpoint/2010/main" val="194302289"/>
               </p:ext>
             </p:extLst>
           </p:nvPr>
@@ -8849,7 +9362,7 @@
 </p:sld>
 </file>
 
-<file path=ppt/slides/slide7.xml><?xml version="1.0" encoding="utf-8"?>
+<file path=ppt/slides/slide8.xml><?xml version="1.0" encoding="utf-8"?>
 <p:sld xmlns:a="http://schemas.openxmlformats.org/drawingml/2006/main" xmlns:r="http://schemas.openxmlformats.org/officeDocument/2006/relationships" xmlns:p="http://schemas.openxmlformats.org/presentationml/2006/main">
   <p:cSld>
     <p:spTree>
@@ -8868,7 +9381,7 @@
       </p:grpSpPr>
       <p:pic>
         <p:nvPicPr>
-          <p:cNvPr id="1026" name="Picture 2" descr="C:\Users\townesm\AppData\Local\Temp\Kitty_hawk_gross.jpg"/>
+          <p:cNvPr id="1031" name="Picture 7" descr="https://upload.wikimedia.org/wikipedia/commons/1/15/1896_telephone.jpg"/>
           <p:cNvPicPr>
             <a:picLocks noChangeAspect="1" noChangeArrowheads="1"/>
           </p:cNvPicPr>
@@ -8889,54 +9402,8 @@
         </p:blipFill>
         <p:spPr bwMode="auto">
           <a:xfrm>
-            <a:off x="6754454" y="190500"/>
-            <a:ext cx="2237146" cy="1645920"/>
-          </a:xfrm>
-          <a:prstGeom prst="rect">
-            <a:avLst/>
-          </a:prstGeom>
-          <a:ln>
-            <a:noFill/>
-          </a:ln>
-          <a:effectLst>
-            <a:softEdge rad="112500"/>
-          </a:effectLst>
-          <a:extLst>
-            <a:ext uri="{909E8E84-426E-40DD-AFC4-6F175D3DCCD1}">
-              <a14:hiddenFill xmlns:a14="http://schemas.microsoft.com/office/drawing/2010/main">
-                <a:solidFill>
-                  <a:srgbClr val="FFFFFF"/>
-                </a:solidFill>
-              </a14:hiddenFill>
-            </a:ext>
-          </a:extLst>
-        </p:spPr>
-      </p:pic>
-      <p:pic>
-        <p:nvPicPr>
-          <p:cNvPr id="1031" name="Picture 7" descr="https://upload.wikimedia.org/wikipedia/commons/1/15/1896_telephone.jpg"/>
-          <p:cNvPicPr>
-            <a:picLocks noChangeAspect="1" noChangeArrowheads="1"/>
-          </p:cNvPicPr>
-          <p:nvPr/>
-        </p:nvPicPr>
-        <p:blipFill>
-          <a:blip r:embed="rId3" cstate="print">
-            <a:extLst>
-              <a:ext uri="{28A0092B-C50C-407E-A947-70E740481C1C}">
-                <a14:useLocalDpi xmlns:a14="http://schemas.microsoft.com/office/drawing/2010/main" val="0"/>
-              </a:ext>
-            </a:extLst>
-          </a:blip>
-          <a:srcRect/>
-          <a:stretch>
-            <a:fillRect/>
-          </a:stretch>
-        </p:blipFill>
-        <p:spPr bwMode="auto">
-          <a:xfrm>
-            <a:off x="742745" y="3848100"/>
-            <a:ext cx="1781825" cy="1828800"/>
+            <a:off x="793426" y="4343400"/>
+            <a:ext cx="1336370" cy="1371600"/>
           </a:xfrm>
           <a:prstGeom prst="rect">
             <a:avLst/>
@@ -8962,11 +9429,11 @@
           <p:nvPr/>
         </p:nvPicPr>
         <p:blipFill>
-          <a:blip r:embed="rId4" cstate="print">
+          <a:blip r:embed="rId3" cstate="print">
             <a:extLst>
               <a:ext uri="{BEBA8EAE-BF5A-486C-A8C5-ECC9F3942E4B}">
                 <a14:imgProps xmlns:a14="http://schemas.microsoft.com/office/drawing/2010/main">
-                  <a14:imgLayer r:embed="rId5">
+                  <a14:imgLayer r:embed="rId4">
                     <a14:imgEffect>
                       <a14:backgroundRemoval t="1364" b="98409" l="3273" r="96364"/>
                     </a14:imgEffect>
@@ -8985,8 +9452,8 @@
         </p:blipFill>
         <p:spPr bwMode="auto">
           <a:xfrm>
-            <a:off x="76200" y="3162300"/>
-            <a:ext cx="1142167" cy="1828800"/>
+            <a:off x="71750" y="3980974"/>
+            <a:ext cx="856627" cy="1371600"/>
           </a:xfrm>
           <a:prstGeom prst="rect">
             <a:avLst/>
@@ -9017,7 +9484,7 @@
           <p:nvPr/>
         </p:nvPicPr>
         <p:blipFill>
-          <a:blip r:embed="rId6">
+          <a:blip r:embed="rId5">
             <a:extLst>
               <a:ext uri="{28A0092B-C50C-407E-A947-70E740481C1C}">
                 <a14:useLocalDpi xmlns:a14="http://schemas.microsoft.com/office/drawing/2010/main" val="0"/>
@@ -9031,8 +9498,8 @@
         </p:blipFill>
         <p:spPr bwMode="auto">
           <a:xfrm>
-            <a:off x="6486525" y="3900487"/>
-            <a:ext cx="2581275" cy="1685926"/>
+            <a:off x="6891580" y="3980974"/>
+            <a:ext cx="2100020" cy="1371600"/>
           </a:xfrm>
           <a:prstGeom prst="rect">
             <a:avLst/>
@@ -9063,7 +9530,7 @@
           <p:nvPr/>
         </p:nvPicPr>
         <p:blipFill rotWithShape="1">
-          <a:blip r:embed="rId7">
+          <a:blip r:embed="rId6">
             <a:extLst>
               <a:ext uri="{28A0092B-C50C-407E-A947-70E740481C1C}">
                 <a14:useLocalDpi xmlns:a14="http://schemas.microsoft.com/office/drawing/2010/main" val="0"/>
@@ -9075,8 +9542,8 @@
         </p:blipFill>
         <p:spPr bwMode="auto">
           <a:xfrm>
-            <a:off x="457200" y="672854"/>
-            <a:ext cx="1097280" cy="1828800"/>
+            <a:off x="696028" y="548640"/>
+            <a:ext cx="822960" cy="1371600"/>
           </a:xfrm>
           <a:prstGeom prst="rect">
             <a:avLst/>
@@ -9102,7 +9569,7 @@
           <p:nvPr/>
         </p:nvPicPr>
         <p:blipFill>
-          <a:blip r:embed="rId8" cstate="print">
+          <a:blip r:embed="rId7" cstate="print">
             <a:extLst>
               <a:ext uri="{28A0092B-C50C-407E-A947-70E740481C1C}">
                 <a14:useLocalDpi xmlns:a14="http://schemas.microsoft.com/office/drawing/2010/main" val="0"/>
@@ -9116,8 +9583,8 @@
         </p:blipFill>
         <p:spPr bwMode="auto">
           <a:xfrm>
-            <a:off x="12308" y="54487"/>
-            <a:ext cx="673492" cy="1828800"/>
+            <a:off x="207486" y="54487"/>
+            <a:ext cx="505118" cy="1371600"/>
           </a:xfrm>
           <a:prstGeom prst="rect">
             <a:avLst/>
@@ -9148,7 +9615,7 @@
           <p:nvPr/>
         </p:nvPicPr>
         <p:blipFill rotWithShape="1">
-          <a:blip r:embed="rId9" cstate="print">
+          <a:blip r:embed="rId8" cstate="print">
             <a:extLst>
               <a:ext uri="{28A0092B-C50C-407E-A947-70E740481C1C}">
                 <a14:useLocalDpi xmlns:a14="http://schemas.microsoft.com/office/drawing/2010/main" val="0"/>
@@ -9160,8 +9627,8 @@
         </p:blipFill>
         <p:spPr bwMode="auto">
           <a:xfrm>
-            <a:off x="7695942" y="2705100"/>
-            <a:ext cx="1371858" cy="1828800"/>
+            <a:off x="7910968" y="3138487"/>
+            <a:ext cx="1028893" cy="1371600"/>
           </a:xfrm>
           <a:prstGeom prst="rect">
             <a:avLst/>
@@ -9187,11 +9654,11 @@
           <p:nvPr/>
         </p:nvPicPr>
         <p:blipFill>
-          <a:blip r:embed="rId10" cstate="print">
+          <a:blip r:embed="rId9" cstate="print">
             <a:extLst>
               <a:ext uri="{BEBA8EAE-BF5A-486C-A8C5-ECC9F3942E4B}">
                 <a14:imgProps xmlns:a14="http://schemas.microsoft.com/office/drawing/2010/main">
-                  <a14:imgLayer r:embed="rId11">
+                  <a14:imgLayer r:embed="rId10">
                     <a14:imgEffect>
                       <a14:backgroundRemoval t="2506" b="96128" l="5837" r="100000"/>
                     </a14:imgEffect>
@@ -9210,8 +9677,8 @@
         </p:blipFill>
         <p:spPr bwMode="auto">
           <a:xfrm>
-            <a:off x="3846807" y="3924300"/>
-            <a:ext cx="2138950" cy="1828800"/>
+            <a:off x="5118396" y="4277677"/>
+            <a:ext cx="1604213" cy="1371600"/>
           </a:xfrm>
           <a:prstGeom prst="rect">
             <a:avLst/>
@@ -9242,7 +9709,7 @@
           <p:nvPr/>
         </p:nvPicPr>
         <p:blipFill>
-          <a:blip r:embed="rId12" cstate="print">
+          <a:blip r:embed="rId11" cstate="print">
             <a:extLst>
               <a:ext uri="{28A0092B-C50C-407E-A947-70E740481C1C}">
                 <a14:useLocalDpi xmlns:a14="http://schemas.microsoft.com/office/drawing/2010/main" val="0"/>
@@ -9256,8 +9723,8 @@
         </p:blipFill>
         <p:spPr bwMode="auto">
           <a:xfrm>
-            <a:off x="5866224" y="1485900"/>
-            <a:ext cx="2134776" cy="1371600"/>
+            <a:off x="6774742" y="1234440"/>
+            <a:ext cx="1707822" cy="1097280"/>
           </a:xfrm>
           <a:prstGeom prst="rect">
             <a:avLst/>
@@ -9281,14 +9748,14 @@
       </p:pic>
       <p:pic>
         <p:nvPicPr>
-          <p:cNvPr id="1027" name="Picture 3"/>
+          <p:cNvPr id="2" name="Picture 2" descr="Windows 95 box"/>
           <p:cNvPicPr>
             <a:picLocks noChangeAspect="1" noChangeArrowheads="1"/>
           </p:cNvPicPr>
           <p:nvPr/>
         </p:nvPicPr>
         <p:blipFill>
-          <a:blip r:embed="rId13" cstate="print">
+          <a:blip r:embed="rId12">
             <a:extLst>
               <a:ext uri="{28A0092B-C50C-407E-A947-70E740481C1C}">
                 <a14:useLocalDpi xmlns:a14="http://schemas.microsoft.com/office/drawing/2010/main" val="0"/>
@@ -9302,7 +9769,280 @@
         </p:blipFill>
         <p:spPr bwMode="auto">
           <a:xfrm>
-            <a:off x="5149999" y="2430780"/>
+            <a:off x="4404360" y="3687207"/>
+            <a:ext cx="1083566" cy="1371600"/>
+          </a:xfrm>
+          <a:prstGeom prst="rect">
+            <a:avLst/>
+          </a:prstGeom>
+          <a:noFill/>
+          <a:extLst>
+            <a:ext uri="{909E8E84-426E-40DD-AFC4-6F175D3DCCD1}">
+              <a14:hiddenFill xmlns:a14="http://schemas.microsoft.com/office/drawing/2010/main">
+                <a:solidFill>
+                  <a:srgbClr val="FFFFFF"/>
+                </a:solidFill>
+              </a14:hiddenFill>
+            </a:ext>
+          </a:extLst>
+        </p:spPr>
+      </p:pic>
+      <p:pic>
+        <p:nvPicPr>
+          <p:cNvPr id="1030" name="Picture 6" descr="1885Benz.jpg"/>
+          <p:cNvPicPr>
+            <a:picLocks noChangeAspect="1" noChangeArrowheads="1"/>
+          </p:cNvPicPr>
+          <p:nvPr/>
+        </p:nvPicPr>
+        <p:blipFill>
+          <a:blip r:embed="rId13">
+            <a:extLst>
+              <a:ext uri="{28A0092B-C50C-407E-A947-70E740481C1C}">
+                <a14:useLocalDpi xmlns:a14="http://schemas.microsoft.com/office/drawing/2010/main" val="0"/>
+              </a:ext>
+            </a:extLst>
+          </a:blip>
+          <a:srcRect/>
+          <a:stretch>
+            <a:fillRect/>
+          </a:stretch>
+        </p:blipFill>
+        <p:spPr bwMode="auto">
+          <a:xfrm>
+            <a:off x="3589842" y="1360301"/>
+            <a:ext cx="1745673" cy="1371600"/>
+          </a:xfrm>
+          <a:prstGeom prst="rect">
+            <a:avLst/>
+          </a:prstGeom>
+          <a:ln>
+            <a:noFill/>
+          </a:ln>
+          <a:effectLst>
+            <a:softEdge rad="38100"/>
+          </a:effectLst>
+          <a:extLst>
+            <a:ext uri="{909E8E84-426E-40DD-AFC4-6F175D3DCCD1}">
+              <a14:hiddenFill xmlns:a14="http://schemas.microsoft.com/office/drawing/2010/main">
+                <a:solidFill>
+                  <a:srgbClr val="FFFFFF"/>
+                </a:solidFill>
+              </a14:hiddenFill>
+            </a:ext>
+          </a:extLst>
+        </p:spPr>
+      </p:pic>
+      <p:pic>
+        <p:nvPicPr>
+          <p:cNvPr id="1028" name="Picture 4" descr="https://upload.wikimedia.org/wikipedia/commons/thumb/a/a4/Karl_Benz_1869.png/180px-Karl_Benz_1869.png"/>
+          <p:cNvPicPr>
+            <a:picLocks noChangeAspect="1" noChangeArrowheads="1"/>
+          </p:cNvPicPr>
+          <p:nvPr/>
+        </p:nvPicPr>
+        <p:blipFill>
+          <a:blip r:embed="rId14">
+            <a:extLst>
+              <a:ext uri="{28A0092B-C50C-407E-A947-70E740481C1C}">
+                <a14:useLocalDpi xmlns:a14="http://schemas.microsoft.com/office/drawing/2010/main" val="0"/>
+              </a:ext>
+            </a:extLst>
+          </a:blip>
+          <a:srcRect/>
+          <a:stretch>
+            <a:fillRect/>
+          </a:stretch>
+        </p:blipFill>
+        <p:spPr bwMode="auto">
+          <a:xfrm>
+            <a:off x="2778794" y="497532"/>
+            <a:ext cx="1142999" cy="1371600"/>
+          </a:xfrm>
+          <a:prstGeom prst="ellipse">
+            <a:avLst/>
+          </a:prstGeom>
+          <a:ln>
+            <a:noFill/>
+          </a:ln>
+          <a:effectLst>
+            <a:softEdge rad="38100"/>
+          </a:effectLst>
+          <a:extLst>
+            <a:ext uri="{909E8E84-426E-40DD-AFC4-6F175D3DCCD1}">
+              <a14:hiddenFill xmlns:a14="http://schemas.microsoft.com/office/drawing/2010/main">
+                <a:solidFill>
+                  <a:srgbClr val="FFFFFF"/>
+                </a:solidFill>
+              </a14:hiddenFill>
+            </a:ext>
+          </a:extLst>
+        </p:spPr>
+      </p:pic>
+      <p:pic>
+        <p:nvPicPr>
+          <p:cNvPr id="1032" name="Picture 8" descr="https://upload.wikimedia.org/wikipedia/commons/thumb/8/82/Tesla_Model_S_%28Facelift_ab_04-2016%29_trimmed.jpg/1024px-Tesla_Model_S_%28Facelift_ab_04-2016%29_trimmed.jpg"/>
+          <p:cNvPicPr>
+            <a:picLocks noChangeAspect="1" noChangeArrowheads="1"/>
+          </p:cNvPicPr>
+          <p:nvPr/>
+        </p:nvPicPr>
+        <p:blipFill>
+          <a:blip r:embed="rId15" cstate="print">
+            <a:extLst>
+              <a:ext uri="{28A0092B-C50C-407E-A947-70E740481C1C}">
+                <a14:useLocalDpi xmlns:a14="http://schemas.microsoft.com/office/drawing/2010/main" val="0"/>
+              </a:ext>
+            </a:extLst>
+          </a:blip>
+          <a:srcRect/>
+          <a:stretch>
+            <a:fillRect/>
+          </a:stretch>
+        </p:blipFill>
+        <p:spPr bwMode="auto">
+          <a:xfrm>
+            <a:off x="3748431" y="283087"/>
+            <a:ext cx="2519211" cy="1371600"/>
+          </a:xfrm>
+          <a:prstGeom prst="rect">
+            <a:avLst/>
+          </a:prstGeom>
+          <a:ln>
+            <a:noFill/>
+          </a:ln>
+          <a:effectLst>
+            <a:softEdge rad="50800"/>
+          </a:effectLst>
+          <a:extLst>
+            <a:ext uri="{909E8E84-426E-40DD-AFC4-6F175D3DCCD1}">
+              <a14:hiddenFill xmlns:a14="http://schemas.microsoft.com/office/drawing/2010/main">
+                <a:solidFill>
+                  <a:srgbClr val="FFFFFF"/>
+                </a:solidFill>
+              </a14:hiddenFill>
+            </a:ext>
+          </a:extLst>
+        </p:spPr>
+      </p:pic>
+      <p:pic>
+        <p:nvPicPr>
+          <p:cNvPr id="2052" name="Picture 4" descr="Hand holding a Social Media 3d Sphere"/>
+          <p:cNvPicPr>
+            <a:picLocks noChangeAspect="1" noChangeArrowheads="1"/>
+          </p:cNvPicPr>
+          <p:nvPr/>
+        </p:nvPicPr>
+        <p:blipFill rotWithShape="1">
+          <a:blip r:embed="rId16" cstate="print">
+            <a:extLst>
+              <a:ext uri="{BEBA8EAE-BF5A-486C-A8C5-ECC9F3942E4B}">
+                <a14:imgProps xmlns:a14="http://schemas.microsoft.com/office/drawing/2010/main">
+                  <a14:imgLayer r:embed="rId17">
+                    <a14:imgEffect>
+                      <a14:backgroundRemoval t="10000" b="90000" l="10000" r="90000"/>
+                    </a14:imgEffect>
+                  </a14:imgLayer>
+                </a14:imgProps>
+              </a:ext>
+              <a:ext uri="{28A0092B-C50C-407E-A947-70E740481C1C}">
+                <a14:useLocalDpi xmlns:a14="http://schemas.microsoft.com/office/drawing/2010/main" val="0"/>
+              </a:ext>
+            </a:extLst>
+          </a:blip>
+          <a:srcRect l="16290" t="7207" r="13960" b="8559"/>
+          <a:stretch/>
+        </p:blipFill>
+        <p:spPr bwMode="auto">
+          <a:xfrm>
+            <a:off x="3343282" y="4643437"/>
+            <a:ext cx="1250574" cy="1005840"/>
+          </a:xfrm>
+          <a:prstGeom prst="ellipse">
+            <a:avLst/>
+          </a:prstGeom>
+          <a:noFill/>
+          <a:extLst>
+            <a:ext uri="{909E8E84-426E-40DD-AFC4-6F175D3DCCD1}">
+              <a14:hiddenFill xmlns:a14="http://schemas.microsoft.com/office/drawing/2010/main">
+                <a:solidFill>
+                  <a:srgbClr val="FFFFFF"/>
+                </a:solidFill>
+              </a14:hiddenFill>
+            </a:ext>
+          </a:extLst>
+        </p:spPr>
+      </p:pic>
+      <p:pic>
+        <p:nvPicPr>
+          <p:cNvPr id="1026" name="Picture 2" descr="C:\Users\townesm\AppData\Local\Temp\Kitty_hawk_gross.jpg"/>
+          <p:cNvPicPr>
+            <a:picLocks noChangeAspect="1" noChangeArrowheads="1"/>
+          </p:cNvPicPr>
+          <p:nvPr/>
+        </p:nvPicPr>
+        <p:blipFill>
+          <a:blip r:embed="rId18" cstate="print">
+            <a:extLst>
+              <a:ext uri="{28A0092B-C50C-407E-A947-70E740481C1C}">
+                <a14:useLocalDpi xmlns:a14="http://schemas.microsoft.com/office/drawing/2010/main" val="0"/>
+              </a:ext>
+            </a:extLst>
+          </a:blip>
+          <a:srcRect/>
+          <a:stretch>
+            <a:fillRect/>
+          </a:stretch>
+        </p:blipFill>
+        <p:spPr bwMode="auto">
+          <a:xfrm>
+            <a:off x="7215970" y="125924"/>
+            <a:ext cx="1864288" cy="1371600"/>
+          </a:xfrm>
+          <a:prstGeom prst="rect">
+            <a:avLst/>
+          </a:prstGeom>
+          <a:ln>
+            <a:noFill/>
+          </a:ln>
+          <a:effectLst>
+            <a:softEdge rad="112500"/>
+          </a:effectLst>
+          <a:extLst>
+            <a:ext uri="{909E8E84-426E-40DD-AFC4-6F175D3DCCD1}">
+              <a14:hiddenFill xmlns:a14="http://schemas.microsoft.com/office/drawing/2010/main">
+                <a:solidFill>
+                  <a:srgbClr val="FFFFFF"/>
+                </a:solidFill>
+              </a14:hiddenFill>
+            </a:ext>
+          </a:extLst>
+        </p:spPr>
+      </p:pic>
+      <p:pic>
+        <p:nvPicPr>
+          <p:cNvPr id="1027" name="Picture 3"/>
+          <p:cNvPicPr>
+            <a:picLocks noChangeAspect="1" noChangeArrowheads="1"/>
+          </p:cNvPicPr>
+          <p:nvPr/>
+        </p:nvPicPr>
+        <p:blipFill>
+          <a:blip r:embed="rId19" cstate="print">
+            <a:extLst>
+              <a:ext uri="{28A0092B-C50C-407E-A947-70E740481C1C}">
+                <a14:useLocalDpi xmlns:a14="http://schemas.microsoft.com/office/drawing/2010/main" val="0"/>
+              </a:ext>
+            </a:extLst>
+          </a:blip>
+          <a:srcRect/>
+          <a:stretch>
+            <a:fillRect/>
+          </a:stretch>
+        </p:blipFill>
+        <p:spPr bwMode="auto">
+          <a:xfrm>
+            <a:off x="6042098" y="2030730"/>
             <a:ext cx="1784201" cy="1188720"/>
           </a:xfrm>
           <a:prstGeom prst="rect">
@@ -9337,70 +10077,27 @@
       </p:pic>
       <p:pic>
         <p:nvPicPr>
-          <p:cNvPr id="2" name="Picture 2" descr="Windows 95 box"/>
+          <p:cNvPr id="2054" name="Picture 6" descr="Image result for charles carson's xerox copier"/>
           <p:cNvPicPr>
             <a:picLocks noChangeAspect="1" noChangeArrowheads="1"/>
           </p:cNvPicPr>
           <p:nvPr/>
         </p:nvPicPr>
-        <p:blipFill>
-          <a:blip r:embed="rId14">
+        <p:blipFill rotWithShape="1">
+          <a:blip r:embed="rId20" cstate="print">
             <a:extLst>
               <a:ext uri="{28A0092B-C50C-407E-A947-70E740481C1C}">
                 <a14:useLocalDpi xmlns:a14="http://schemas.microsoft.com/office/drawing/2010/main" val="0"/>
               </a:ext>
             </a:extLst>
           </a:blip>
-          <a:srcRect/>
-          <a:stretch>
-            <a:fillRect/>
-          </a:stretch>
+          <a:srcRect l="15503"/>
+          <a:stretch/>
         </p:blipFill>
         <p:spPr bwMode="auto">
           <a:xfrm>
-            <a:off x="3352800" y="3690264"/>
-            <a:ext cx="1005840" cy="1273213"/>
-          </a:xfrm>
-          <a:prstGeom prst="rect">
-            <a:avLst/>
-          </a:prstGeom>
-          <a:noFill/>
-          <a:extLst>
-            <a:ext uri="{909E8E84-426E-40DD-AFC4-6F175D3DCCD1}">
-              <a14:hiddenFill xmlns:a14="http://schemas.microsoft.com/office/drawing/2010/main">
-                <a:solidFill>
-                  <a:srgbClr val="FFFFFF"/>
-                </a:solidFill>
-              </a14:hiddenFill>
-            </a:ext>
-          </a:extLst>
-        </p:spPr>
-      </p:pic>
-      <p:pic>
-        <p:nvPicPr>
-          <p:cNvPr id="1030" name="Picture 6" descr="1885Benz.jpg"/>
-          <p:cNvPicPr>
-            <a:picLocks noChangeAspect="1" noChangeArrowheads="1"/>
-          </p:cNvPicPr>
-          <p:nvPr/>
-        </p:nvPicPr>
-        <p:blipFill>
-          <a:blip r:embed="rId15">
-            <a:extLst>
-              <a:ext uri="{28A0092B-C50C-407E-A947-70E740481C1C}">
-                <a14:useLocalDpi xmlns:a14="http://schemas.microsoft.com/office/drawing/2010/main" val="0"/>
-              </a:ext>
-            </a:extLst>
-          </a:blip>
-          <a:srcRect/>
-          <a:stretch>
-            <a:fillRect/>
-          </a:stretch>
-        </p:blipFill>
-        <p:spPr bwMode="auto">
-          <a:xfrm>
-            <a:off x="2461259" y="1285603"/>
-            <a:ext cx="2194560" cy="1724297"/>
+            <a:off x="1847387" y="2860842"/>
+            <a:ext cx="1636649" cy="1371600"/>
           </a:xfrm>
           <a:prstGeom prst="rect">
             <a:avLst/>
@@ -9409,7 +10106,7 @@
             <a:noFill/>
           </a:ln>
           <a:effectLst>
-            <a:softEdge rad="112500"/>
+            <a:softEdge rad="38100"/>
           </a:effectLst>
           <a:extLst>
             <a:ext uri="{909E8E84-426E-40DD-AFC4-6F175D3DCCD1}">
@@ -9424,15 +10121,24 @@
       </p:pic>
       <p:pic>
         <p:nvPicPr>
-          <p:cNvPr id="1028" name="Picture 4" descr="https://upload.wikimedia.org/wikipedia/commons/thumb/a/a4/Karl_Benz_1869.png/180px-Karl_Benz_1869.png"/>
+          <p:cNvPr id="2056" name="Picture 8" descr="Image result for xerox copier"/>
           <p:cNvPicPr>
             <a:picLocks noChangeAspect="1" noChangeArrowheads="1"/>
           </p:cNvPicPr>
           <p:nvPr/>
         </p:nvPicPr>
         <p:blipFill>
-          <a:blip r:embed="rId16">
+          <a:blip r:embed="rId21" cstate="print">
             <a:extLst>
+              <a:ext uri="{BEBA8EAE-BF5A-486C-A8C5-ECC9F3942E4B}">
+                <a14:imgProps xmlns:a14="http://schemas.microsoft.com/office/drawing/2010/main">
+                  <a14:imgLayer r:embed="rId22">
+                    <a14:imgEffect>
+                      <a14:backgroundRemoval t="0" b="99529" l="9647" r="89647"/>
+                    </a14:imgEffect>
+                  </a14:imgLayer>
+                </a14:imgProps>
+              </a:ext>
               <a:ext uri="{28A0092B-C50C-407E-A947-70E740481C1C}">
                 <a14:useLocalDpi xmlns:a14="http://schemas.microsoft.com/office/drawing/2010/main" val="0"/>
               </a:ext>
@@ -9445,64 +10151,13 @@
         </p:blipFill>
         <p:spPr bwMode="auto">
           <a:xfrm>
-            <a:off x="1828801" y="571500"/>
-            <a:ext cx="1371599" cy="1645920"/>
-          </a:xfrm>
-          <a:prstGeom prst="ellipse">
-            <a:avLst/>
-          </a:prstGeom>
-          <a:ln>
-            <a:noFill/>
-          </a:ln>
-          <a:effectLst>
-            <a:softEdge rad="112500"/>
-          </a:effectLst>
-          <a:extLst>
-            <a:ext uri="{909E8E84-426E-40DD-AFC4-6F175D3DCCD1}">
-              <a14:hiddenFill xmlns:a14="http://schemas.microsoft.com/office/drawing/2010/main">
-                <a:solidFill>
-                  <a:srgbClr val="FFFFFF"/>
-                </a:solidFill>
-              </a14:hiddenFill>
-            </a:ext>
-          </a:extLst>
-        </p:spPr>
-      </p:pic>
-      <p:pic>
-        <p:nvPicPr>
-          <p:cNvPr id="1032" name="Picture 8" descr="https://upload.wikimedia.org/wikipedia/commons/thumb/8/82/Tesla_Model_S_%28Facelift_ab_04-2016%29_trimmed.jpg/1024px-Tesla_Model_S_%28Facelift_ab_04-2016%29_trimmed.jpg"/>
-          <p:cNvPicPr>
-            <a:picLocks noChangeAspect="1" noChangeArrowheads="1"/>
-          </p:cNvPicPr>
-          <p:nvPr/>
-        </p:nvPicPr>
-        <p:blipFill>
-          <a:blip r:embed="rId17" cstate="print">
-            <a:extLst>
-              <a:ext uri="{28A0092B-C50C-407E-A947-70E740481C1C}">
-                <a14:useLocalDpi xmlns:a14="http://schemas.microsoft.com/office/drawing/2010/main" val="0"/>
-              </a:ext>
-            </a:extLst>
-          </a:blip>
-          <a:srcRect/>
-          <a:stretch>
-            <a:fillRect/>
-          </a:stretch>
-        </p:blipFill>
-        <p:spPr bwMode="auto">
-          <a:xfrm>
-            <a:off x="3169920" y="370303"/>
-            <a:ext cx="2468880" cy="1344197"/>
+            <a:off x="1040364" y="2237906"/>
+            <a:ext cx="1371600" cy="1371600"/>
           </a:xfrm>
           <a:prstGeom prst="rect">
             <a:avLst/>
           </a:prstGeom>
-          <a:ln>
-            <a:noFill/>
-          </a:ln>
-          <a:effectLst>
-            <a:softEdge rad="50800"/>
-          </a:effectLst>
+          <a:noFill/>
           <a:extLst>
             <a:ext uri="{909E8E84-426E-40DD-AFC4-6F175D3DCCD1}">
               <a14:hiddenFill xmlns:a14="http://schemas.microsoft.com/office/drawing/2010/main">
@@ -9534,7 +10189,7 @@
 </p:sld>
 </file>
 
-<file path=ppt/slides/slide8.xml><?xml version="1.0" encoding="utf-8"?>
+<file path=ppt/slides/slide9.xml><?xml version="1.0" encoding="utf-8"?>
 <p:sld xmlns:a="http://schemas.openxmlformats.org/drawingml/2006/main" xmlns:r="http://schemas.openxmlformats.org/officeDocument/2006/relationships" xmlns:p="http://schemas.openxmlformats.org/presentationml/2006/main">
   <p:cSld>
     <p:spTree>
@@ -10530,84 +11185,6 @@
 </p:sld>
 </file>
 
-<file path=ppt/slides/slide9.xml><?xml version="1.0" encoding="utf-8"?>
-<p:sld xmlns:a="http://schemas.openxmlformats.org/drawingml/2006/main" xmlns:r="http://schemas.openxmlformats.org/officeDocument/2006/relationships" xmlns:p="http://schemas.openxmlformats.org/presentationml/2006/main">
-  <p:cSld>
-    <p:spTree>
-      <p:nvGrpSpPr>
-        <p:cNvPr id="1" name=""/>
-        <p:cNvGrpSpPr/>
-        <p:nvPr/>
-      </p:nvGrpSpPr>
-      <p:grpSpPr>
-        <a:xfrm>
-          <a:off x="0" y="0"/>
-          <a:ext cx="0" cy="0"/>
-          <a:chOff x="0" y="0"/>
-          <a:chExt cx="0" cy="0"/>
-        </a:xfrm>
-      </p:grpSpPr>
-      <p:pic>
-        <p:nvPicPr>
-          <p:cNvPr id="3076" name="Picture 4" descr="Boat in storm evening — stock photo"/>
-          <p:cNvPicPr>
-            <a:picLocks noChangeAspect="1" noChangeArrowheads="1"/>
-          </p:cNvPicPr>
-          <p:nvPr/>
-        </p:nvPicPr>
-        <p:blipFill>
-          <a:blip r:embed="rId3">
-            <a:extLst>
-              <a:ext uri="{28A0092B-C50C-407E-A947-70E740481C1C}">
-                <a14:useLocalDpi xmlns:a14="http://schemas.microsoft.com/office/drawing/2010/main" val="0"/>
-              </a:ext>
-            </a:extLst>
-          </a:blip>
-          <a:srcRect/>
-          <a:stretch>
-            <a:fillRect/>
-          </a:stretch>
-        </p:blipFill>
-        <p:spPr bwMode="auto">
-          <a:xfrm>
-            <a:off x="0" y="-1714500"/>
-            <a:ext cx="9144000" cy="9144001"/>
-          </a:xfrm>
-          <a:prstGeom prst="rect">
-            <a:avLst/>
-          </a:prstGeom>
-          <a:noFill/>
-          <a:extLst>
-            <a:ext uri="{909E8E84-426E-40DD-AFC4-6F175D3DCCD1}">
-              <a14:hiddenFill xmlns:a14="http://schemas.microsoft.com/office/drawing/2010/main">
-                <a:solidFill>
-                  <a:srgbClr val="FFFFFF"/>
-                </a:solidFill>
-              </a14:hiddenFill>
-            </a:ext>
-          </a:extLst>
-        </p:spPr>
-      </p:pic>
-    </p:spTree>
-    <p:extLst>
-      <p:ext uri="{BB962C8B-B14F-4D97-AF65-F5344CB8AC3E}">
-        <p14:creationId xmlns:p14="http://schemas.microsoft.com/office/powerpoint/2010/main" val="3810706332"/>
-      </p:ext>
-    </p:extLst>
-  </p:cSld>
-  <p:clrMapOvr>
-    <a:masterClrMapping/>
-  </p:clrMapOvr>
-  <p:timing>
-    <p:tnLst>
-      <p:par>
-        <p:cTn id="1" dur="indefinite" restart="never" nodeType="tmRoot"/>
-      </p:par>
-    </p:tnLst>
-  </p:timing>
-</p:sld>
-</file>
-
 <file path=ppt/theme/theme1.xml><?xml version="1.0" encoding="utf-8"?>
 <a:theme xmlns:a="http://schemas.openxmlformats.org/drawingml/2006/main" name="Office Theme">
   <a:themeElements>

</xml_diff>